<commit_message>
re #861: Updated scan conversion documentation with new TransducerCenterPixel attribute
git-svn-id: https://subversion.assembla.com/svn/plus/trunk/doc@3160 c04e96f8-ac36-4ff2-8b34-4a5e34ef045f
</commit_message>
<xml_diff>
--- a/specifications/UltrasoundImageOrientation.pptx
+++ b/specifications/UltrasoundImageOrientation.pptx
@@ -5,7 +5,7 @@
     <p:sldMasterId id="2147483648" r:id="rId1"/>
   </p:sldMasterIdLst>
   <p:notesMasterIdLst>
-    <p:notesMasterId r:id="rId9"/>
+    <p:notesMasterId r:id="rId10"/>
   </p:notesMasterIdLst>
   <p:sldIdLst>
     <p:sldId id="256" r:id="rId2"/>
@@ -14,7 +14,8 @@
     <p:sldId id="259" r:id="rId5"/>
     <p:sldId id="260" r:id="rId6"/>
     <p:sldId id="261" r:id="rId7"/>
-    <p:sldId id="262" r:id="rId8"/>
+    <p:sldId id="263" r:id="rId8"/>
+    <p:sldId id="262" r:id="rId9"/>
   </p:sldIdLst>
   <p:sldSz cx="9144000" cy="6858000" type="screen4x3"/>
   <p:notesSz cx="6858000" cy="9144000"/>
@@ -198,7 +199,7 @@
           <a:p>
             <a:fld id="{96529989-2A3A-4071-8AAB-A4A4DA00AA76}" type="datetimeFigureOut">
               <a:rPr lang="en-CA" smtClean="0"/>
-              <a:t>2012-11-03</a:t>
+              <a:t>2014-02-15</a:t>
             </a:fld>
             <a:endParaRPr lang="en-CA"/>
           </a:p>
@@ -647,7 +648,7 @@
           <a:p>
             <a:fld id="{9BAB7AD8-7DA6-49ED-A6A1-3E576430A444}" type="datetime1">
               <a:rPr lang="en-US" smtClean="0"/>
-              <a:t>11/3/2012</a:t>
+              <a:t>2/15/2014</a:t>
             </a:fld>
             <a:endParaRPr lang="en-US"/>
           </a:p>
@@ -817,7 +818,7 @@
           <a:p>
             <a:fld id="{6A30A583-A045-42C3-B180-810431823F7C}" type="datetime1">
               <a:rPr lang="en-US" smtClean="0"/>
-              <a:t>11/3/2012</a:t>
+              <a:t>2/15/2014</a:t>
             </a:fld>
             <a:endParaRPr lang="en-US"/>
           </a:p>
@@ -997,7 +998,7 @@
           <a:p>
             <a:fld id="{8C706EE2-A389-49DA-852C-A25EEA0096A5}" type="datetime1">
               <a:rPr lang="en-US" smtClean="0"/>
-              <a:t>11/3/2012</a:t>
+              <a:t>2/15/2014</a:t>
             </a:fld>
             <a:endParaRPr lang="en-US"/>
           </a:p>
@@ -1167,7 +1168,7 @@
           <a:p>
             <a:fld id="{FAE799BF-65A4-44D1-9626-4CB2683479A0}" type="datetime1">
               <a:rPr lang="en-US" smtClean="0"/>
-              <a:t>11/3/2012</a:t>
+              <a:t>2/15/2014</a:t>
             </a:fld>
             <a:endParaRPr lang="en-US"/>
           </a:p>
@@ -1413,7 +1414,7 @@
           <a:p>
             <a:fld id="{C58770DA-FA6F-402B-A47E-99A02268F9C9}" type="datetime1">
               <a:rPr lang="en-US" smtClean="0"/>
-              <a:t>11/3/2012</a:t>
+              <a:t>2/15/2014</a:t>
             </a:fld>
             <a:endParaRPr lang="en-US"/>
           </a:p>
@@ -1701,7 +1702,7 @@
           <a:p>
             <a:fld id="{D7425FA0-417C-40D8-84E5-0BBAE59E3627}" type="datetime1">
               <a:rPr lang="en-US" smtClean="0"/>
-              <a:t>11/3/2012</a:t>
+              <a:t>2/15/2014</a:t>
             </a:fld>
             <a:endParaRPr lang="en-US"/>
           </a:p>
@@ -2123,7 +2124,7 @@
           <a:p>
             <a:fld id="{84DF6B02-38C3-4CBB-A488-70C85C7D6D5F}" type="datetime1">
               <a:rPr lang="en-US" smtClean="0"/>
-              <a:t>11/3/2012</a:t>
+              <a:t>2/15/2014</a:t>
             </a:fld>
             <a:endParaRPr lang="en-US"/>
           </a:p>
@@ -2241,7 +2242,7 @@
           <a:p>
             <a:fld id="{E82731BF-6D24-4EBE-983D-DBF326ECDFD5}" type="datetime1">
               <a:rPr lang="en-US" smtClean="0"/>
-              <a:t>11/3/2012</a:t>
+              <a:t>2/15/2014</a:t>
             </a:fld>
             <a:endParaRPr lang="en-US"/>
           </a:p>
@@ -2336,7 +2337,7 @@
           <a:p>
             <a:fld id="{11A30BEF-A390-4EED-B356-2EDD103CB91A}" type="datetime1">
               <a:rPr lang="en-US" smtClean="0"/>
-              <a:t>11/3/2012</a:t>
+              <a:t>2/15/2014</a:t>
             </a:fld>
             <a:endParaRPr lang="en-US"/>
           </a:p>
@@ -2613,7 +2614,7 @@
           <a:p>
             <a:fld id="{2EFEA545-71A4-4166-A3E6-0B73A95A4B04}" type="datetime1">
               <a:rPr lang="en-US" smtClean="0"/>
-              <a:t>11/3/2012</a:t>
+              <a:t>2/15/2014</a:t>
             </a:fld>
             <a:endParaRPr lang="en-US"/>
           </a:p>
@@ -2866,7 +2867,7 @@
           <a:p>
             <a:fld id="{6BA77AC2-5E11-4AE9-8C29-3721D388FBC1}" type="datetime1">
               <a:rPr lang="en-US" smtClean="0"/>
-              <a:t>11/3/2012</a:t>
+              <a:t>2/15/2014</a:t>
             </a:fld>
             <a:endParaRPr lang="en-US"/>
           </a:p>
@@ -3079,7 +3080,7 @@
           <a:p>
             <a:fld id="{C405AE0A-D4D8-4B96-AA9E-22A2EF91B3C7}" type="datetime1">
               <a:rPr lang="en-US" smtClean="0"/>
-              <a:t>11/3/2012</a:t>
+              <a:t>2/15/2014</a:t>
             </a:fld>
             <a:endParaRPr lang="en-US"/>
           </a:p>
@@ -8389,7 +8390,7 @@
         </p:nvSpPr>
         <p:spPr>
           <a:xfrm>
-            <a:off x="1266730" y="5473415"/>
+            <a:off x="1266730" y="5498068"/>
             <a:ext cx="677439" cy="369332"/>
           </a:xfrm>
           <a:prstGeom prst="rect">
@@ -8850,7 +8851,7 @@
         <p:spPr>
           <a:xfrm>
             <a:off x="1981200" y="5190402"/>
-            <a:ext cx="2111475" cy="261610"/>
+            <a:ext cx="2143536" cy="261610"/>
           </a:xfrm>
           <a:prstGeom prst="rect">
             <a:avLst/>
@@ -8877,7 +8878,15 @@
                   <a:srgbClr val="FFC000"/>
                 </a:solidFill>
               </a:rPr>
-              <a:t> = -3.0</a:t>
+              <a:t> = -</a:t>
+            </a:r>
+            <a:r>
+              <a:rPr lang="en-US" sz="1100" dirty="0" smtClean="0">
+                <a:solidFill>
+                  <a:srgbClr val="FFC000"/>
+                </a:solidFill>
+              </a:rPr>
+              <a:t>3.0 </a:t>
             </a:r>
             <a:endParaRPr lang="en-US" sz="1100" dirty="0">
               <a:solidFill>
@@ -9021,7 +9030,7 @@
         </p:nvSpPr>
         <p:spPr>
           <a:xfrm>
-            <a:off x="3041668" y="584947"/>
+            <a:off x="2133600" y="584947"/>
             <a:ext cx="2949462" cy="369332"/>
           </a:xfrm>
           <a:prstGeom prst="rect">
@@ -9067,7 +9076,7 @@
         </p:nvSpPr>
         <p:spPr>
           <a:xfrm>
-            <a:off x="3088839" y="5715000"/>
+            <a:off x="3088839" y="5879068"/>
             <a:ext cx="3928576" cy="369332"/>
           </a:xfrm>
           <a:prstGeom prst="rect">
@@ -9119,7 +9128,7 @@
         </p:nvSpPr>
         <p:spPr>
           <a:xfrm>
-            <a:off x="228600" y="6019800"/>
+            <a:off x="228600" y="6138446"/>
             <a:ext cx="8610600" cy="338554"/>
           </a:xfrm>
           <a:prstGeom prst="rect">
@@ -9187,6 +9196,142 @@
               <a:t>Source: doc\specifications\UltrasoundImageOrientation.pptx</a:t>
             </a:r>
             <a:endParaRPr lang="en-US" dirty="0"/>
+          </a:p>
+        </p:txBody>
+      </p:sp>
+      <p:sp>
+        <p:nvSpPr>
+          <p:cNvPr id="33" name="TextBox 32"/>
+          <p:cNvSpPr txBox="1"/>
+          <p:nvPr/>
+        </p:nvSpPr>
+        <p:spPr>
+          <a:xfrm>
+            <a:off x="5305330" y="457200"/>
+            <a:ext cx="3686270" cy="1308050"/>
+          </a:xfrm>
+          <a:prstGeom prst="rect">
+            <a:avLst/>
+          </a:prstGeom>
+          <a:solidFill>
+            <a:srgbClr val="FF0000"/>
+          </a:solidFill>
+        </p:spPr>
+        <p:txBody>
+          <a:bodyPr wrap="square" rtlCol="0">
+            <a:spAutoFit/>
+          </a:bodyPr>
+          <a:lstStyle/>
+          <a:p>
+            <a:pPr marL="342900" indent="-342900" algn="ctr"/>
+            <a:r>
+              <a:rPr lang="en-US" sz="2000" b="1" dirty="0" smtClean="0">
+                <a:latin typeface="+mj-lt"/>
+              </a:rPr>
+              <a:t>Obsolete! (only for Plus-2.0.x)</a:t>
+            </a:r>
+          </a:p>
+          <a:p>
+            <a:pPr marL="92075" indent="-92075"/>
+            <a:r>
+              <a:rPr lang="en-US" sz="1400" b="1" dirty="0" smtClean="0">
+                <a:latin typeface="+mj-lt"/>
+              </a:rPr>
+              <a:t>In current versions </a:t>
+            </a:r>
+            <a:r>
+              <a:rPr lang="en-US" sz="1400" b="1" dirty="0">
+                <a:latin typeface="+mj-lt"/>
+              </a:rPr>
+              <a:t>use </a:t>
+            </a:r>
+            <a:r>
+              <a:rPr lang="en-US" sz="1400" b="1" dirty="0" err="1">
+                <a:latin typeface="+mj-lt"/>
+              </a:rPr>
+              <a:t>TransducerCenterPixel</a:t>
+            </a:r>
+            <a:r>
+              <a:rPr lang="en-US" sz="1400" b="1" dirty="0">
+                <a:latin typeface="+mj-lt"/>
+              </a:rPr>
+              <a:t>:</a:t>
+            </a:r>
+            <a:endParaRPr lang="en-US" sz="1400" b="1" dirty="0" smtClean="0">
+              <a:latin typeface="+mj-lt"/>
+            </a:endParaRPr>
+          </a:p>
+          <a:p>
+            <a:pPr marL="92075" indent="-92075"/>
+            <a:r>
+              <a:rPr lang="en-US" sz="1200" dirty="0" err="1" smtClean="0">
+                <a:latin typeface="+mj-lt"/>
+              </a:rPr>
+              <a:t>TransducerCenterPixel</a:t>
+            </a:r>
+            <a:r>
+              <a:rPr lang="en-US" sz="1200" dirty="0" smtClean="0">
+                <a:latin typeface="+mj-lt"/>
+              </a:rPr>
+              <a:t>[0] = </a:t>
+            </a:r>
+            <a:r>
+              <a:rPr lang="en-US" sz="1200" dirty="0" err="1" smtClean="0">
+                <a:latin typeface="+mj-lt"/>
+              </a:rPr>
+              <a:t>OutputImageSizePixel</a:t>
+            </a:r>
+            <a:r>
+              <a:rPr lang="en-US" sz="1200" dirty="0" smtClean="0">
+                <a:latin typeface="+mj-lt"/>
+              </a:rPr>
+              <a:t>[0]/2</a:t>
+            </a:r>
+          </a:p>
+          <a:p>
+            <a:pPr marL="92075" indent="-92075"/>
+            <a:r>
+              <a:rPr lang="en-US" sz="1100" dirty="0" err="1" smtClean="0"/>
+              <a:t>TransducerCenterPixel</a:t>
+            </a:r>
+            <a:r>
+              <a:rPr lang="en-US" sz="1100" dirty="0" smtClean="0"/>
+              <a:t>[1] =</a:t>
+            </a:r>
+            <a:br>
+              <a:rPr lang="en-US" sz="1100" dirty="0" smtClean="0"/>
+            </a:br>
+            <a:r>
+              <a:rPr lang="en-US" sz="1100" dirty="0" smtClean="0"/>
+              <a:t>(</a:t>
+            </a:r>
+            <a:r>
+              <a:rPr lang="en-US" sz="1100" dirty="0" err="1" smtClean="0"/>
+              <a:t>RadiusStartMm</a:t>
+            </a:r>
+            <a:r>
+              <a:rPr lang="en-US" sz="1100" dirty="0" smtClean="0"/>
+              <a:t> –</a:t>
+            </a:r>
+            <a:r>
+              <a:rPr lang="en-US" sz="1100" dirty="0" err="1" smtClean="0"/>
+              <a:t>OutputImageStartDepthMm</a:t>
+            </a:r>
+            <a:r>
+              <a:rPr lang="en-US" sz="1100" dirty="0" smtClean="0"/>
+              <a:t>) / </a:t>
+            </a:r>
+            <a:r>
+              <a:rPr lang="en-US" sz="1100" dirty="0" err="1" smtClean="0"/>
+              <a:t>OutputImageSpacingMmPerPixel</a:t>
+            </a:r>
+            <a:r>
+              <a:rPr lang="en-US" sz="1100" dirty="0" smtClean="0"/>
+              <a:t>[1]</a:t>
+            </a:r>
+            <a:endParaRPr lang="en-US" sz="1100" dirty="0">
+              <a:latin typeface="+mj-lt"/>
+            </a:endParaRPr>
           </a:p>
         </p:txBody>
       </p:sp>
@@ -9222,78 +9367,357 @@
       </p:grpSpPr>
       <p:pic>
         <p:nvPicPr>
-          <p:cNvPr id="2" name="Picture 2"/>
+          <p:cNvPr id="1026" name="Picture 2"/>
           <p:cNvPicPr>
             <a:picLocks noChangeAspect="1" noChangeArrowheads="1"/>
           </p:cNvPicPr>
           <p:nvPr/>
         </p:nvPicPr>
         <p:blipFill>
-          <a:blip r:embed="rId2">
-            <a:extLst>
-              <a:ext uri="{28A0092B-C50C-407E-A947-70E740481C1C}">
-                <a14:useLocalDpi xmlns:a14="http://schemas.microsoft.com/office/drawing/2010/main" val="0"/>
-              </a:ext>
-            </a:extLst>
-          </a:blip>
-          <a:srcRect/>
+          <a:blip r:embed="rId2" cstate="print"/>
+          <a:srcRect l="43339" t="21875" r="10981" b="16667"/>
           <a:stretch>
             <a:fillRect/>
           </a:stretch>
         </p:blipFill>
         <p:spPr bwMode="auto">
           <a:xfrm>
-            <a:off x="1773546" y="621265"/>
-            <a:ext cx="4855854" cy="4672614"/>
+            <a:off x="1869978" y="1048758"/>
+            <a:ext cx="5943600" cy="4495800"/>
           </a:xfrm>
           <a:prstGeom prst="rect">
             <a:avLst/>
           </a:prstGeom>
           <a:noFill/>
-          <a:ln>
+          <a:ln w="9525">
             <a:noFill/>
+            <a:miter lim="800000"/>
+            <a:headEnd/>
+            <a:tailEnd/>
           </a:ln>
-          <a:effectLst/>
-          <a:extLst>
-            <a:ext uri="{909E8E84-426E-40DD-AFC4-6F175D3DCCD1}">
-              <a14:hiddenFill xmlns:a14="http://schemas.microsoft.com/office/drawing/2010/main">
-                <a:solidFill>
-                  <a:schemeClr val="accent1"/>
-                </a:solidFill>
-              </a14:hiddenFill>
-            </a:ext>
-            <a:ext uri="{91240B29-F687-4F45-9708-019B960494DF}">
-              <a14:hiddenLine xmlns:a14="http://schemas.microsoft.com/office/drawing/2010/main" w="9525">
-                <a:solidFill>
-                  <a:schemeClr val="tx1"/>
-                </a:solidFill>
-                <a:miter lim="800000"/>
-                <a:headEnd/>
-                <a:tailEnd/>
-              </a14:hiddenLine>
-            </a:ext>
-            <a:ext uri="{AF507438-7753-43E0-B8FC-AC1667EBCBE1}">
-              <a14:hiddenEffects xmlns:a14="http://schemas.microsoft.com/office/drawing/2010/main">
-                <a:effectLst>
-                  <a:outerShdw dist="35921" dir="2700000" algn="ctr" rotWithShape="0">
-                    <a:schemeClr val="bg2"/>
-                  </a:outerShdw>
-                </a:effectLst>
-              </a14:hiddenEffects>
-            </a:ext>
-          </a:extLst>
         </p:spPr>
       </p:pic>
+      <p:sp>
+        <p:nvSpPr>
+          <p:cNvPr id="24" name="TextBox 23"/>
+          <p:cNvSpPr txBox="1"/>
+          <p:nvPr/>
+        </p:nvSpPr>
+        <p:spPr>
+          <a:xfrm>
+            <a:off x="1495561" y="4741311"/>
+            <a:ext cx="290464" cy="369332"/>
+          </a:xfrm>
+          <a:prstGeom prst="rect">
+            <a:avLst/>
+          </a:prstGeom>
+          <a:noFill/>
+        </p:spPr>
+        <p:txBody>
+          <a:bodyPr wrap="none" rtlCol="0">
+            <a:spAutoFit/>
+          </a:bodyPr>
+          <a:lstStyle/>
+          <a:p>
+            <a:r>
+              <a:rPr lang="en-US" dirty="0" smtClean="0">
+                <a:solidFill>
+                  <a:srgbClr val="FFC000"/>
+                </a:solidFill>
+              </a:rPr>
+              <a:t>F</a:t>
+            </a:r>
+            <a:endParaRPr lang="en-US" dirty="0">
+              <a:solidFill>
+                <a:srgbClr val="FFC000"/>
+              </a:solidFill>
+            </a:endParaRPr>
+          </a:p>
+        </p:txBody>
+      </p:sp>
+      <p:sp>
+        <p:nvSpPr>
+          <p:cNvPr id="26" name="TextBox 25"/>
+          <p:cNvSpPr txBox="1"/>
+          <p:nvPr/>
+        </p:nvSpPr>
+        <p:spPr>
+          <a:xfrm>
+            <a:off x="2223040" y="5559189"/>
+            <a:ext cx="381836" cy="369332"/>
+          </a:xfrm>
+          <a:prstGeom prst="rect">
+            <a:avLst/>
+          </a:prstGeom>
+          <a:noFill/>
+        </p:spPr>
+        <p:txBody>
+          <a:bodyPr wrap="none" rtlCol="0">
+            <a:spAutoFit/>
+          </a:bodyPr>
+          <a:lstStyle/>
+          <a:p>
+            <a:r>
+              <a:rPr lang="en-US" dirty="0">
+                <a:solidFill>
+                  <a:srgbClr val="FFC000"/>
+                </a:solidFill>
+              </a:rPr>
+              <a:t>M</a:t>
+            </a:r>
+          </a:p>
+        </p:txBody>
+      </p:sp>
       <p:cxnSp>
         <p:nvCxnSpPr>
-          <p:cNvPr id="36" name="Straight Arrow Connector 35"/>
+          <p:cNvPr id="35" name="Straight Arrow Connector 34"/>
           <p:cNvCxnSpPr/>
           <p:nvPr/>
         </p:nvCxnSpPr>
         <p:spPr>
-          <a:xfrm flipV="1">
-            <a:off x="5311140" y="624431"/>
-            <a:ext cx="0" cy="4567555"/>
+          <a:xfrm>
+            <a:off x="4835430" y="4191000"/>
+            <a:ext cx="0" cy="1752600"/>
+          </a:xfrm>
+          <a:prstGeom prst="straightConnector1">
+            <a:avLst/>
+          </a:prstGeom>
+          <a:ln>
+            <a:solidFill>
+              <a:schemeClr val="accent6">
+                <a:lumMod val="75000"/>
+              </a:schemeClr>
+            </a:solidFill>
+            <a:prstDash val="sysDot"/>
+            <a:headEnd type="none" w="med" len="med"/>
+            <a:tailEnd type="none" w="med" len="med"/>
+          </a:ln>
+        </p:spPr>
+        <p:style>
+          <a:lnRef idx="2">
+            <a:schemeClr val="accent2"/>
+          </a:lnRef>
+          <a:fillRef idx="0">
+            <a:schemeClr val="accent2"/>
+          </a:fillRef>
+          <a:effectRef idx="1">
+            <a:schemeClr val="accent2"/>
+          </a:effectRef>
+          <a:fontRef idx="minor">
+            <a:schemeClr val="tx1"/>
+          </a:fontRef>
+        </p:style>
+      </p:cxnSp>
+      <p:sp>
+        <p:nvSpPr>
+          <p:cNvPr id="38" name="Arc 37"/>
+          <p:cNvSpPr/>
+          <p:nvPr/>
+        </p:nvSpPr>
+        <p:spPr>
+          <a:xfrm flipH="1">
+            <a:off x="3908330" y="4506968"/>
+            <a:ext cx="1861184" cy="1752600"/>
+          </a:xfrm>
+          <a:prstGeom prst="arc">
+            <a:avLst>
+              <a:gd name="adj1" fmla="val 16200000"/>
+              <a:gd name="adj2" fmla="val 20370779"/>
+            </a:avLst>
+          </a:prstGeom>
+          <a:ln>
+            <a:solidFill>
+              <a:schemeClr val="accent6">
+                <a:lumMod val="75000"/>
+              </a:schemeClr>
+            </a:solidFill>
+            <a:prstDash val="sysDot"/>
+            <a:tailEnd type="arrow"/>
+          </a:ln>
+        </p:spPr>
+        <p:style>
+          <a:lnRef idx="2">
+            <a:schemeClr val="accent2"/>
+          </a:lnRef>
+          <a:fillRef idx="0">
+            <a:schemeClr val="accent2"/>
+          </a:fillRef>
+          <a:effectRef idx="1">
+            <a:schemeClr val="accent2"/>
+          </a:effectRef>
+          <a:fontRef idx="minor">
+            <a:schemeClr val="tx1"/>
+          </a:fontRef>
+        </p:style>
+        <p:txBody>
+          <a:bodyPr rtlCol="0" anchor="ctr"/>
+          <a:lstStyle/>
+          <a:p>
+            <a:pPr algn="ctr"/>
+            <a:endParaRPr lang="en-CA"/>
+          </a:p>
+        </p:txBody>
+      </p:sp>
+      <p:sp>
+        <p:nvSpPr>
+          <p:cNvPr id="39" name="Arc 38"/>
+          <p:cNvSpPr/>
+          <p:nvPr/>
+        </p:nvSpPr>
+        <p:spPr>
+          <a:xfrm>
+            <a:off x="3968972" y="4367268"/>
+            <a:ext cx="1780858" cy="1981200"/>
+          </a:xfrm>
+          <a:prstGeom prst="arc">
+            <a:avLst>
+              <a:gd name="adj1" fmla="val 16200000"/>
+              <a:gd name="adj2" fmla="val 20370779"/>
+            </a:avLst>
+          </a:prstGeom>
+          <a:ln>
+            <a:solidFill>
+              <a:schemeClr val="accent6">
+                <a:lumMod val="75000"/>
+              </a:schemeClr>
+            </a:solidFill>
+            <a:prstDash val="sysDot"/>
+            <a:tailEnd type="arrow"/>
+          </a:ln>
+        </p:spPr>
+        <p:style>
+          <a:lnRef idx="2">
+            <a:schemeClr val="accent2"/>
+          </a:lnRef>
+          <a:fillRef idx="0">
+            <a:schemeClr val="accent2"/>
+          </a:fillRef>
+          <a:effectRef idx="1">
+            <a:schemeClr val="accent2"/>
+          </a:effectRef>
+          <a:fontRef idx="minor">
+            <a:schemeClr val="tx1"/>
+          </a:fontRef>
+        </p:style>
+        <p:txBody>
+          <a:bodyPr rtlCol="0" anchor="ctr"/>
+          <a:lstStyle/>
+          <a:p>
+            <a:pPr algn="ctr"/>
+            <a:endParaRPr lang="en-CA"/>
+          </a:p>
+        </p:txBody>
+      </p:sp>
+      <p:sp>
+        <p:nvSpPr>
+          <p:cNvPr id="40" name="TextBox 39"/>
+          <p:cNvSpPr txBox="1"/>
+          <p:nvPr/>
+        </p:nvSpPr>
+        <p:spPr>
+          <a:xfrm>
+            <a:off x="2168430" y="4210108"/>
+            <a:ext cx="2232855" cy="369332"/>
+          </a:xfrm>
+          <a:prstGeom prst="rect">
+            <a:avLst/>
+          </a:prstGeom>
+          <a:noFill/>
+        </p:spPr>
+        <p:txBody>
+          <a:bodyPr wrap="none" rtlCol="0">
+            <a:spAutoFit/>
+          </a:bodyPr>
+          <a:lstStyle/>
+          <a:p>
+            <a:r>
+              <a:rPr lang="en-US" dirty="0" err="1">
+                <a:solidFill>
+                  <a:srgbClr val="FFC000"/>
+                </a:solidFill>
+              </a:rPr>
+              <a:t>ThetaStartDeg</a:t>
+            </a:r>
+            <a:r>
+              <a:rPr lang="en-US" dirty="0">
+                <a:solidFill>
+                  <a:srgbClr val="FFC000"/>
+                </a:solidFill>
+              </a:rPr>
+              <a:t> </a:t>
+            </a:r>
+            <a:r>
+              <a:rPr lang="en-US" dirty="0" smtClean="0">
+                <a:solidFill>
+                  <a:srgbClr val="FFC000"/>
+                </a:solidFill>
+              </a:rPr>
+              <a:t>= -60.0</a:t>
+            </a:r>
+            <a:endParaRPr lang="en-US" dirty="0">
+              <a:solidFill>
+                <a:srgbClr val="FFC000"/>
+              </a:solidFill>
+            </a:endParaRPr>
+          </a:p>
+        </p:txBody>
+      </p:sp>
+      <p:sp>
+        <p:nvSpPr>
+          <p:cNvPr id="41" name="TextBox 40"/>
+          <p:cNvSpPr txBox="1"/>
+          <p:nvPr/>
+        </p:nvSpPr>
+        <p:spPr>
+          <a:xfrm>
+            <a:off x="5140230" y="4057708"/>
+            <a:ext cx="2138855" cy="369332"/>
+          </a:xfrm>
+          <a:prstGeom prst="rect">
+            <a:avLst/>
+          </a:prstGeom>
+          <a:noFill/>
+        </p:spPr>
+        <p:txBody>
+          <a:bodyPr wrap="none" rtlCol="0">
+            <a:spAutoFit/>
+          </a:bodyPr>
+          <a:lstStyle/>
+          <a:p>
+            <a:r>
+              <a:rPr lang="en-US" dirty="0" err="1" smtClean="0">
+                <a:solidFill>
+                  <a:srgbClr val="FFC000"/>
+                </a:solidFill>
+              </a:rPr>
+              <a:t>ThetaStopDeg</a:t>
+            </a:r>
+            <a:r>
+              <a:rPr lang="en-US" dirty="0" smtClean="0">
+                <a:solidFill>
+                  <a:srgbClr val="FFC000"/>
+                </a:solidFill>
+              </a:rPr>
+              <a:t> = 60.0</a:t>
+            </a:r>
+            <a:endParaRPr lang="en-US" dirty="0">
+              <a:solidFill>
+                <a:srgbClr val="FFC000"/>
+              </a:solidFill>
+            </a:endParaRPr>
+          </a:p>
+        </p:txBody>
+      </p:sp>
+      <p:cxnSp>
+        <p:nvCxnSpPr>
+          <p:cNvPr id="42" name="Straight Arrow Connector 41"/>
+          <p:cNvCxnSpPr/>
+          <p:nvPr/>
+        </p:nvCxnSpPr>
+        <p:spPr>
+          <a:xfrm flipH="1">
+            <a:off x="4832253" y="4749221"/>
+            <a:ext cx="4001137" cy="489579"/>
           </a:xfrm>
           <a:prstGeom prst="straightConnector1">
             <a:avLst/>
@@ -9326,14 +9750,14 @@
       </p:cxnSp>
       <p:sp>
         <p:nvSpPr>
-          <p:cNvPr id="44" name="TextBox 43"/>
+          <p:cNvPr id="49" name="TextBox 48"/>
           <p:cNvSpPr txBox="1"/>
           <p:nvPr/>
         </p:nvSpPr>
         <p:spPr>
           <a:xfrm>
-            <a:off x="4057650" y="2372169"/>
-            <a:ext cx="2253246" cy="338554"/>
+            <a:off x="6596920" y="4931386"/>
+            <a:ext cx="2242280" cy="369332"/>
           </a:xfrm>
           <a:prstGeom prst="rect">
             <a:avLst/>
@@ -9347,133 +9771,20 @@
           <a:lstStyle/>
           <a:p>
             <a:r>
-              <a:rPr lang="hu-HU" sz="1600" dirty="0" smtClean="0">
+              <a:rPr lang="en-US" dirty="0" err="1" smtClean="0">
                 <a:solidFill>
                   <a:srgbClr val="FFC000"/>
                 </a:solidFill>
               </a:rPr>
-              <a:t>ImagingDepthMm </a:t>
-            </a:r>
-            <a:r>
-              <a:rPr lang="en-CA" sz="1600" dirty="0" smtClean="0">
+              <a:t>RadiusStopMm</a:t>
+            </a:r>
+            <a:r>
+              <a:rPr lang="en-US" dirty="0" smtClean="0">
                 <a:solidFill>
                   <a:srgbClr val="FFC000"/>
                 </a:solidFill>
               </a:rPr>
-              <a:t>= 55.0</a:t>
-            </a:r>
-            <a:endParaRPr lang="en-US" sz="1600" dirty="0">
-              <a:solidFill>
-                <a:srgbClr val="FFC000"/>
-              </a:solidFill>
-            </a:endParaRPr>
-          </a:p>
-        </p:txBody>
-      </p:sp>
-      <p:sp>
-        <p:nvSpPr>
-          <p:cNvPr id="28" name="TextBox 27"/>
-          <p:cNvSpPr txBox="1"/>
-          <p:nvPr/>
-        </p:nvSpPr>
-        <p:spPr>
-          <a:xfrm>
-            <a:off x="114164" y="0"/>
-            <a:ext cx="8877436" cy="400110"/>
-          </a:xfrm>
-          <a:prstGeom prst="rect">
-            <a:avLst/>
-          </a:prstGeom>
-          <a:noFill/>
-        </p:spPr>
-        <p:txBody>
-          <a:bodyPr wrap="square" rtlCol="0">
-            <a:spAutoFit/>
-          </a:bodyPr>
-          <a:lstStyle/>
-          <a:p>
-            <a:pPr marL="342900" indent="-342900" algn="ctr"/>
-            <a:r>
-              <a:rPr lang="en-US" sz="2000" b="1" dirty="0"/>
-              <a:t>Defining the transducer geometry for RF scan conversion - </a:t>
-            </a:r>
-            <a:r>
-              <a:rPr lang="en-US" sz="2000" b="1" dirty="0" smtClean="0"/>
-              <a:t>linear </a:t>
-            </a:r>
-            <a:r>
-              <a:rPr lang="en-US" sz="2000" b="1" dirty="0"/>
-              <a:t>transducer</a:t>
-            </a:r>
-            <a:endParaRPr lang="en-US" b="1" dirty="0"/>
-          </a:p>
-        </p:txBody>
-      </p:sp>
-      <p:sp>
-        <p:nvSpPr>
-          <p:cNvPr id="29" name="Rectangle 28"/>
-          <p:cNvSpPr/>
-          <p:nvPr/>
-        </p:nvSpPr>
-        <p:spPr>
-          <a:xfrm>
-            <a:off x="3088839" y="5966460"/>
-            <a:ext cx="3240824" cy="369332"/>
-          </a:xfrm>
-          <a:prstGeom prst="rect">
-            <a:avLst/>
-          </a:prstGeom>
-        </p:spPr>
-        <p:txBody>
-          <a:bodyPr wrap="none">
-            <a:spAutoFit/>
-          </a:bodyPr>
-          <a:lstStyle/>
-          <a:p>
-            <a:r>
-              <a:rPr lang="en-CA" dirty="0"/>
-              <a:t> </a:t>
-            </a:r>
-            <a:r>
-              <a:rPr lang="en-CA" dirty="0" err="1"/>
-              <a:t>TransducerGeometry</a:t>
-            </a:r>
-            <a:r>
-              <a:rPr lang="en-CA" dirty="0"/>
-              <a:t>="LINEAR" </a:t>
-            </a:r>
-          </a:p>
-        </p:txBody>
-      </p:sp>
-      <p:sp>
-        <p:nvSpPr>
-          <p:cNvPr id="30" name="TextBox 29"/>
-          <p:cNvSpPr txBox="1"/>
-          <p:nvPr/>
-        </p:nvSpPr>
-        <p:spPr>
-          <a:xfrm>
-            <a:off x="1402322" y="969791"/>
-            <a:ext cx="290464" cy="369332"/>
-          </a:xfrm>
-          <a:prstGeom prst="rect">
-            <a:avLst/>
-          </a:prstGeom>
-          <a:noFill/>
-        </p:spPr>
-        <p:txBody>
-          <a:bodyPr wrap="none" rtlCol="0">
-            <a:spAutoFit/>
-          </a:bodyPr>
-          <a:lstStyle/>
-          <a:p>
-            <a:r>
-              <a:rPr lang="en-US" dirty="0" smtClean="0">
-                <a:solidFill>
-                  <a:srgbClr val="FFC000"/>
-                </a:solidFill>
-              </a:rPr>
-              <a:t>F</a:t>
+              <a:t> = 82.0</a:t>
             </a:r>
             <a:endParaRPr lang="en-US" dirty="0">
               <a:solidFill>
@@ -9483,48 +9794,15 @@
           </a:p>
         </p:txBody>
       </p:sp>
-      <p:sp>
-        <p:nvSpPr>
-          <p:cNvPr id="33" name="TextBox 32"/>
-          <p:cNvSpPr txBox="1"/>
-          <p:nvPr/>
-        </p:nvSpPr>
-        <p:spPr>
-          <a:xfrm>
-            <a:off x="2129801" y="272323"/>
-            <a:ext cx="381836" cy="369332"/>
-          </a:xfrm>
-          <a:prstGeom prst="rect">
-            <a:avLst/>
-          </a:prstGeom>
-          <a:noFill/>
-        </p:spPr>
-        <p:txBody>
-          <a:bodyPr wrap="none" rtlCol="0">
-            <a:spAutoFit/>
-          </a:bodyPr>
-          <a:lstStyle/>
-          <a:p>
-            <a:r>
-              <a:rPr lang="en-US" dirty="0">
-                <a:solidFill>
-                  <a:srgbClr val="FFC000"/>
-                </a:solidFill>
-              </a:rPr>
-              <a:t>M</a:t>
-            </a:r>
-          </a:p>
-        </p:txBody>
-      </p:sp>
       <p:cxnSp>
         <p:nvCxnSpPr>
-          <p:cNvPr id="34" name="Straight Arrow Connector 33"/>
+          <p:cNvPr id="31" name="Straight Arrow Connector 30"/>
           <p:cNvCxnSpPr/>
           <p:nvPr/>
         </p:nvCxnSpPr>
         <p:spPr>
           <a:xfrm flipV="1">
-            <a:off x="1757691" y="622843"/>
+            <a:off x="1850930" y="5544558"/>
             <a:ext cx="685800" cy="1588"/>
           </a:xfrm>
           <a:prstGeom prst="straightConnector1">
@@ -9566,14 +9844,14 @@
       </p:cxnSp>
       <p:cxnSp>
         <p:nvCxnSpPr>
-          <p:cNvPr id="35" name="Straight Arrow Connector 34"/>
+          <p:cNvPr id="32" name="Straight Arrow Connector 31"/>
           <p:cNvCxnSpPr/>
           <p:nvPr/>
         </p:nvCxnSpPr>
         <p:spPr>
-          <a:xfrm>
-            <a:off x="1757691" y="621265"/>
-            <a:ext cx="0" cy="609392"/>
+          <a:xfrm flipV="1">
+            <a:off x="1850930" y="4858758"/>
+            <a:ext cx="0" cy="685800"/>
           </a:xfrm>
           <a:prstGeom prst="straightConnector1">
             <a:avLst/>
@@ -9614,13 +9892,13 @@
       </p:cxnSp>
       <p:sp>
         <p:nvSpPr>
-          <p:cNvPr id="37" name="TextBox 36"/>
+          <p:cNvPr id="45" name="TextBox 44"/>
           <p:cNvSpPr txBox="1"/>
           <p:nvPr/>
         </p:nvSpPr>
         <p:spPr>
           <a:xfrm>
-            <a:off x="1139201" y="348523"/>
+            <a:off x="1266730" y="5498068"/>
             <a:ext cx="677439" cy="369332"/>
           </a:xfrm>
           <a:prstGeom prst="rect">
@@ -9651,16 +9929,317 @@
           </a:p>
         </p:txBody>
       </p:sp>
+      <p:sp>
+        <p:nvSpPr>
+          <p:cNvPr id="27" name="TextBox 26"/>
+          <p:cNvSpPr txBox="1"/>
+          <p:nvPr/>
+        </p:nvSpPr>
+        <p:spPr>
+          <a:xfrm>
+            <a:off x="114164" y="108677"/>
+            <a:ext cx="8877436" cy="400110"/>
+          </a:xfrm>
+          <a:prstGeom prst="rect">
+            <a:avLst/>
+          </a:prstGeom>
+          <a:noFill/>
+        </p:spPr>
+        <p:txBody>
+          <a:bodyPr wrap="square" rtlCol="0">
+            <a:spAutoFit/>
+          </a:bodyPr>
+          <a:lstStyle/>
+          <a:p>
+            <a:pPr marL="342900" indent="-342900" algn="ctr"/>
+            <a:r>
+              <a:rPr lang="en-US" sz="2000" b="1" dirty="0" smtClean="0">
+                <a:latin typeface="+mj-lt"/>
+              </a:rPr>
+              <a:t>Defining the transducer geometry for RF scan conversion - curvilinear transducer</a:t>
+            </a:r>
+            <a:endParaRPr lang="en-US" b="1" dirty="0">
+              <a:latin typeface="+mj-lt"/>
+            </a:endParaRPr>
+          </a:p>
+        </p:txBody>
+      </p:sp>
+      <p:sp>
+        <p:nvSpPr>
+          <p:cNvPr id="3" name="Arc 2"/>
+          <p:cNvSpPr/>
+          <p:nvPr/>
+        </p:nvSpPr>
+        <p:spPr>
+          <a:xfrm>
+            <a:off x="4378230" y="4811133"/>
+            <a:ext cx="927100" cy="830519"/>
+          </a:xfrm>
+          <a:prstGeom prst="arc">
+            <a:avLst>
+              <a:gd name="adj1" fmla="val 11166951"/>
+              <a:gd name="adj2" fmla="val 21093506"/>
+            </a:avLst>
+          </a:prstGeom>
+          <a:noFill/>
+          <a:ln>
+            <a:solidFill>
+              <a:srgbClr val="FF0000"/>
+            </a:solidFill>
+          </a:ln>
+        </p:spPr>
+        <p:style>
+          <a:lnRef idx="2">
+            <a:schemeClr val="accent1">
+              <a:shade val="50000"/>
+            </a:schemeClr>
+          </a:lnRef>
+          <a:fillRef idx="1">
+            <a:schemeClr val="accent1"/>
+          </a:fillRef>
+          <a:effectRef idx="0">
+            <a:schemeClr val="accent1"/>
+          </a:effectRef>
+          <a:fontRef idx="minor">
+            <a:schemeClr val="lt1"/>
+          </a:fontRef>
+        </p:style>
+        <p:txBody>
+          <a:bodyPr rtlCol="0" anchor="ctr"/>
+          <a:lstStyle/>
+          <a:p>
+            <a:pPr algn="ctr"/>
+            <a:endParaRPr lang="en-CA"/>
+          </a:p>
+        </p:txBody>
+      </p:sp>
+      <p:sp>
+        <p:nvSpPr>
+          <p:cNvPr id="29" name="Arc 28"/>
+          <p:cNvSpPr/>
+          <p:nvPr/>
+        </p:nvSpPr>
+        <p:spPr>
+          <a:xfrm>
+            <a:off x="852710" y="1380228"/>
+            <a:ext cx="7980680" cy="7657092"/>
+          </a:xfrm>
+          <a:prstGeom prst="arc">
+            <a:avLst>
+              <a:gd name="adj1" fmla="val 11396617"/>
+              <a:gd name="adj2" fmla="val 21171246"/>
+            </a:avLst>
+          </a:prstGeom>
+          <a:noFill/>
+          <a:ln>
+            <a:solidFill>
+              <a:srgbClr val="FF0000"/>
+            </a:solidFill>
+          </a:ln>
+        </p:spPr>
+        <p:style>
+          <a:lnRef idx="2">
+            <a:schemeClr val="accent1">
+              <a:shade val="50000"/>
+            </a:schemeClr>
+          </a:lnRef>
+          <a:fillRef idx="1">
+            <a:schemeClr val="accent1"/>
+          </a:fillRef>
+          <a:effectRef idx="0">
+            <a:schemeClr val="accent1"/>
+          </a:effectRef>
+          <a:fontRef idx="minor">
+            <a:schemeClr val="lt1"/>
+          </a:fontRef>
+        </p:style>
+        <p:txBody>
+          <a:bodyPr rtlCol="0" anchor="ctr"/>
+          <a:lstStyle/>
+          <a:p>
+            <a:pPr algn="ctr"/>
+            <a:endParaRPr lang="en-CA"/>
+          </a:p>
+        </p:txBody>
+      </p:sp>
       <p:cxnSp>
         <p:nvCxnSpPr>
-          <p:cNvPr id="38" name="Straight Arrow Connector 37"/>
+          <p:cNvPr id="7" name="Straight Connector 6"/>
+          <p:cNvCxnSpPr>
+            <a:stCxn id="29" idx="0"/>
+            <a:endCxn id="3" idx="0"/>
+          </p:cNvCxnSpPr>
+          <p:nvPr/>
+        </p:nvCxnSpPr>
+        <p:spPr>
+          <a:xfrm>
+            <a:off x="917700" y="4520611"/>
+            <a:ext cx="3463811" cy="656464"/>
+          </a:xfrm>
+          <a:prstGeom prst="line">
+            <a:avLst/>
+          </a:prstGeom>
+          <a:noFill/>
+          <a:ln>
+            <a:solidFill>
+              <a:srgbClr val="FF0000"/>
+            </a:solidFill>
+          </a:ln>
+        </p:spPr>
+        <p:style>
+          <a:lnRef idx="2">
+            <a:schemeClr val="accent1">
+              <a:shade val="50000"/>
+            </a:schemeClr>
+          </a:lnRef>
+          <a:fillRef idx="1">
+            <a:schemeClr val="accent1"/>
+          </a:fillRef>
+          <a:effectRef idx="0">
+            <a:schemeClr val="accent1"/>
+          </a:effectRef>
+          <a:fontRef idx="minor">
+            <a:schemeClr val="lt1"/>
+          </a:fontRef>
+        </p:style>
+      </p:cxnSp>
+      <p:cxnSp>
+        <p:nvCxnSpPr>
+          <p:cNvPr id="36" name="Straight Connector 35"/>
+          <p:cNvCxnSpPr>
+            <a:stCxn id="3" idx="2"/>
+            <a:endCxn id="29" idx="2"/>
+          </p:cNvCxnSpPr>
+          <p:nvPr/>
+        </p:nvCxnSpPr>
+        <p:spPr>
+          <a:xfrm flipV="1">
+            <a:off x="5299097" y="4712721"/>
+            <a:ext cx="3500657" cy="445802"/>
+          </a:xfrm>
+          <a:prstGeom prst="line">
+            <a:avLst/>
+          </a:prstGeom>
+          <a:noFill/>
+          <a:ln>
+            <a:solidFill>
+              <a:srgbClr val="FF0000"/>
+            </a:solidFill>
+          </a:ln>
+        </p:spPr>
+        <p:style>
+          <a:lnRef idx="2">
+            <a:schemeClr val="accent1">
+              <a:shade val="50000"/>
+            </a:schemeClr>
+          </a:lnRef>
+          <a:fillRef idx="1">
+            <a:schemeClr val="accent1"/>
+          </a:fillRef>
+          <a:effectRef idx="0">
+            <a:schemeClr val="accent1"/>
+          </a:effectRef>
+          <a:fontRef idx="minor">
+            <a:schemeClr val="lt1"/>
+          </a:fontRef>
+        </p:style>
+      </p:cxnSp>
+      <p:cxnSp>
+        <p:nvCxnSpPr>
+          <p:cNvPr id="43" name="Straight Arrow Connector 42"/>
           <p:cNvCxnSpPr/>
           <p:nvPr/>
         </p:nvCxnSpPr>
         <p:spPr>
+          <a:xfrm flipV="1">
+            <a:off x="4849875" y="5305481"/>
+            <a:ext cx="498318" cy="49892"/>
+          </a:xfrm>
+          <a:prstGeom prst="straightConnector1">
+            <a:avLst/>
+          </a:prstGeom>
+          <a:ln>
+            <a:solidFill>
+              <a:schemeClr val="accent6">
+                <a:lumMod val="75000"/>
+              </a:schemeClr>
+            </a:solidFill>
+            <a:prstDash val="sysDot"/>
+            <a:headEnd type="arrow" w="med" len="med"/>
+            <a:tailEnd type="arrow" w="med" len="med"/>
+          </a:ln>
+        </p:spPr>
+        <p:style>
+          <a:lnRef idx="2">
+            <a:schemeClr val="accent2"/>
+          </a:lnRef>
+          <a:fillRef idx="0">
+            <a:schemeClr val="accent2"/>
+          </a:fillRef>
+          <a:effectRef idx="1">
+            <a:schemeClr val="accent2"/>
+          </a:effectRef>
+          <a:fontRef idx="minor">
+            <a:schemeClr val="tx1"/>
+          </a:fontRef>
+        </p:style>
+      </p:cxnSp>
+      <p:sp>
+        <p:nvSpPr>
+          <p:cNvPr id="44" name="TextBox 43"/>
+          <p:cNvSpPr txBox="1"/>
+          <p:nvPr/>
+        </p:nvSpPr>
+        <p:spPr>
+          <a:xfrm>
+            <a:off x="5009352" y="5247616"/>
+            <a:ext cx="2265748" cy="369332"/>
+          </a:xfrm>
+          <a:prstGeom prst="rect">
+            <a:avLst/>
+          </a:prstGeom>
+          <a:noFill/>
+        </p:spPr>
+        <p:txBody>
+          <a:bodyPr wrap="none" rtlCol="0">
+            <a:spAutoFit/>
+          </a:bodyPr>
+          <a:lstStyle/>
+          <a:p>
+            <a:r>
+              <a:rPr lang="en-US" dirty="0" err="1" smtClean="0">
+                <a:solidFill>
+                  <a:srgbClr val="FFC000"/>
+                </a:solidFill>
+              </a:rPr>
+              <a:t>RadiusStartMm</a:t>
+            </a:r>
+            <a:r>
+              <a:rPr lang="en-US" dirty="0" smtClean="0">
+                <a:solidFill>
+                  <a:srgbClr val="FFC000"/>
+                </a:solidFill>
+              </a:rPr>
+              <a:t> = 10.0</a:t>
+            </a:r>
+            <a:endParaRPr lang="en-US" dirty="0">
+              <a:solidFill>
+                <a:srgbClr val="FFC000"/>
+              </a:solidFill>
+            </a:endParaRPr>
+          </a:p>
+        </p:txBody>
+      </p:sp>
+      <p:cxnSp>
+        <p:nvCxnSpPr>
+          <p:cNvPr id="48" name="Straight Arrow Connector 47"/>
+          <p:cNvCxnSpPr/>
+          <p:nvPr/>
+        </p:nvCxnSpPr>
+        <p:spPr>
           <a:xfrm flipH="1">
-            <a:off x="4655820" y="5191033"/>
-            <a:ext cx="723900" cy="0"/>
+            <a:off x="1405890" y="4800600"/>
+            <a:ext cx="3442242" cy="9644"/>
           </a:xfrm>
           <a:prstGeom prst="straightConnector1">
             <a:avLst/>
@@ -9693,14 +10272,14 @@
       </p:cxnSp>
       <p:cxnSp>
         <p:nvCxnSpPr>
-          <p:cNvPr id="39" name="Straight Arrow Connector 38"/>
+          <p:cNvPr id="64" name="Straight Arrow Connector 63"/>
           <p:cNvCxnSpPr/>
           <p:nvPr/>
         </p:nvCxnSpPr>
         <p:spPr>
           <a:xfrm flipH="1">
-            <a:off x="5644036" y="5293879"/>
-            <a:ext cx="1442565" cy="0"/>
+            <a:off x="3400330" y="5544558"/>
+            <a:ext cx="1447800" cy="0"/>
           </a:xfrm>
           <a:prstGeom prst="straightConnector1">
             <a:avLst/>
@@ -9733,14 +10312,573 @@
       </p:cxnSp>
       <p:cxnSp>
         <p:nvCxnSpPr>
-          <p:cNvPr id="40" name="Straight Arrow Connector 39"/>
+          <p:cNvPr id="65" name="Straight Arrow Connector 64"/>
           <p:cNvCxnSpPr/>
           <p:nvPr/>
         </p:nvCxnSpPr>
         <p:spPr>
+          <a:xfrm flipV="1">
+            <a:off x="1405890" y="4811133"/>
+            <a:ext cx="0" cy="712154"/>
+          </a:xfrm>
+          <a:prstGeom prst="straightConnector1">
+            <a:avLst/>
+          </a:prstGeom>
+          <a:ln>
+            <a:solidFill>
+              <a:schemeClr val="accent6">
+                <a:lumMod val="75000"/>
+              </a:schemeClr>
+            </a:solidFill>
+            <a:prstDash val="sysDot"/>
+            <a:headEnd type="none" w="med" len="med"/>
+            <a:tailEnd type="arrow" w="med" len="med"/>
+          </a:ln>
+        </p:spPr>
+        <p:style>
+          <a:lnRef idx="2">
+            <a:schemeClr val="accent2"/>
+          </a:lnRef>
+          <a:fillRef idx="0">
+            <a:schemeClr val="accent2"/>
+          </a:fillRef>
+          <a:effectRef idx="1">
+            <a:schemeClr val="accent2"/>
+          </a:effectRef>
+          <a:fontRef idx="minor">
+            <a:schemeClr val="tx1"/>
+          </a:fontRef>
+        </p:style>
+      </p:cxnSp>
+      <p:sp>
+        <p:nvSpPr>
+          <p:cNvPr id="67" name="TextBox 66"/>
+          <p:cNvSpPr txBox="1"/>
+          <p:nvPr/>
+        </p:nvSpPr>
+        <p:spPr>
+          <a:xfrm>
+            <a:off x="171489" y="4979313"/>
+            <a:ext cx="1276311" cy="430887"/>
+          </a:xfrm>
+          <a:prstGeom prst="rect">
+            <a:avLst/>
+          </a:prstGeom>
+          <a:noFill/>
+        </p:spPr>
+        <p:txBody>
+          <a:bodyPr wrap="none" rtlCol="0">
+            <a:spAutoFit/>
+          </a:bodyPr>
+          <a:lstStyle/>
+          <a:p>
+            <a:r>
+              <a:rPr lang="en-US" sz="1100" dirty="0" smtClean="0">
+                <a:solidFill>
+                  <a:srgbClr val="FFC000"/>
+                </a:solidFill>
+              </a:rPr>
+              <a:t>Transducer</a:t>
+            </a:r>
+            <a:br>
+              <a:rPr lang="en-US" sz="1100" dirty="0" smtClean="0">
+                <a:solidFill>
+                  <a:srgbClr val="FFC000"/>
+                </a:solidFill>
+              </a:rPr>
+            </a:br>
+            <a:r>
+              <a:rPr lang="en-US" sz="1100" dirty="0" err="1" smtClean="0">
+                <a:solidFill>
+                  <a:srgbClr val="FFC000"/>
+                </a:solidFill>
+              </a:rPr>
+              <a:t>CenterPixel</a:t>
+            </a:r>
+            <a:r>
+              <a:rPr lang="en-US" sz="1100" dirty="0" smtClean="0">
+                <a:solidFill>
+                  <a:srgbClr val="FFC000"/>
+                </a:solidFill>
+              </a:rPr>
+              <a:t>[1] </a:t>
+            </a:r>
+            <a:r>
+              <a:rPr lang="en-US" sz="1100" dirty="0" smtClean="0">
+                <a:solidFill>
+                  <a:srgbClr val="FFC000"/>
+                </a:solidFill>
+              </a:rPr>
+              <a:t>= </a:t>
+            </a:r>
+            <a:r>
+              <a:rPr lang="en-US" sz="1100" dirty="0" smtClean="0">
+                <a:solidFill>
+                  <a:srgbClr val="FFC000"/>
+                </a:solidFill>
+              </a:rPr>
+              <a:t>53</a:t>
+            </a:r>
+            <a:endParaRPr lang="en-US" sz="1100" dirty="0">
+              <a:solidFill>
+                <a:srgbClr val="FFC000"/>
+              </a:solidFill>
+            </a:endParaRPr>
+          </a:p>
+        </p:txBody>
+      </p:sp>
+      <p:cxnSp>
+        <p:nvCxnSpPr>
+          <p:cNvPr id="68" name="Straight Arrow Connector 67"/>
+          <p:cNvCxnSpPr/>
+          <p:nvPr/>
+        </p:nvCxnSpPr>
+        <p:spPr>
+          <a:xfrm flipV="1">
+            <a:off x="1758220" y="1048758"/>
+            <a:ext cx="0" cy="4493305"/>
+          </a:xfrm>
+          <a:prstGeom prst="straightConnector1">
+            <a:avLst/>
+          </a:prstGeom>
+          <a:ln>
+            <a:solidFill>
+              <a:schemeClr val="accent6">
+                <a:lumMod val="75000"/>
+              </a:schemeClr>
+            </a:solidFill>
+            <a:prstDash val="sysDot"/>
+            <a:headEnd type="arrow" w="med" len="med"/>
+            <a:tailEnd type="arrow" w="med" len="med"/>
+          </a:ln>
+        </p:spPr>
+        <p:style>
+          <a:lnRef idx="2">
+            <a:schemeClr val="accent2"/>
+          </a:lnRef>
+          <a:fillRef idx="0">
+            <a:schemeClr val="accent2"/>
+          </a:fillRef>
+          <a:effectRef idx="1">
+            <a:schemeClr val="accent2"/>
+          </a:effectRef>
+          <a:fontRef idx="minor">
+            <a:schemeClr val="tx1"/>
+          </a:fontRef>
+        </p:style>
+      </p:cxnSp>
+      <p:sp>
+        <p:nvSpPr>
+          <p:cNvPr id="70" name="TextBox 69"/>
+          <p:cNvSpPr txBox="1"/>
+          <p:nvPr/>
+        </p:nvSpPr>
+        <p:spPr>
+          <a:xfrm>
+            <a:off x="405670" y="1344988"/>
+            <a:ext cx="2949462" cy="369332"/>
+          </a:xfrm>
+          <a:prstGeom prst="rect">
+            <a:avLst/>
+          </a:prstGeom>
+          <a:noFill/>
+        </p:spPr>
+        <p:txBody>
+          <a:bodyPr wrap="none" rtlCol="0">
+            <a:spAutoFit/>
+          </a:bodyPr>
+          <a:lstStyle/>
+          <a:p>
+            <a:r>
+              <a:rPr lang="en-US" dirty="0" err="1" smtClean="0">
+                <a:solidFill>
+                  <a:srgbClr val="FFC000"/>
+                </a:solidFill>
+              </a:rPr>
+              <a:t>OutputImageSizePixel</a:t>
+            </a:r>
+            <a:r>
+              <a:rPr lang="en-US" dirty="0" smtClean="0">
+                <a:solidFill>
+                  <a:srgbClr val="FFC000"/>
+                </a:solidFill>
+              </a:rPr>
+              <a:t>[1]=616</a:t>
+            </a:r>
+            <a:endParaRPr lang="en-US" dirty="0">
+              <a:solidFill>
+                <a:srgbClr val="FFC000"/>
+              </a:solidFill>
+            </a:endParaRPr>
+          </a:p>
+        </p:txBody>
+      </p:sp>
+      <p:cxnSp>
+        <p:nvCxnSpPr>
+          <p:cNvPr id="71" name="Straight Arrow Connector 70"/>
+          <p:cNvCxnSpPr/>
+          <p:nvPr/>
+        </p:nvCxnSpPr>
+        <p:spPr>
           <a:xfrm flipH="1">
-            <a:off x="3078480" y="622843"/>
-            <a:ext cx="4008120" cy="0"/>
+            <a:off x="1867970" y="943086"/>
+            <a:ext cx="5945608" cy="1"/>
+          </a:xfrm>
+          <a:prstGeom prst="straightConnector1">
+            <a:avLst/>
+          </a:prstGeom>
+          <a:ln>
+            <a:solidFill>
+              <a:schemeClr val="accent6">
+                <a:lumMod val="75000"/>
+              </a:schemeClr>
+            </a:solidFill>
+            <a:prstDash val="sysDot"/>
+            <a:headEnd type="arrow" w="med" len="med"/>
+            <a:tailEnd type="arrow" w="med" len="med"/>
+          </a:ln>
+        </p:spPr>
+        <p:style>
+          <a:lnRef idx="2">
+            <a:schemeClr val="accent2"/>
+          </a:lnRef>
+          <a:fillRef idx="0">
+            <a:schemeClr val="accent2"/>
+          </a:fillRef>
+          <a:effectRef idx="1">
+            <a:schemeClr val="accent2"/>
+          </a:effectRef>
+          <a:fontRef idx="minor">
+            <a:schemeClr val="tx1"/>
+          </a:fontRef>
+        </p:style>
+      </p:cxnSp>
+      <p:sp>
+        <p:nvSpPr>
+          <p:cNvPr id="74" name="TextBox 73"/>
+          <p:cNvSpPr txBox="1"/>
+          <p:nvPr/>
+        </p:nvSpPr>
+        <p:spPr>
+          <a:xfrm>
+            <a:off x="2133600" y="584947"/>
+            <a:ext cx="2949462" cy="369332"/>
+          </a:xfrm>
+          <a:prstGeom prst="rect">
+            <a:avLst/>
+          </a:prstGeom>
+          <a:noFill/>
+        </p:spPr>
+        <p:txBody>
+          <a:bodyPr wrap="none" rtlCol="0">
+            <a:spAutoFit/>
+          </a:bodyPr>
+          <a:lstStyle/>
+          <a:p>
+            <a:r>
+              <a:rPr lang="en-US" dirty="0" err="1" smtClean="0">
+                <a:solidFill>
+                  <a:srgbClr val="FFC000"/>
+                </a:solidFill>
+              </a:rPr>
+              <a:t>OutputImageSizePixel</a:t>
+            </a:r>
+            <a:r>
+              <a:rPr lang="en-US" dirty="0" smtClean="0">
+                <a:solidFill>
+                  <a:srgbClr val="FFC000"/>
+                </a:solidFill>
+              </a:rPr>
+              <a:t>[0]=820</a:t>
+            </a:r>
+            <a:endParaRPr lang="en-US" dirty="0">
+              <a:solidFill>
+                <a:srgbClr val="FFC000"/>
+              </a:solidFill>
+            </a:endParaRPr>
+          </a:p>
+        </p:txBody>
+      </p:sp>
+      <p:sp>
+        <p:nvSpPr>
+          <p:cNvPr id="86" name="Rectangle 85"/>
+          <p:cNvSpPr/>
+          <p:nvPr/>
+        </p:nvSpPr>
+        <p:spPr>
+          <a:xfrm>
+            <a:off x="3088839" y="5879068"/>
+            <a:ext cx="3928576" cy="369332"/>
+          </a:xfrm>
+          <a:prstGeom prst="rect">
+            <a:avLst/>
+          </a:prstGeom>
+        </p:spPr>
+        <p:txBody>
+          <a:bodyPr wrap="none">
+            <a:spAutoFit/>
+          </a:bodyPr>
+          <a:lstStyle/>
+          <a:p>
+            <a:r>
+              <a:rPr lang="en-CA" dirty="0"/>
+              <a:t> </a:t>
+            </a:r>
+            <a:r>
+              <a:rPr lang="en-CA" dirty="0" err="1" smtClean="0"/>
+              <a:t>TransducerGeometry</a:t>
+            </a:r>
+            <a:r>
+              <a:rPr lang="en-CA" dirty="0" smtClean="0"/>
+              <a:t>=</a:t>
+            </a:r>
+            <a:r>
+              <a:rPr lang="en-CA" dirty="0"/>
+              <a:t> " </a:t>
+            </a:r>
+            <a:r>
+              <a:rPr lang="hu-HU" dirty="0" smtClean="0"/>
+              <a:t>CURVI</a:t>
+            </a:r>
+            <a:r>
+              <a:rPr lang="en-CA" dirty="0" smtClean="0"/>
+              <a:t>LINEAR</a:t>
+            </a:r>
+            <a:r>
+              <a:rPr lang="en-CA" dirty="0"/>
+              <a:t>" </a:t>
+            </a:r>
+          </a:p>
+        </p:txBody>
+      </p:sp>
+      <p:sp>
+        <p:nvSpPr>
+          <p:cNvPr id="88" name="TextBox 87"/>
+          <p:cNvSpPr txBox="1"/>
+          <p:nvPr/>
+        </p:nvSpPr>
+        <p:spPr>
+          <a:xfrm>
+            <a:off x="228600" y="6138446"/>
+            <a:ext cx="8610600" cy="338554"/>
+          </a:xfrm>
+          <a:prstGeom prst="rect">
+            <a:avLst/>
+          </a:prstGeom>
+          <a:noFill/>
+        </p:spPr>
+        <p:txBody>
+          <a:bodyPr wrap="square" rtlCol="0">
+            <a:spAutoFit/>
+          </a:bodyPr>
+          <a:lstStyle/>
+          <a:p>
+            <a:pPr marL="342900" indent="-342900" algn="ctr"/>
+            <a:r>
+              <a:rPr lang="en-US" sz="1600" dirty="0"/>
+              <a:t>O</a:t>
+            </a:r>
+            <a:r>
+              <a:rPr lang="en-US" sz="1600" dirty="0" smtClean="0"/>
+              <a:t>utput image size in mm = </a:t>
+            </a:r>
+            <a:r>
+              <a:rPr lang="en-US" sz="1600" dirty="0" err="1" smtClean="0"/>
+              <a:t>OutputImageSizePixel</a:t>
+            </a:r>
+            <a:r>
+              <a:rPr lang="en-US" sz="1600" dirty="0" smtClean="0"/>
+              <a:t> </a:t>
+            </a:r>
+            <a:r>
+              <a:rPr lang="en-US" sz="1600" dirty="0"/>
+              <a:t>* </a:t>
+            </a:r>
+            <a:r>
+              <a:rPr lang="en-US" sz="1600" dirty="0" err="1"/>
+              <a:t>OutputImageSpacingMmPerPixel</a:t>
+            </a:r>
+            <a:endParaRPr lang="en-US" sz="1600" dirty="0" smtClean="0"/>
+          </a:p>
+        </p:txBody>
+      </p:sp>
+      <p:sp>
+        <p:nvSpPr>
+          <p:cNvPr id="2" name="Footer Placeholder 1"/>
+          <p:cNvSpPr>
+            <a:spLocks noGrp="1"/>
+          </p:cNvSpPr>
+          <p:nvPr>
+            <p:ph type="ftr" sz="quarter" idx="11"/>
+          </p:nvPr>
+        </p:nvSpPr>
+        <p:spPr>
+          <a:xfrm>
+            <a:off x="2743200" y="6416675"/>
+            <a:ext cx="3657600" cy="365125"/>
+          </a:xfrm>
+        </p:spPr>
+        <p:txBody>
+          <a:bodyPr/>
+          <a:lstStyle/>
+          <a:p>
+            <a:r>
+              <a:rPr lang="en-US" dirty="0" smtClean="0"/>
+              <a:t>Source: doc\specifications\UltrasoundImageOrientation.pptx</a:t>
+            </a:r>
+            <a:endParaRPr lang="en-US" dirty="0"/>
+          </a:p>
+        </p:txBody>
+      </p:sp>
+      <p:sp>
+        <p:nvSpPr>
+          <p:cNvPr id="33" name="TextBox 32"/>
+          <p:cNvSpPr txBox="1"/>
+          <p:nvPr/>
+        </p:nvSpPr>
+        <p:spPr>
+          <a:xfrm>
+            <a:off x="5455850" y="457200"/>
+            <a:ext cx="3535750" cy="400110"/>
+          </a:xfrm>
+          <a:prstGeom prst="rect">
+            <a:avLst/>
+          </a:prstGeom>
+          <a:solidFill>
+            <a:srgbClr val="92D050"/>
+          </a:solidFill>
+        </p:spPr>
+        <p:txBody>
+          <a:bodyPr wrap="square" rtlCol="0">
+            <a:spAutoFit/>
+          </a:bodyPr>
+          <a:lstStyle/>
+          <a:p>
+            <a:pPr marL="342900" indent="-342900" algn="ctr"/>
+            <a:r>
+              <a:rPr lang="en-US" sz="2000" b="1" dirty="0" smtClean="0">
+                <a:latin typeface="+mj-lt"/>
+              </a:rPr>
+              <a:t>Plus 2.1.x and above</a:t>
+            </a:r>
+            <a:endParaRPr lang="en-US" b="1" dirty="0">
+              <a:latin typeface="+mj-lt"/>
+            </a:endParaRPr>
+          </a:p>
+        </p:txBody>
+      </p:sp>
+      <p:cxnSp>
+        <p:nvCxnSpPr>
+          <p:cNvPr id="34" name="Straight Arrow Connector 33"/>
+          <p:cNvCxnSpPr/>
+          <p:nvPr/>
+        </p:nvCxnSpPr>
+        <p:spPr>
+          <a:xfrm flipV="1">
+            <a:off x="1869980" y="5887188"/>
+            <a:ext cx="2962273" cy="13222"/>
+          </a:xfrm>
+          <a:prstGeom prst="straightConnector1">
+            <a:avLst/>
+          </a:prstGeom>
+          <a:ln>
+            <a:solidFill>
+              <a:schemeClr val="accent6">
+                <a:lumMod val="75000"/>
+              </a:schemeClr>
+            </a:solidFill>
+            <a:prstDash val="sysDot"/>
+            <a:headEnd type="none" w="med" len="med"/>
+            <a:tailEnd type="arrow" w="med" len="med"/>
+          </a:ln>
+        </p:spPr>
+        <p:style>
+          <a:lnRef idx="2">
+            <a:schemeClr val="accent2"/>
+          </a:lnRef>
+          <a:fillRef idx="0">
+            <a:schemeClr val="accent2"/>
+          </a:fillRef>
+          <a:effectRef idx="1">
+            <a:schemeClr val="accent2"/>
+          </a:effectRef>
+          <a:fontRef idx="minor">
+            <a:schemeClr val="tx1"/>
+          </a:fontRef>
+        </p:style>
+      </p:cxnSp>
+      <p:sp>
+        <p:nvSpPr>
+          <p:cNvPr id="37" name="TextBox 36"/>
+          <p:cNvSpPr txBox="1"/>
+          <p:nvPr/>
+        </p:nvSpPr>
+        <p:spPr>
+          <a:xfrm>
+            <a:off x="2658553" y="5638800"/>
+            <a:ext cx="1989647" cy="261610"/>
+          </a:xfrm>
+          <a:prstGeom prst="rect">
+            <a:avLst/>
+          </a:prstGeom>
+          <a:noFill/>
+        </p:spPr>
+        <p:txBody>
+          <a:bodyPr wrap="none" rtlCol="0">
+            <a:spAutoFit/>
+          </a:bodyPr>
+          <a:lstStyle/>
+          <a:p>
+            <a:r>
+              <a:rPr lang="en-US" sz="1100" dirty="0" err="1" smtClean="0">
+                <a:solidFill>
+                  <a:srgbClr val="FFC000"/>
+                </a:solidFill>
+              </a:rPr>
+              <a:t>TransducerCenterPixel</a:t>
+            </a:r>
+            <a:r>
+              <a:rPr lang="en-US" sz="1100" dirty="0" smtClean="0">
+                <a:solidFill>
+                  <a:srgbClr val="FFC000"/>
+                </a:solidFill>
+              </a:rPr>
+              <a:t>[0] </a:t>
+            </a:r>
+            <a:r>
+              <a:rPr lang="en-US" sz="1100" dirty="0" smtClean="0">
+                <a:solidFill>
+                  <a:srgbClr val="FFC000"/>
+                </a:solidFill>
+              </a:rPr>
+              <a:t>= </a:t>
+            </a:r>
+            <a:r>
+              <a:rPr lang="en-US" sz="1100" dirty="0" smtClean="0">
+                <a:solidFill>
+                  <a:srgbClr val="FFC000"/>
+                </a:solidFill>
+              </a:rPr>
+              <a:t>410</a:t>
+            </a:r>
+            <a:endParaRPr lang="en-US" sz="1100" dirty="0">
+              <a:solidFill>
+                <a:srgbClr val="FFC000"/>
+              </a:solidFill>
+            </a:endParaRPr>
+          </a:p>
+        </p:txBody>
+      </p:sp>
+      <p:cxnSp>
+        <p:nvCxnSpPr>
+          <p:cNvPr id="46" name="Straight Arrow Connector 45"/>
+          <p:cNvCxnSpPr/>
+          <p:nvPr/>
+        </p:nvCxnSpPr>
+        <p:spPr>
+          <a:xfrm flipH="1" flipV="1">
+            <a:off x="1405890" y="5523286"/>
+            <a:ext cx="3432581" cy="16454"/>
           </a:xfrm>
           <a:prstGeom prst="straightConnector1">
             <a:avLst/>
@@ -9771,52 +10909,6 @@
           </a:fontRef>
         </p:style>
       </p:cxnSp>
-      <p:sp>
-        <p:nvSpPr>
-          <p:cNvPr id="43" name="TextBox 42"/>
-          <p:cNvSpPr txBox="1"/>
-          <p:nvPr/>
-        </p:nvSpPr>
-        <p:spPr>
-          <a:xfrm>
-            <a:off x="5433060" y="1330553"/>
-            <a:ext cx="2949462" cy="369332"/>
-          </a:xfrm>
-          <a:prstGeom prst="rect">
-            <a:avLst/>
-          </a:prstGeom>
-          <a:noFill/>
-        </p:spPr>
-        <p:txBody>
-          <a:bodyPr wrap="none" rtlCol="0">
-            <a:spAutoFit/>
-          </a:bodyPr>
-          <a:lstStyle/>
-          <a:p>
-            <a:r>
-              <a:rPr lang="en-US" dirty="0" err="1" smtClean="0">
-                <a:solidFill>
-                  <a:srgbClr val="FFC000"/>
-                </a:solidFill>
-              </a:rPr>
-              <a:t>OutputImageSizePixel</a:t>
-            </a:r>
-            <a:r>
-              <a:rPr lang="en-US" dirty="0" smtClean="0">
-                <a:solidFill>
-                  <a:srgbClr val="FFC000"/>
-                </a:solidFill>
-              </a:rPr>
-              <a:t>[1]=616</a:t>
-            </a:r>
-            <a:endParaRPr lang="en-US" dirty="0">
-              <a:solidFill>
-                <a:srgbClr val="FFC000"/>
-              </a:solidFill>
-            </a:endParaRPr>
-          </a:p>
-        </p:txBody>
-      </p:sp>
       <p:cxnSp>
         <p:nvCxnSpPr>
           <p:cNvPr id="47" name="Straight Arrow Connector 46"/>
@@ -9824,9 +10916,184 @@
           <p:nvPr/>
         </p:nvCxnSpPr>
         <p:spPr>
+          <a:xfrm>
+            <a:off x="1870710" y="4191000"/>
+            <a:ext cx="0" cy="1752600"/>
+          </a:xfrm>
+          <a:prstGeom prst="straightConnector1">
+            <a:avLst/>
+          </a:prstGeom>
+          <a:ln>
+            <a:solidFill>
+              <a:schemeClr val="accent6">
+                <a:lumMod val="75000"/>
+              </a:schemeClr>
+            </a:solidFill>
+            <a:prstDash val="sysDot"/>
+            <a:headEnd type="none" w="med" len="med"/>
+            <a:tailEnd type="none" w="med" len="med"/>
+          </a:ln>
+        </p:spPr>
+        <p:style>
+          <a:lnRef idx="2">
+            <a:schemeClr val="accent2"/>
+          </a:lnRef>
+          <a:fillRef idx="0">
+            <a:schemeClr val="accent2"/>
+          </a:fillRef>
+          <a:effectRef idx="1">
+            <a:schemeClr val="accent2"/>
+          </a:effectRef>
+          <a:fontRef idx="minor">
+            <a:schemeClr val="tx1"/>
+          </a:fontRef>
+        </p:style>
+      </p:cxnSp>
+    </p:spTree>
+    <p:extLst>
+      <p:ext uri="{BB962C8B-B14F-4D97-AF65-F5344CB8AC3E}">
+        <p14:creationId xmlns:p14="http://schemas.microsoft.com/office/powerpoint/2010/main" val="1309642490"/>
+      </p:ext>
+    </p:extLst>
+  </p:cSld>
+  <p:clrMapOvr>
+    <a:masterClrMapping/>
+  </p:clrMapOvr>
+</p:sld>
+</file>
+
+<file path=ppt/slides/slide8.xml><?xml version="1.0" encoding="utf-8"?>
+<p:sld xmlns:a="http://schemas.openxmlformats.org/drawingml/2006/main" xmlns:r="http://schemas.openxmlformats.org/officeDocument/2006/relationships" xmlns:p="http://schemas.openxmlformats.org/presentationml/2006/main">
+  <p:cSld>
+    <p:spTree>
+      <p:nvGrpSpPr>
+        <p:cNvPr id="1" name=""/>
+        <p:cNvGrpSpPr/>
+        <p:nvPr/>
+      </p:nvGrpSpPr>
+      <p:grpSpPr>
+        <a:xfrm>
+          <a:off x="0" y="0"/>
+          <a:ext cx="0" cy="0"/>
+          <a:chOff x="0" y="0"/>
+          <a:chExt cx="0" cy="0"/>
+        </a:xfrm>
+      </p:grpSpPr>
+      <p:sp>
+        <p:nvSpPr>
+          <p:cNvPr id="4" name="Rectangle 3"/>
+          <p:cNvSpPr/>
+          <p:nvPr/>
+        </p:nvSpPr>
+        <p:spPr>
+          <a:xfrm>
+            <a:off x="1371078" y="624432"/>
+            <a:ext cx="5867400" cy="4669448"/>
+          </a:xfrm>
+          <a:prstGeom prst="rect">
+            <a:avLst/>
+          </a:prstGeom>
+          <a:solidFill>
+            <a:schemeClr val="tx1"/>
+          </a:solidFill>
+        </p:spPr>
+        <p:style>
+          <a:lnRef idx="2">
+            <a:schemeClr val="accent1">
+              <a:shade val="50000"/>
+            </a:schemeClr>
+          </a:lnRef>
+          <a:fillRef idx="1">
+            <a:schemeClr val="accent1"/>
+          </a:fillRef>
+          <a:effectRef idx="0">
+            <a:schemeClr val="accent1"/>
+          </a:effectRef>
+          <a:fontRef idx="minor">
+            <a:schemeClr val="lt1"/>
+          </a:fontRef>
+        </p:style>
+        <p:txBody>
+          <a:bodyPr rtlCol="0" anchor="ctr"/>
+          <a:lstStyle/>
+          <a:p>
+            <a:pPr algn="ctr"/>
+            <a:endParaRPr lang="en-CA"/>
+          </a:p>
+        </p:txBody>
+      </p:sp>
+      <p:pic>
+        <p:nvPicPr>
+          <p:cNvPr id="2" name="Picture 2"/>
+          <p:cNvPicPr>
+            <a:picLocks noChangeAspect="1" noChangeArrowheads="1"/>
+          </p:cNvPicPr>
+          <p:nvPr/>
+        </p:nvPicPr>
+        <p:blipFill rotWithShape="1">
+          <a:blip r:embed="rId2">
+            <a:extLst>
+              <a:ext uri="{28A0092B-C50C-407E-A947-70E740481C1C}">
+                <a14:useLocalDpi xmlns:a14="http://schemas.microsoft.com/office/drawing/2010/main" val="0"/>
+              </a:ext>
+            </a:extLst>
+          </a:blip>
+          <a:srcRect r="28952" b="2201"/>
+          <a:stretch/>
+        </p:blipFill>
+        <p:spPr bwMode="auto">
+          <a:xfrm>
+            <a:off x="2819400" y="882879"/>
+            <a:ext cx="2957699" cy="3917722"/>
+          </a:xfrm>
+          <a:prstGeom prst="rect">
+            <a:avLst/>
+          </a:prstGeom>
+          <a:noFill/>
+          <a:ln>
+            <a:noFill/>
+          </a:ln>
+          <a:effectLst/>
+          <a:extLst>
+            <a:ext uri="{909E8E84-426E-40DD-AFC4-6F175D3DCCD1}">
+              <a14:hiddenFill xmlns:a14="http://schemas.microsoft.com/office/drawing/2010/main">
+                <a:solidFill>
+                  <a:schemeClr val="accent1"/>
+                </a:solidFill>
+              </a14:hiddenFill>
+            </a:ext>
+            <a:ext uri="{91240B29-F687-4F45-9708-019B960494DF}">
+              <a14:hiddenLine xmlns:a14="http://schemas.microsoft.com/office/drawing/2010/main" w="9525">
+                <a:solidFill>
+                  <a:schemeClr val="tx1"/>
+                </a:solidFill>
+                <a:miter lim="800000"/>
+                <a:headEnd/>
+                <a:tailEnd/>
+              </a14:hiddenLine>
+            </a:ext>
+            <a:ext uri="{AF507438-7753-43E0-B8FC-AC1667EBCBE1}">
+              <a14:hiddenEffects xmlns:a14="http://schemas.microsoft.com/office/drawing/2010/main">
+                <a:effectLst>
+                  <a:outerShdw dist="35921" dir="2700000" algn="ctr" rotWithShape="0">
+                    <a:schemeClr val="bg2"/>
+                  </a:outerShdw>
+                </a:effectLst>
+              </a14:hiddenEffects>
+            </a:ext>
+          </a:extLst>
+        </p:spPr>
+      </p:pic>
+      <p:cxnSp>
+        <p:nvCxnSpPr>
+          <p:cNvPr id="36" name="Straight Arrow Connector 35"/>
+          <p:cNvCxnSpPr/>
+          <p:nvPr/>
+        </p:nvCxnSpPr>
+        <p:spPr>
           <a:xfrm flipV="1">
-            <a:off x="6781800" y="623479"/>
-            <a:ext cx="0" cy="4670400"/>
+            <a:off x="5943600" y="886045"/>
+            <a:ext cx="0" cy="3914556"/>
           </a:xfrm>
           <a:prstGeom prst="straightConnector1">
             <a:avLst/>
@@ -9857,16 +11124,343 @@
           </a:fontRef>
         </p:style>
       </p:cxnSp>
+      <p:sp>
+        <p:nvSpPr>
+          <p:cNvPr id="44" name="TextBox 43"/>
+          <p:cNvSpPr txBox="1"/>
+          <p:nvPr/>
+        </p:nvSpPr>
+        <p:spPr>
+          <a:xfrm>
+            <a:off x="4604232" y="2633782"/>
+            <a:ext cx="2253246" cy="338554"/>
+          </a:xfrm>
+          <a:prstGeom prst="rect">
+            <a:avLst/>
+          </a:prstGeom>
+          <a:noFill/>
+        </p:spPr>
+        <p:txBody>
+          <a:bodyPr wrap="none" rtlCol="0">
+            <a:spAutoFit/>
+          </a:bodyPr>
+          <a:lstStyle/>
+          <a:p>
+            <a:r>
+              <a:rPr lang="hu-HU" sz="1600" dirty="0" smtClean="0">
+                <a:solidFill>
+                  <a:srgbClr val="FFC000"/>
+                </a:solidFill>
+              </a:rPr>
+              <a:t>ImagingDepthMm </a:t>
+            </a:r>
+            <a:r>
+              <a:rPr lang="en-CA" sz="1600" dirty="0" smtClean="0">
+                <a:solidFill>
+                  <a:srgbClr val="FFC000"/>
+                </a:solidFill>
+              </a:rPr>
+              <a:t>= 55.0</a:t>
+            </a:r>
+            <a:endParaRPr lang="en-US" sz="1600" dirty="0">
+              <a:solidFill>
+                <a:srgbClr val="FFC000"/>
+              </a:solidFill>
+            </a:endParaRPr>
+          </a:p>
+        </p:txBody>
+      </p:sp>
+      <p:sp>
+        <p:nvSpPr>
+          <p:cNvPr id="28" name="TextBox 27"/>
+          <p:cNvSpPr txBox="1"/>
+          <p:nvPr/>
+        </p:nvSpPr>
+        <p:spPr>
+          <a:xfrm>
+            <a:off x="114164" y="0"/>
+            <a:ext cx="8877436" cy="400110"/>
+          </a:xfrm>
+          <a:prstGeom prst="rect">
+            <a:avLst/>
+          </a:prstGeom>
+          <a:noFill/>
+        </p:spPr>
+        <p:txBody>
+          <a:bodyPr wrap="square" rtlCol="0">
+            <a:spAutoFit/>
+          </a:bodyPr>
+          <a:lstStyle/>
+          <a:p>
+            <a:pPr marL="342900" indent="-342900" algn="ctr"/>
+            <a:r>
+              <a:rPr lang="en-US" sz="2000" b="1" dirty="0"/>
+              <a:t>Defining the transducer geometry for RF scan conversion - </a:t>
+            </a:r>
+            <a:r>
+              <a:rPr lang="en-US" sz="2000" b="1" dirty="0" smtClean="0"/>
+              <a:t>linear </a:t>
+            </a:r>
+            <a:r>
+              <a:rPr lang="en-US" sz="2000" b="1" dirty="0"/>
+              <a:t>transducer</a:t>
+            </a:r>
+            <a:endParaRPr lang="en-US" b="1" dirty="0"/>
+          </a:p>
+        </p:txBody>
+      </p:sp>
+      <p:sp>
+        <p:nvSpPr>
+          <p:cNvPr id="29" name="Rectangle 28"/>
+          <p:cNvSpPr/>
+          <p:nvPr/>
+        </p:nvSpPr>
+        <p:spPr>
+          <a:xfrm>
+            <a:off x="3088839" y="5966460"/>
+            <a:ext cx="3240824" cy="369332"/>
+          </a:xfrm>
+          <a:prstGeom prst="rect">
+            <a:avLst/>
+          </a:prstGeom>
+        </p:spPr>
+        <p:txBody>
+          <a:bodyPr wrap="none">
+            <a:spAutoFit/>
+          </a:bodyPr>
+          <a:lstStyle/>
+          <a:p>
+            <a:r>
+              <a:rPr lang="en-CA" dirty="0"/>
+              <a:t> </a:t>
+            </a:r>
+            <a:r>
+              <a:rPr lang="en-CA" dirty="0" err="1"/>
+              <a:t>TransducerGeometry</a:t>
+            </a:r>
+            <a:r>
+              <a:rPr lang="en-CA" dirty="0"/>
+              <a:t>="LINEAR" </a:t>
+            </a:r>
+          </a:p>
+        </p:txBody>
+      </p:sp>
+      <p:sp>
+        <p:nvSpPr>
+          <p:cNvPr id="30" name="TextBox 29"/>
+          <p:cNvSpPr txBox="1"/>
+          <p:nvPr/>
+        </p:nvSpPr>
+        <p:spPr>
+          <a:xfrm>
+            <a:off x="1020800" y="969791"/>
+            <a:ext cx="290464" cy="369332"/>
+          </a:xfrm>
+          <a:prstGeom prst="rect">
+            <a:avLst/>
+          </a:prstGeom>
+          <a:noFill/>
+        </p:spPr>
+        <p:txBody>
+          <a:bodyPr wrap="none" rtlCol="0">
+            <a:spAutoFit/>
+          </a:bodyPr>
+          <a:lstStyle/>
+          <a:p>
+            <a:r>
+              <a:rPr lang="en-US" dirty="0" smtClean="0">
+                <a:solidFill>
+                  <a:srgbClr val="FFC000"/>
+                </a:solidFill>
+              </a:rPr>
+              <a:t>F</a:t>
+            </a:r>
+            <a:endParaRPr lang="en-US" dirty="0">
+              <a:solidFill>
+                <a:srgbClr val="FFC000"/>
+              </a:solidFill>
+            </a:endParaRPr>
+          </a:p>
+        </p:txBody>
+      </p:sp>
+      <p:sp>
+        <p:nvSpPr>
+          <p:cNvPr id="33" name="TextBox 32"/>
+          <p:cNvSpPr txBox="1"/>
+          <p:nvPr/>
+        </p:nvSpPr>
+        <p:spPr>
+          <a:xfrm>
+            <a:off x="1748279" y="272323"/>
+            <a:ext cx="381836" cy="369332"/>
+          </a:xfrm>
+          <a:prstGeom prst="rect">
+            <a:avLst/>
+          </a:prstGeom>
+          <a:noFill/>
+        </p:spPr>
+        <p:txBody>
+          <a:bodyPr wrap="none" rtlCol="0">
+            <a:spAutoFit/>
+          </a:bodyPr>
+          <a:lstStyle/>
+          <a:p>
+            <a:r>
+              <a:rPr lang="en-US" dirty="0">
+                <a:solidFill>
+                  <a:srgbClr val="FFC000"/>
+                </a:solidFill>
+              </a:rPr>
+              <a:t>M</a:t>
+            </a:r>
+          </a:p>
+        </p:txBody>
+      </p:sp>
       <p:cxnSp>
         <p:nvCxnSpPr>
-          <p:cNvPr id="48" name="Straight Arrow Connector 47"/>
+          <p:cNvPr id="34" name="Straight Arrow Connector 33"/>
           <p:cNvCxnSpPr/>
           <p:nvPr/>
         </p:nvCxnSpPr>
         <p:spPr>
           <a:xfrm flipV="1">
-            <a:off x="1757691" y="2372169"/>
-            <a:ext cx="0" cy="3538954"/>
+            <a:off x="1376169" y="622843"/>
+            <a:ext cx="685800" cy="1588"/>
+          </a:xfrm>
+          <a:prstGeom prst="straightConnector1">
+            <a:avLst/>
+          </a:prstGeom>
+          <a:ln>
+            <a:solidFill>
+              <a:srgbClr val="FFC000"/>
+            </a:solidFill>
+            <a:tailEnd type="arrow"/>
+          </a:ln>
+          <a:effectLst>
+            <a:glow rad="63500">
+              <a:schemeClr val="bg1">
+                <a:alpha val="40000"/>
+              </a:schemeClr>
+            </a:glow>
+            <a:outerShdw blurRad="40000" dist="20000" dir="5400000" rotWithShape="0">
+              <a:srgbClr val="000000">
+                <a:alpha val="38000"/>
+              </a:srgbClr>
+            </a:outerShdw>
+          </a:effectLst>
+        </p:spPr>
+        <p:style>
+          <a:lnRef idx="2">
+            <a:schemeClr val="accent2"/>
+          </a:lnRef>
+          <a:fillRef idx="0">
+            <a:schemeClr val="accent2"/>
+          </a:fillRef>
+          <a:effectRef idx="1">
+            <a:schemeClr val="accent2"/>
+          </a:effectRef>
+          <a:fontRef idx="minor">
+            <a:schemeClr val="tx1"/>
+          </a:fontRef>
+        </p:style>
+      </p:cxnSp>
+      <p:cxnSp>
+        <p:nvCxnSpPr>
+          <p:cNvPr id="35" name="Straight Arrow Connector 34"/>
+          <p:cNvCxnSpPr/>
+          <p:nvPr/>
+        </p:nvCxnSpPr>
+        <p:spPr>
+          <a:xfrm>
+            <a:off x="1376169" y="621265"/>
+            <a:ext cx="0" cy="609392"/>
+          </a:xfrm>
+          <a:prstGeom prst="straightConnector1">
+            <a:avLst/>
+          </a:prstGeom>
+          <a:ln>
+            <a:solidFill>
+              <a:srgbClr val="FFC000"/>
+            </a:solidFill>
+            <a:tailEnd type="arrow"/>
+          </a:ln>
+          <a:effectLst>
+            <a:glow rad="63500">
+              <a:schemeClr val="bg1">
+                <a:alpha val="40000"/>
+              </a:schemeClr>
+            </a:glow>
+            <a:outerShdw blurRad="40000" dist="20000" dir="5400000" rotWithShape="0">
+              <a:srgbClr val="000000">
+                <a:alpha val="38000"/>
+              </a:srgbClr>
+            </a:outerShdw>
+          </a:effectLst>
+        </p:spPr>
+        <p:style>
+          <a:lnRef idx="2">
+            <a:schemeClr val="accent2"/>
+          </a:lnRef>
+          <a:fillRef idx="0">
+            <a:schemeClr val="accent2"/>
+          </a:fillRef>
+          <a:effectRef idx="1">
+            <a:schemeClr val="accent2"/>
+          </a:effectRef>
+          <a:fontRef idx="minor">
+            <a:schemeClr val="tx1"/>
+          </a:fontRef>
+        </p:style>
+      </p:cxnSp>
+      <p:sp>
+        <p:nvSpPr>
+          <p:cNvPr id="37" name="TextBox 36"/>
+          <p:cNvSpPr txBox="1"/>
+          <p:nvPr/>
+        </p:nvSpPr>
+        <p:spPr>
+          <a:xfrm>
+            <a:off x="757679" y="348523"/>
+            <a:ext cx="677439" cy="369332"/>
+          </a:xfrm>
+          <a:prstGeom prst="rect">
+            <a:avLst/>
+          </a:prstGeom>
+          <a:noFill/>
+        </p:spPr>
+        <p:txBody>
+          <a:bodyPr wrap="square" rtlCol="0">
+            <a:spAutoFit/>
+          </a:bodyPr>
+          <a:lstStyle/>
+          <a:p>
+            <a:pPr marL="342900" indent="-342900" algn="r"/>
+            <a:r>
+              <a:rPr lang="en-US" b="1" dirty="0" smtClean="0">
+                <a:solidFill>
+                  <a:srgbClr val="FFC000"/>
+                </a:solidFill>
+              </a:rPr>
+              <a:t>(0, 0)</a:t>
+            </a:r>
+            <a:endParaRPr lang="en-US" b="1" dirty="0">
+              <a:solidFill>
+                <a:srgbClr val="FFC000"/>
+              </a:solidFill>
+            </a:endParaRPr>
+          </a:p>
+        </p:txBody>
+      </p:sp>
+      <p:cxnSp>
+        <p:nvCxnSpPr>
+          <p:cNvPr id="38" name="Straight Arrow Connector 37"/>
+          <p:cNvCxnSpPr/>
+          <p:nvPr/>
+        </p:nvCxnSpPr>
+        <p:spPr>
+          <a:xfrm flipH="1">
+            <a:off x="5334000" y="4800600"/>
+            <a:ext cx="723900" cy="0"/>
           </a:xfrm>
           <a:prstGeom prst="straightConnector1">
             <a:avLst/>
@@ -9899,14 +11493,14 @@
       </p:cxnSp>
       <p:cxnSp>
         <p:nvCxnSpPr>
-          <p:cNvPr id="52" name="Straight Arrow Connector 51"/>
+          <p:cNvPr id="39" name="Straight Arrow Connector 38"/>
           <p:cNvCxnSpPr/>
           <p:nvPr/>
         </p:nvCxnSpPr>
         <p:spPr>
-          <a:xfrm flipV="1">
-            <a:off x="5223510" y="4539523"/>
-            <a:ext cx="0" cy="990600"/>
+          <a:xfrm flipH="1">
+            <a:off x="6253635" y="5293879"/>
+            <a:ext cx="1442565" cy="0"/>
           </a:xfrm>
           <a:prstGeom prst="straightConnector1">
             <a:avLst/>
@@ -9939,14 +11533,14 @@
       </p:cxnSp>
       <p:cxnSp>
         <p:nvCxnSpPr>
-          <p:cNvPr id="53" name="Straight Arrow Connector 52"/>
+          <p:cNvPr id="40" name="Straight Arrow Connector 39"/>
           <p:cNvCxnSpPr/>
           <p:nvPr/>
         </p:nvCxnSpPr>
         <p:spPr>
-          <a:xfrm flipV="1">
-            <a:off x="6629400" y="4539523"/>
-            <a:ext cx="0" cy="1371600"/>
+          <a:xfrm flipH="1">
+            <a:off x="2696958" y="622843"/>
+            <a:ext cx="4008120" cy="0"/>
           </a:xfrm>
           <a:prstGeom prst="straightConnector1">
             <a:avLst/>
@@ -9977,16 +11571,62 @@
           </a:fontRef>
         </p:style>
       </p:cxnSp>
+      <p:sp>
+        <p:nvSpPr>
+          <p:cNvPr id="43" name="TextBox 42"/>
+          <p:cNvSpPr txBox="1"/>
+          <p:nvPr/>
+        </p:nvSpPr>
+        <p:spPr>
+          <a:xfrm>
+            <a:off x="6317357" y="2176046"/>
+            <a:ext cx="2639953" cy="338554"/>
+          </a:xfrm>
+          <a:prstGeom prst="rect">
+            <a:avLst/>
+          </a:prstGeom>
+          <a:noFill/>
+        </p:spPr>
+        <p:txBody>
+          <a:bodyPr wrap="none" rtlCol="0">
+            <a:spAutoFit/>
+          </a:bodyPr>
+          <a:lstStyle/>
+          <a:p>
+            <a:r>
+              <a:rPr lang="en-US" sz="1600" dirty="0" err="1" smtClean="0">
+                <a:solidFill>
+                  <a:srgbClr val="FFC000"/>
+                </a:solidFill>
+              </a:rPr>
+              <a:t>OutputImageSizePixel</a:t>
+            </a:r>
+            <a:r>
+              <a:rPr lang="en-US" sz="1600" dirty="0" smtClean="0">
+                <a:solidFill>
+                  <a:srgbClr val="FFC000"/>
+                </a:solidFill>
+              </a:rPr>
+              <a:t>[1]=616</a:t>
+            </a:r>
+            <a:endParaRPr lang="en-US" sz="1600" dirty="0">
+              <a:solidFill>
+                <a:srgbClr val="FFC000"/>
+              </a:solidFill>
+            </a:endParaRPr>
+          </a:p>
+        </p:txBody>
+      </p:sp>
       <p:cxnSp>
         <p:nvCxnSpPr>
-          <p:cNvPr id="54" name="Straight Arrow Connector 53"/>
+          <p:cNvPr id="47" name="Straight Arrow Connector 46"/>
           <p:cNvCxnSpPr/>
           <p:nvPr/>
         </p:nvCxnSpPr>
         <p:spPr>
-          <a:xfrm flipH="1">
-            <a:off x="1752600" y="5385343"/>
-            <a:ext cx="3449964" cy="0"/>
+          <a:xfrm flipV="1">
+            <a:off x="7315200" y="623480"/>
+            <a:ext cx="0" cy="4670400"/>
           </a:xfrm>
           <a:prstGeom prst="straightConnector1">
             <a:avLst/>
@@ -10019,14 +11659,134 @@
       </p:cxnSp>
       <p:cxnSp>
         <p:nvCxnSpPr>
-          <p:cNvPr id="57" name="Straight Arrow Connector 56"/>
+          <p:cNvPr id="48" name="Straight Arrow Connector 47"/>
           <p:cNvCxnSpPr/>
           <p:nvPr/>
         </p:nvCxnSpPr>
         <p:spPr>
+          <a:xfrm flipV="1">
+            <a:off x="1371078" y="2372169"/>
+            <a:ext cx="5091" cy="3222697"/>
+          </a:xfrm>
+          <a:prstGeom prst="straightConnector1">
+            <a:avLst/>
+          </a:prstGeom>
+          <a:ln>
+            <a:solidFill>
+              <a:schemeClr val="accent6">
+                <a:lumMod val="75000"/>
+              </a:schemeClr>
+            </a:solidFill>
+            <a:prstDash val="sysDot"/>
+            <a:headEnd type="none" w="med" len="med"/>
+            <a:tailEnd type="none" w="med" len="med"/>
+          </a:ln>
+        </p:spPr>
+        <p:style>
+          <a:lnRef idx="2">
+            <a:schemeClr val="accent2"/>
+          </a:lnRef>
+          <a:fillRef idx="0">
+            <a:schemeClr val="accent2"/>
+          </a:fillRef>
+          <a:effectRef idx="1">
+            <a:schemeClr val="accent2"/>
+          </a:effectRef>
+          <a:fontRef idx="minor">
+            <a:schemeClr val="tx1"/>
+          </a:fontRef>
+        </p:style>
+      </p:cxnSp>
+      <p:cxnSp>
+        <p:nvCxnSpPr>
+          <p:cNvPr id="52" name="Straight Arrow Connector 51"/>
+          <p:cNvCxnSpPr/>
+          <p:nvPr/>
+        </p:nvCxnSpPr>
+        <p:spPr>
+          <a:xfrm flipV="1">
+            <a:off x="5779770" y="4038600"/>
+            <a:ext cx="0" cy="990600"/>
+          </a:xfrm>
+          <a:prstGeom prst="straightConnector1">
+            <a:avLst/>
+          </a:prstGeom>
+          <a:ln>
+            <a:solidFill>
+              <a:schemeClr val="accent6">
+                <a:lumMod val="75000"/>
+              </a:schemeClr>
+            </a:solidFill>
+            <a:prstDash val="sysDot"/>
+            <a:headEnd type="none" w="med" len="med"/>
+            <a:tailEnd type="none" w="med" len="med"/>
+          </a:ln>
+        </p:spPr>
+        <p:style>
+          <a:lnRef idx="2">
+            <a:schemeClr val="accent2"/>
+          </a:lnRef>
+          <a:fillRef idx="0">
+            <a:schemeClr val="accent2"/>
+          </a:fillRef>
+          <a:effectRef idx="1">
+            <a:schemeClr val="accent2"/>
+          </a:effectRef>
+          <a:fontRef idx="minor">
+            <a:schemeClr val="tx1"/>
+          </a:fontRef>
+        </p:style>
+      </p:cxnSp>
+      <p:cxnSp>
+        <p:nvCxnSpPr>
+          <p:cNvPr id="53" name="Straight Arrow Connector 52"/>
+          <p:cNvCxnSpPr/>
+          <p:nvPr/>
+        </p:nvCxnSpPr>
+        <p:spPr>
+          <a:xfrm flipV="1">
+            <a:off x="7238478" y="4539524"/>
+            <a:ext cx="522" cy="1055342"/>
+          </a:xfrm>
+          <a:prstGeom prst="straightConnector1">
+            <a:avLst/>
+          </a:prstGeom>
+          <a:ln>
+            <a:solidFill>
+              <a:schemeClr val="accent6">
+                <a:lumMod val="75000"/>
+              </a:schemeClr>
+            </a:solidFill>
+            <a:prstDash val="sysDot"/>
+            <a:headEnd type="none" w="med" len="med"/>
+            <a:tailEnd type="none" w="med" len="med"/>
+          </a:ln>
+        </p:spPr>
+        <p:style>
+          <a:lnRef idx="2">
+            <a:schemeClr val="accent2"/>
+          </a:lnRef>
+          <a:fillRef idx="0">
+            <a:schemeClr val="accent2"/>
+          </a:fillRef>
+          <a:effectRef idx="1">
+            <a:schemeClr val="accent2"/>
+          </a:effectRef>
+          <a:fontRef idx="minor">
+            <a:schemeClr val="tx1"/>
+          </a:fontRef>
+        </p:style>
+      </p:cxnSp>
+      <p:cxnSp>
+        <p:nvCxnSpPr>
+          <p:cNvPr id="54" name="Straight Arrow Connector 53"/>
+          <p:cNvCxnSpPr/>
+          <p:nvPr/>
+        </p:nvCxnSpPr>
+        <p:spPr>
           <a:xfrm flipH="1">
-            <a:off x="1752600" y="5758723"/>
-            <a:ext cx="4876800" cy="0"/>
+            <a:off x="2819400" y="4876800"/>
+            <a:ext cx="2929746" cy="0"/>
           </a:xfrm>
           <a:prstGeom prst="straightConnector1">
             <a:avLst/>
@@ -10057,6 +11817,46 @@
           </a:fontRef>
         </p:style>
       </p:cxnSp>
+      <p:cxnSp>
+        <p:nvCxnSpPr>
+          <p:cNvPr id="57" name="Straight Arrow Connector 56"/>
+          <p:cNvCxnSpPr/>
+          <p:nvPr/>
+        </p:nvCxnSpPr>
+        <p:spPr>
+          <a:xfrm flipH="1">
+            <a:off x="1371078" y="5410200"/>
+            <a:ext cx="5867400" cy="0"/>
+          </a:xfrm>
+          <a:prstGeom prst="straightConnector1">
+            <a:avLst/>
+          </a:prstGeom>
+          <a:ln>
+            <a:solidFill>
+              <a:schemeClr val="accent6">
+                <a:lumMod val="75000"/>
+              </a:schemeClr>
+            </a:solidFill>
+            <a:prstDash val="sysDot"/>
+            <a:headEnd type="arrow" w="med" len="med"/>
+            <a:tailEnd type="arrow" w="med" len="med"/>
+          </a:ln>
+        </p:spPr>
+        <p:style>
+          <a:lnRef idx="2">
+            <a:schemeClr val="accent2"/>
+          </a:lnRef>
+          <a:fillRef idx="0">
+            <a:schemeClr val="accent2"/>
+          </a:fillRef>
+          <a:effectRef idx="1">
+            <a:schemeClr val="accent2"/>
+          </a:effectRef>
+          <a:fontRef idx="minor">
+            <a:schemeClr val="tx1"/>
+          </a:fontRef>
+        </p:style>
+      </p:cxnSp>
       <p:sp>
         <p:nvSpPr>
           <p:cNvPr id="61" name="TextBox 60"/>
@@ -10065,7 +11865,7 @@
         </p:nvSpPr>
         <p:spPr>
           <a:xfrm>
-            <a:off x="2141231" y="5343433"/>
+            <a:off x="3051271" y="4843046"/>
             <a:ext cx="2511329" cy="338554"/>
           </a:xfrm>
           <a:prstGeom prst="rect">
@@ -10119,8 +11919,8 @@
         </p:nvSpPr>
         <p:spPr>
           <a:xfrm>
-            <a:off x="2582919" y="5713003"/>
-            <a:ext cx="2949462" cy="369332"/>
+            <a:off x="2917938" y="5410200"/>
+            <a:ext cx="2639953" cy="338554"/>
           </a:xfrm>
           <a:prstGeom prst="rect">
             <a:avLst/>
@@ -10134,7 +11934,7 @@
           <a:lstStyle/>
           <a:p>
             <a:r>
-              <a:rPr lang="en-US" dirty="0" err="1" smtClean="0">
+              <a:rPr lang="en-US" sz="1600" dirty="0" err="1" smtClean="0">
                 <a:solidFill>
                   <a:srgbClr val="FFC000"/>
                 </a:solidFill>
@@ -10142,14 +11942,14 @@
               <a:t>OutputImageSizePixel</a:t>
             </a:r>
             <a:r>
-              <a:rPr lang="en-US" dirty="0" smtClean="0">
+              <a:rPr lang="en-US" sz="1600" dirty="0" smtClean="0">
                 <a:solidFill>
                   <a:srgbClr val="FFC000"/>
                 </a:solidFill>
               </a:rPr>
               <a:t>[0]=820</a:t>
             </a:r>
-            <a:endParaRPr lang="en-US" dirty="0">
+            <a:endParaRPr lang="en-US" sz="1600" dirty="0">
               <a:solidFill>
                 <a:srgbClr val="FFC000"/>
               </a:solidFill>
@@ -10236,6 +12036,505 @@
           </a:p>
         </p:txBody>
       </p:sp>
+      <p:cxnSp>
+        <p:nvCxnSpPr>
+          <p:cNvPr id="41" name="Straight Arrow Connector 40"/>
+          <p:cNvCxnSpPr/>
+          <p:nvPr/>
+        </p:nvCxnSpPr>
+        <p:spPr>
+          <a:xfrm flipH="1">
+            <a:off x="5322570" y="891540"/>
+            <a:ext cx="723900" cy="0"/>
+          </a:xfrm>
+          <a:prstGeom prst="straightConnector1">
+            <a:avLst/>
+          </a:prstGeom>
+          <a:ln>
+            <a:solidFill>
+              <a:schemeClr val="accent6">
+                <a:lumMod val="75000"/>
+              </a:schemeClr>
+            </a:solidFill>
+            <a:prstDash val="sysDot"/>
+            <a:headEnd type="none" w="med" len="med"/>
+            <a:tailEnd type="none" w="med" len="med"/>
+          </a:ln>
+        </p:spPr>
+        <p:style>
+          <a:lnRef idx="2">
+            <a:schemeClr val="accent2"/>
+          </a:lnRef>
+          <a:fillRef idx="0">
+            <a:schemeClr val="accent2"/>
+          </a:fillRef>
+          <a:effectRef idx="1">
+            <a:schemeClr val="accent2"/>
+          </a:effectRef>
+          <a:fontRef idx="minor">
+            <a:schemeClr val="tx1"/>
+          </a:fontRef>
+        </p:style>
+      </p:cxnSp>
+      <p:cxnSp>
+        <p:nvCxnSpPr>
+          <p:cNvPr id="42" name="Straight Arrow Connector 41"/>
+          <p:cNvCxnSpPr/>
+          <p:nvPr/>
+        </p:nvCxnSpPr>
+        <p:spPr>
+          <a:xfrm flipV="1">
+            <a:off x="2819400" y="4038600"/>
+            <a:ext cx="0" cy="990600"/>
+          </a:xfrm>
+          <a:prstGeom prst="straightConnector1">
+            <a:avLst/>
+          </a:prstGeom>
+          <a:ln>
+            <a:solidFill>
+              <a:schemeClr val="accent6">
+                <a:lumMod val="75000"/>
+              </a:schemeClr>
+            </a:solidFill>
+            <a:prstDash val="sysDot"/>
+            <a:headEnd type="none" w="med" len="med"/>
+            <a:tailEnd type="none" w="med" len="med"/>
+          </a:ln>
+        </p:spPr>
+        <p:style>
+          <a:lnRef idx="2">
+            <a:schemeClr val="accent2"/>
+          </a:lnRef>
+          <a:fillRef idx="0">
+            <a:schemeClr val="accent2"/>
+          </a:fillRef>
+          <a:effectRef idx="1">
+            <a:schemeClr val="accent2"/>
+          </a:effectRef>
+          <a:fontRef idx="minor">
+            <a:schemeClr val="tx1"/>
+          </a:fontRef>
+        </p:style>
+      </p:cxnSp>
+      <p:cxnSp>
+        <p:nvCxnSpPr>
+          <p:cNvPr id="55" name="Straight Arrow Connector 54"/>
+          <p:cNvCxnSpPr/>
+          <p:nvPr/>
+        </p:nvCxnSpPr>
+        <p:spPr>
+          <a:xfrm flipH="1">
+            <a:off x="4406358" y="880110"/>
+            <a:ext cx="3442242" cy="9644"/>
+          </a:xfrm>
+          <a:prstGeom prst="straightConnector1">
+            <a:avLst/>
+          </a:prstGeom>
+          <a:ln>
+            <a:solidFill>
+              <a:schemeClr val="accent6">
+                <a:lumMod val="75000"/>
+              </a:schemeClr>
+            </a:solidFill>
+            <a:prstDash val="sysDot"/>
+            <a:headEnd type="none" w="med" len="med"/>
+            <a:tailEnd type="none" w="med" len="med"/>
+          </a:ln>
+        </p:spPr>
+        <p:style>
+          <a:lnRef idx="2">
+            <a:schemeClr val="accent2"/>
+          </a:lnRef>
+          <a:fillRef idx="0">
+            <a:schemeClr val="accent2"/>
+          </a:fillRef>
+          <a:effectRef idx="1">
+            <a:schemeClr val="accent2"/>
+          </a:effectRef>
+          <a:fontRef idx="minor">
+            <a:schemeClr val="tx1"/>
+          </a:fontRef>
+        </p:style>
+      </p:cxnSp>
+      <p:cxnSp>
+        <p:nvCxnSpPr>
+          <p:cNvPr id="56" name="Straight Arrow Connector 55"/>
+          <p:cNvCxnSpPr/>
+          <p:nvPr/>
+        </p:nvCxnSpPr>
+        <p:spPr>
+          <a:xfrm flipH="1">
+            <a:off x="3400330" y="1524000"/>
+            <a:ext cx="1447800" cy="0"/>
+          </a:xfrm>
+          <a:prstGeom prst="straightConnector1">
+            <a:avLst/>
+          </a:prstGeom>
+          <a:ln>
+            <a:solidFill>
+              <a:schemeClr val="accent6">
+                <a:lumMod val="75000"/>
+              </a:schemeClr>
+            </a:solidFill>
+            <a:prstDash val="sysDot"/>
+            <a:headEnd type="none" w="med" len="med"/>
+            <a:tailEnd type="none" w="med" len="med"/>
+          </a:ln>
+        </p:spPr>
+        <p:style>
+          <a:lnRef idx="2">
+            <a:schemeClr val="accent2"/>
+          </a:lnRef>
+          <a:fillRef idx="0">
+            <a:schemeClr val="accent2"/>
+          </a:fillRef>
+          <a:effectRef idx="1">
+            <a:schemeClr val="accent2"/>
+          </a:effectRef>
+          <a:fontRef idx="minor">
+            <a:schemeClr val="tx1"/>
+          </a:fontRef>
+        </p:style>
+      </p:cxnSp>
+      <p:cxnSp>
+        <p:nvCxnSpPr>
+          <p:cNvPr id="58" name="Straight Arrow Connector 57"/>
+          <p:cNvCxnSpPr/>
+          <p:nvPr/>
+        </p:nvCxnSpPr>
+        <p:spPr>
+          <a:xfrm>
+            <a:off x="7772400" y="621030"/>
+            <a:ext cx="0" cy="293619"/>
+          </a:xfrm>
+          <a:prstGeom prst="straightConnector1">
+            <a:avLst/>
+          </a:prstGeom>
+          <a:ln>
+            <a:solidFill>
+              <a:schemeClr val="accent6">
+                <a:lumMod val="75000"/>
+              </a:schemeClr>
+            </a:solidFill>
+            <a:prstDash val="sysDot"/>
+            <a:headEnd type="none" w="med" len="med"/>
+            <a:tailEnd type="arrow" w="med" len="med"/>
+          </a:ln>
+        </p:spPr>
+        <p:style>
+          <a:lnRef idx="2">
+            <a:schemeClr val="accent2"/>
+          </a:lnRef>
+          <a:fillRef idx="0">
+            <a:schemeClr val="accent2"/>
+          </a:fillRef>
+          <a:effectRef idx="1">
+            <a:schemeClr val="accent2"/>
+          </a:effectRef>
+          <a:fontRef idx="minor">
+            <a:schemeClr val="tx1"/>
+          </a:fontRef>
+        </p:style>
+      </p:cxnSp>
+      <p:sp>
+        <p:nvSpPr>
+          <p:cNvPr id="59" name="TextBox 58"/>
+          <p:cNvSpPr txBox="1"/>
+          <p:nvPr/>
+        </p:nvSpPr>
+        <p:spPr>
+          <a:xfrm>
+            <a:off x="7791489" y="533400"/>
+            <a:ext cx="1276311" cy="430887"/>
+          </a:xfrm>
+          <a:prstGeom prst="rect">
+            <a:avLst/>
+          </a:prstGeom>
+          <a:noFill/>
+        </p:spPr>
+        <p:txBody>
+          <a:bodyPr wrap="none" rtlCol="0">
+            <a:spAutoFit/>
+          </a:bodyPr>
+          <a:lstStyle/>
+          <a:p>
+            <a:r>
+              <a:rPr lang="en-US" sz="1100" dirty="0" smtClean="0">
+                <a:solidFill>
+                  <a:srgbClr val="FFC000"/>
+                </a:solidFill>
+              </a:rPr>
+              <a:t>Transducer</a:t>
+            </a:r>
+            <a:br>
+              <a:rPr lang="en-US" sz="1100" dirty="0" smtClean="0">
+                <a:solidFill>
+                  <a:srgbClr val="FFC000"/>
+                </a:solidFill>
+              </a:rPr>
+            </a:br>
+            <a:r>
+              <a:rPr lang="en-US" sz="1100" dirty="0" err="1" smtClean="0">
+                <a:solidFill>
+                  <a:srgbClr val="FFC000"/>
+                </a:solidFill>
+              </a:rPr>
+              <a:t>CenterPixel</a:t>
+            </a:r>
+            <a:r>
+              <a:rPr lang="en-US" sz="1100" dirty="0" smtClean="0">
+                <a:solidFill>
+                  <a:srgbClr val="FFC000"/>
+                </a:solidFill>
+              </a:rPr>
+              <a:t>[1] </a:t>
+            </a:r>
+            <a:r>
+              <a:rPr lang="en-US" sz="1100" dirty="0" smtClean="0">
+                <a:solidFill>
+                  <a:srgbClr val="FFC000"/>
+                </a:solidFill>
+              </a:rPr>
+              <a:t>= </a:t>
+            </a:r>
+            <a:r>
+              <a:rPr lang="en-US" sz="1100" dirty="0" smtClean="0">
+                <a:solidFill>
+                  <a:srgbClr val="FFC000"/>
+                </a:solidFill>
+              </a:rPr>
+              <a:t>15</a:t>
+            </a:r>
+            <a:endParaRPr lang="en-US" sz="1100" dirty="0">
+              <a:solidFill>
+                <a:srgbClr val="FFC000"/>
+              </a:solidFill>
+            </a:endParaRPr>
+          </a:p>
+        </p:txBody>
+      </p:sp>
+      <p:cxnSp>
+        <p:nvCxnSpPr>
+          <p:cNvPr id="60" name="Straight Arrow Connector 59"/>
+          <p:cNvCxnSpPr/>
+          <p:nvPr/>
+        </p:nvCxnSpPr>
+        <p:spPr>
+          <a:xfrm>
+            <a:off x="1344662" y="1931768"/>
+            <a:ext cx="1474738" cy="0"/>
+          </a:xfrm>
+          <a:prstGeom prst="straightConnector1">
+            <a:avLst/>
+          </a:prstGeom>
+          <a:ln>
+            <a:solidFill>
+              <a:schemeClr val="accent6">
+                <a:lumMod val="75000"/>
+              </a:schemeClr>
+            </a:solidFill>
+            <a:prstDash val="sysDot"/>
+            <a:headEnd type="none" w="med" len="med"/>
+            <a:tailEnd type="arrow" w="med" len="med"/>
+          </a:ln>
+        </p:spPr>
+        <p:style>
+          <a:lnRef idx="2">
+            <a:schemeClr val="accent2"/>
+          </a:lnRef>
+          <a:fillRef idx="0">
+            <a:schemeClr val="accent2"/>
+          </a:fillRef>
+          <a:effectRef idx="1">
+            <a:schemeClr val="accent2"/>
+          </a:effectRef>
+          <a:fontRef idx="minor">
+            <a:schemeClr val="tx1"/>
+          </a:fontRef>
+        </p:style>
+      </p:cxnSp>
+      <p:sp>
+        <p:nvSpPr>
+          <p:cNvPr id="64" name="TextBox 63"/>
+          <p:cNvSpPr txBox="1"/>
+          <p:nvPr/>
+        </p:nvSpPr>
+        <p:spPr>
+          <a:xfrm>
+            <a:off x="753553" y="1643390"/>
+            <a:ext cx="1989647" cy="261610"/>
+          </a:xfrm>
+          <a:prstGeom prst="rect">
+            <a:avLst/>
+          </a:prstGeom>
+          <a:noFill/>
+        </p:spPr>
+        <p:txBody>
+          <a:bodyPr wrap="none" rtlCol="0">
+            <a:spAutoFit/>
+          </a:bodyPr>
+          <a:lstStyle/>
+          <a:p>
+            <a:r>
+              <a:rPr lang="en-US" sz="1100" dirty="0" err="1" smtClean="0">
+                <a:solidFill>
+                  <a:srgbClr val="FFC000"/>
+                </a:solidFill>
+              </a:rPr>
+              <a:t>TransducerCenterPixel</a:t>
+            </a:r>
+            <a:r>
+              <a:rPr lang="en-US" sz="1100" dirty="0" smtClean="0">
+                <a:solidFill>
+                  <a:srgbClr val="FFC000"/>
+                </a:solidFill>
+              </a:rPr>
+              <a:t>[0] </a:t>
+            </a:r>
+            <a:r>
+              <a:rPr lang="en-US" sz="1100" dirty="0" smtClean="0">
+                <a:solidFill>
+                  <a:srgbClr val="FFC000"/>
+                </a:solidFill>
+              </a:rPr>
+              <a:t>= </a:t>
+            </a:r>
+            <a:r>
+              <a:rPr lang="en-US" sz="1100" dirty="0" smtClean="0">
+                <a:solidFill>
+                  <a:srgbClr val="FFC000"/>
+                </a:solidFill>
+              </a:rPr>
+              <a:t>150</a:t>
+            </a:r>
+            <a:endParaRPr lang="en-US" sz="1100" dirty="0">
+              <a:solidFill>
+                <a:srgbClr val="FFC000"/>
+              </a:solidFill>
+            </a:endParaRPr>
+          </a:p>
+        </p:txBody>
+      </p:sp>
+      <p:cxnSp>
+        <p:nvCxnSpPr>
+          <p:cNvPr id="65" name="Straight Arrow Connector 64"/>
+          <p:cNvCxnSpPr/>
+          <p:nvPr/>
+        </p:nvCxnSpPr>
+        <p:spPr>
+          <a:xfrm flipH="1" flipV="1">
+            <a:off x="4406358" y="621030"/>
+            <a:ext cx="3432581" cy="16454"/>
+          </a:xfrm>
+          <a:prstGeom prst="straightConnector1">
+            <a:avLst/>
+          </a:prstGeom>
+          <a:ln>
+            <a:solidFill>
+              <a:schemeClr val="accent6">
+                <a:lumMod val="75000"/>
+              </a:schemeClr>
+            </a:solidFill>
+            <a:prstDash val="sysDot"/>
+            <a:headEnd type="none" w="med" len="med"/>
+            <a:tailEnd type="none" w="med" len="med"/>
+          </a:ln>
+        </p:spPr>
+        <p:style>
+          <a:lnRef idx="2">
+            <a:schemeClr val="accent2"/>
+          </a:lnRef>
+          <a:fillRef idx="0">
+            <a:schemeClr val="accent2"/>
+          </a:fillRef>
+          <a:effectRef idx="1">
+            <a:schemeClr val="accent2"/>
+          </a:effectRef>
+          <a:fontRef idx="minor">
+            <a:schemeClr val="tx1"/>
+          </a:fontRef>
+        </p:style>
+      </p:cxnSp>
+      <p:cxnSp>
+        <p:nvCxnSpPr>
+          <p:cNvPr id="66" name="Straight Arrow Connector 65"/>
+          <p:cNvCxnSpPr/>
+          <p:nvPr/>
+        </p:nvCxnSpPr>
+        <p:spPr>
+          <a:xfrm flipV="1">
+            <a:off x="2819400" y="621030"/>
+            <a:ext cx="0" cy="1436370"/>
+          </a:xfrm>
+          <a:prstGeom prst="straightConnector1">
+            <a:avLst/>
+          </a:prstGeom>
+          <a:ln>
+            <a:solidFill>
+              <a:schemeClr val="accent6">
+                <a:lumMod val="75000"/>
+              </a:schemeClr>
+            </a:solidFill>
+            <a:prstDash val="sysDot"/>
+            <a:headEnd type="none" w="med" len="med"/>
+            <a:tailEnd type="none" w="med" len="med"/>
+          </a:ln>
+        </p:spPr>
+        <p:style>
+          <a:lnRef idx="2">
+            <a:schemeClr val="accent2"/>
+          </a:lnRef>
+          <a:fillRef idx="0">
+            <a:schemeClr val="accent2"/>
+          </a:fillRef>
+          <a:effectRef idx="1">
+            <a:schemeClr val="accent2"/>
+          </a:effectRef>
+          <a:fontRef idx="minor">
+            <a:schemeClr val="tx1"/>
+          </a:fontRef>
+        </p:style>
+      </p:cxnSp>
+      <p:cxnSp>
+        <p:nvCxnSpPr>
+          <p:cNvPr id="67" name="Straight Arrow Connector 66"/>
+          <p:cNvCxnSpPr/>
+          <p:nvPr/>
+        </p:nvCxnSpPr>
+        <p:spPr>
+          <a:xfrm flipV="1">
+            <a:off x="1371600" y="609600"/>
+            <a:ext cx="0" cy="1436370"/>
+          </a:xfrm>
+          <a:prstGeom prst="straightConnector1">
+            <a:avLst/>
+          </a:prstGeom>
+          <a:ln>
+            <a:solidFill>
+              <a:schemeClr val="accent6">
+                <a:lumMod val="75000"/>
+              </a:schemeClr>
+            </a:solidFill>
+            <a:prstDash val="sysDot"/>
+            <a:headEnd type="none" w="med" len="med"/>
+            <a:tailEnd type="none" w="med" len="med"/>
+          </a:ln>
+        </p:spPr>
+        <p:style>
+          <a:lnRef idx="2">
+            <a:schemeClr val="accent2"/>
+          </a:lnRef>
+          <a:fillRef idx="0">
+            <a:schemeClr val="accent2"/>
+          </a:fillRef>
+          <a:effectRef idx="1">
+            <a:schemeClr val="accent2"/>
+          </a:effectRef>
+          <a:fontRef idx="minor">
+            <a:schemeClr val="tx1"/>
+          </a:fontRef>
+        </p:style>
+      </p:cxnSp>
     </p:spTree>
     <p:extLst>
       <p:ext uri="{BB962C8B-B14F-4D97-AF65-F5344CB8AC3E}">

</xml_diff>

<commit_message>
re #922: Updated clipping fan parameters description in documentation
git-svn-id: https://subversion.assembla.com/svn/plus/trunk/doc@3576 c04e96f8-ac36-4ff2-8b34-4a5e34ef045f
</commit_message>
<xml_diff>
--- a/specifications/UltrasoundImageOrientation.pptx
+++ b/specifications/UltrasoundImageOrientation.pptx
@@ -11,8 +11,8 @@
     <p:sldId id="256" r:id="rId2"/>
     <p:sldId id="257" r:id="rId3"/>
     <p:sldId id="258" r:id="rId4"/>
-    <p:sldId id="259" r:id="rId5"/>
-    <p:sldId id="260" r:id="rId6"/>
+    <p:sldId id="260" r:id="rId5"/>
+    <p:sldId id="259" r:id="rId6"/>
     <p:sldId id="261" r:id="rId7"/>
     <p:sldId id="263" r:id="rId8"/>
     <p:sldId id="262" r:id="rId9"/>
@@ -114,6 +114,22 @@
       </a:defRPr>
     </a:lvl9pPr>
   </p:defaultTextStyle>
+  <p:extLst>
+    <p:ext uri="{EFAFB233-063F-42B5-8137-9DF3F51BA10A}">
+      <p15:sldGuideLst xmlns:p15="http://schemas.microsoft.com/office/powerpoint/2012/main">
+        <p15:guide id="1" orient="horz" pos="2160">
+          <p15:clr>
+            <a:srgbClr val="A4A3A4"/>
+          </p15:clr>
+        </p15:guide>
+        <p15:guide id="2" pos="5424">
+          <p15:clr>
+            <a:srgbClr val="A4A3A4"/>
+          </p15:clr>
+        </p15:guide>
+      </p15:sldGuideLst>
+    </p:ext>
+  </p:extLst>
 </p:presentation>
 </file>
 
@@ -199,7 +215,7 @@
           <a:p>
             <a:fld id="{96529989-2A3A-4071-8AAB-A4A4DA00AA76}" type="datetimeFigureOut">
               <a:rPr lang="en-CA" smtClean="0"/>
-              <a:t>2014-02-15</a:t>
+              <a:t>2014-08-06</a:t>
             </a:fld>
             <a:endParaRPr lang="en-CA"/>
           </a:p>
@@ -648,7 +664,7 @@
           <a:p>
             <a:fld id="{9BAB7AD8-7DA6-49ED-A6A1-3E576430A444}" type="datetime1">
               <a:rPr lang="en-US" smtClean="0"/>
-              <a:t>2/15/2014</a:t>
+              <a:t>8/6/2014</a:t>
             </a:fld>
             <a:endParaRPr lang="en-US"/>
           </a:p>
@@ -818,7 +834,7 @@
           <a:p>
             <a:fld id="{6A30A583-A045-42C3-B180-810431823F7C}" type="datetime1">
               <a:rPr lang="en-US" smtClean="0"/>
-              <a:t>2/15/2014</a:t>
+              <a:t>8/6/2014</a:t>
             </a:fld>
             <a:endParaRPr lang="en-US"/>
           </a:p>
@@ -998,7 +1014,7 @@
           <a:p>
             <a:fld id="{8C706EE2-A389-49DA-852C-A25EEA0096A5}" type="datetime1">
               <a:rPr lang="en-US" smtClean="0"/>
-              <a:t>2/15/2014</a:t>
+              <a:t>8/6/2014</a:t>
             </a:fld>
             <a:endParaRPr lang="en-US"/>
           </a:p>
@@ -1168,7 +1184,7 @@
           <a:p>
             <a:fld id="{FAE799BF-65A4-44D1-9626-4CB2683479A0}" type="datetime1">
               <a:rPr lang="en-US" smtClean="0"/>
-              <a:t>2/15/2014</a:t>
+              <a:t>8/6/2014</a:t>
             </a:fld>
             <a:endParaRPr lang="en-US"/>
           </a:p>
@@ -1414,7 +1430,7 @@
           <a:p>
             <a:fld id="{C58770DA-FA6F-402B-A47E-99A02268F9C9}" type="datetime1">
               <a:rPr lang="en-US" smtClean="0"/>
-              <a:t>2/15/2014</a:t>
+              <a:t>8/6/2014</a:t>
             </a:fld>
             <a:endParaRPr lang="en-US"/>
           </a:p>
@@ -1702,7 +1718,7 @@
           <a:p>
             <a:fld id="{D7425FA0-417C-40D8-84E5-0BBAE59E3627}" type="datetime1">
               <a:rPr lang="en-US" smtClean="0"/>
-              <a:t>2/15/2014</a:t>
+              <a:t>8/6/2014</a:t>
             </a:fld>
             <a:endParaRPr lang="en-US"/>
           </a:p>
@@ -2124,7 +2140,7 @@
           <a:p>
             <a:fld id="{84DF6B02-38C3-4CBB-A488-70C85C7D6D5F}" type="datetime1">
               <a:rPr lang="en-US" smtClean="0"/>
-              <a:t>2/15/2014</a:t>
+              <a:t>8/6/2014</a:t>
             </a:fld>
             <a:endParaRPr lang="en-US"/>
           </a:p>
@@ -2242,7 +2258,7 @@
           <a:p>
             <a:fld id="{E82731BF-6D24-4EBE-983D-DBF326ECDFD5}" type="datetime1">
               <a:rPr lang="en-US" smtClean="0"/>
-              <a:t>2/15/2014</a:t>
+              <a:t>8/6/2014</a:t>
             </a:fld>
             <a:endParaRPr lang="en-US"/>
           </a:p>
@@ -2337,7 +2353,7 @@
           <a:p>
             <a:fld id="{11A30BEF-A390-4EED-B356-2EDD103CB91A}" type="datetime1">
               <a:rPr lang="en-US" smtClean="0"/>
-              <a:t>2/15/2014</a:t>
+              <a:t>8/6/2014</a:t>
             </a:fld>
             <a:endParaRPr lang="en-US"/>
           </a:p>
@@ -2614,7 +2630,7 @@
           <a:p>
             <a:fld id="{2EFEA545-71A4-4166-A3E6-0B73A95A4B04}" type="datetime1">
               <a:rPr lang="en-US" smtClean="0"/>
-              <a:t>2/15/2014</a:t>
+              <a:t>8/6/2014</a:t>
             </a:fld>
             <a:endParaRPr lang="en-US"/>
           </a:p>
@@ -2867,7 +2883,7 @@
           <a:p>
             <a:fld id="{6BA77AC2-5E11-4AE9-8C29-3721D388FBC1}" type="datetime1">
               <a:rPr lang="en-US" smtClean="0"/>
-              <a:t>2/15/2014</a:t>
+              <a:t>8/6/2014</a:t>
             </a:fld>
             <a:endParaRPr lang="en-US"/>
           </a:p>
@@ -3080,7 +3096,7 @@
           <a:p>
             <a:fld id="{C405AE0A-D4D8-4B96-AA9E-22A2EF91B3C7}" type="datetime1">
               <a:rPr lang="en-US" smtClean="0"/>
-              <a:t>2/15/2014</a:t>
+              <a:t>8/6/2014</a:t>
             </a:fld>
             <a:endParaRPr lang="en-US"/>
           </a:p>
@@ -5705,8 +5721,8 @@
         </p:blipFill>
         <p:spPr bwMode="auto">
           <a:xfrm>
-            <a:off x="1746248" y="518160"/>
-            <a:ext cx="5943600" cy="4495800"/>
+            <a:off x="1849241" y="381000"/>
+            <a:ext cx="5931887" cy="4486940"/>
           </a:xfrm>
           <a:prstGeom prst="rect">
             <a:avLst/>
@@ -5728,8 +5744,8 @@
         </p:nvSpPr>
         <p:spPr>
           <a:xfrm>
-            <a:off x="6159500" y="518160"/>
-            <a:ext cx="1814706" cy="646331"/>
+            <a:off x="5817994" y="4849183"/>
+            <a:ext cx="2792606" cy="369332"/>
           </a:xfrm>
           <a:prstGeom prst="rect">
             <a:avLst/>
@@ -5744,29 +5760,10 @@
           <a:p>
             <a:pPr marL="342900" indent="-342900"/>
             <a:r>
-              <a:rPr lang="en-US" dirty="0" smtClean="0">
-                <a:solidFill>
-                  <a:schemeClr val="bg1"/>
-                </a:solidFill>
-              </a:rPr>
-              <a:t>Image size: </a:t>
-            </a:r>
-          </a:p>
-          <a:p>
-            <a:pPr marL="342900" indent="-342900"/>
-            <a:r>
-              <a:rPr lang="en-US" dirty="0" smtClean="0">
-                <a:solidFill>
-                  <a:schemeClr val="bg1"/>
-                </a:solidFill>
-              </a:rPr>
-              <a:t>640x480 pixels</a:t>
-            </a:r>
-            <a:endParaRPr lang="en-US" dirty="0">
-              <a:solidFill>
-                <a:schemeClr val="bg1"/>
-              </a:solidFill>
-            </a:endParaRPr>
+              <a:rPr lang="en-US" dirty="0" smtClean="0"/>
+              <a:t>Image size: 640x480 pixels</a:t>
+            </a:r>
+            <a:endParaRPr lang="en-US" dirty="0"/>
           </a:p>
         </p:txBody>
       </p:sp>
@@ -5778,7 +5775,7 @@
         </p:nvCxnSpPr>
         <p:spPr>
           <a:xfrm>
-            <a:off x="4698865" y="1276988"/>
+            <a:off x="4786929" y="1745328"/>
             <a:ext cx="609600" cy="0"/>
           </a:xfrm>
           <a:prstGeom prst="straightConnector1">
@@ -5816,7 +5813,7 @@
         </p:nvCxnSpPr>
         <p:spPr>
           <a:xfrm flipV="1">
-            <a:off x="4700453" y="665800"/>
+            <a:off x="4788517" y="1134140"/>
             <a:ext cx="0" cy="609600"/>
           </a:xfrm>
           <a:prstGeom prst="straightConnector1">
@@ -5854,7 +5851,7 @@
         </p:nvSpPr>
         <p:spPr>
           <a:xfrm>
-            <a:off x="4101264" y="894400"/>
+            <a:off x="4189328" y="1362740"/>
             <a:ext cx="332142" cy="369332"/>
           </a:xfrm>
           <a:prstGeom prst="rect">
@@ -5892,7 +5889,7 @@
         </p:nvSpPr>
         <p:spPr>
           <a:xfrm>
-            <a:off x="4698865" y="1504000"/>
+            <a:off x="4786929" y="1972340"/>
             <a:ext cx="333746" cy="369332"/>
           </a:xfrm>
           <a:prstGeom prst="rect">
@@ -5930,7 +5927,7 @@
         </p:nvCxnSpPr>
         <p:spPr>
           <a:xfrm>
-            <a:off x="4698071" y="1276194"/>
+            <a:off x="4786135" y="1744534"/>
             <a:ext cx="0" cy="532606"/>
           </a:xfrm>
           <a:prstGeom prst="straightConnector1">
@@ -5969,7 +5966,7 @@
         </p:nvSpPr>
         <p:spPr>
           <a:xfrm>
-            <a:off x="4698865" y="589600"/>
+            <a:off x="4786929" y="1057940"/>
             <a:ext cx="290464" cy="369332"/>
           </a:xfrm>
           <a:prstGeom prst="rect">
@@ -6007,7 +6004,7 @@
         </p:nvCxnSpPr>
         <p:spPr>
           <a:xfrm flipH="1" flipV="1">
-            <a:off x="4102100" y="1263732"/>
+            <a:off x="4190164" y="1732072"/>
             <a:ext cx="596765" cy="11668"/>
           </a:xfrm>
           <a:prstGeom prst="straightConnector1">
@@ -6046,7 +6043,7 @@
         </p:nvSpPr>
         <p:spPr>
           <a:xfrm>
-            <a:off x="5092700" y="894400"/>
+            <a:off x="5180764" y="1362740"/>
             <a:ext cx="381836" cy="369332"/>
           </a:xfrm>
           <a:prstGeom prst="rect">
@@ -6071,291 +6068,6 @@
           </a:p>
         </p:txBody>
       </p:sp>
-      <p:sp>
-        <p:nvSpPr>
-          <p:cNvPr id="34" name="Pie 33"/>
-          <p:cNvSpPr/>
-          <p:nvPr/>
-        </p:nvSpPr>
-        <p:spPr>
-          <a:xfrm rot="10800000">
-            <a:off x="876300" y="975360"/>
-            <a:ext cx="7696200" cy="7467599"/>
-          </a:xfrm>
-          <a:prstGeom prst="pie">
-            <a:avLst>
-              <a:gd name="adj1" fmla="val 601583"/>
-              <a:gd name="adj2" fmla="val 10371574"/>
-            </a:avLst>
-          </a:prstGeom>
-          <a:noFill/>
-          <a:ln>
-            <a:solidFill>
-              <a:srgbClr val="FF0000"/>
-            </a:solidFill>
-          </a:ln>
-        </p:spPr>
-        <p:style>
-          <a:lnRef idx="2">
-            <a:schemeClr val="accent1">
-              <a:shade val="50000"/>
-            </a:schemeClr>
-          </a:lnRef>
-          <a:fillRef idx="1">
-            <a:schemeClr val="accent1"/>
-          </a:fillRef>
-          <a:effectRef idx="0">
-            <a:schemeClr val="accent1"/>
-          </a:effectRef>
-          <a:fontRef idx="minor">
-            <a:schemeClr val="lt1"/>
-          </a:fontRef>
-        </p:style>
-        <p:txBody>
-          <a:bodyPr rtlCol="0" anchor="ctr"/>
-          <a:lstStyle/>
-          <a:p>
-            <a:pPr algn="ctr"/>
-            <a:endParaRPr lang="en-CA">
-              <a:solidFill>
-                <a:schemeClr val="tx1"/>
-              </a:solidFill>
-            </a:endParaRPr>
-          </a:p>
-        </p:txBody>
-      </p:sp>
-      <p:cxnSp>
-        <p:nvCxnSpPr>
-          <p:cNvPr id="35" name="Straight Arrow Connector 34"/>
-          <p:cNvCxnSpPr/>
-          <p:nvPr/>
-        </p:nvCxnSpPr>
-        <p:spPr>
-          <a:xfrm>
-            <a:off x="4711700" y="2951800"/>
-            <a:ext cx="0" cy="1752600"/>
-          </a:xfrm>
-          <a:prstGeom prst="straightConnector1">
-            <a:avLst/>
-          </a:prstGeom>
-          <a:ln>
-            <a:solidFill>
-              <a:schemeClr val="accent6">
-                <a:lumMod val="75000"/>
-              </a:schemeClr>
-            </a:solidFill>
-            <a:prstDash val="sysDot"/>
-            <a:headEnd type="none" w="med" len="med"/>
-            <a:tailEnd type="none" w="med" len="med"/>
-          </a:ln>
-        </p:spPr>
-        <p:style>
-          <a:lnRef idx="2">
-            <a:schemeClr val="accent2"/>
-          </a:lnRef>
-          <a:fillRef idx="0">
-            <a:schemeClr val="accent2"/>
-          </a:fillRef>
-          <a:effectRef idx="1">
-            <a:schemeClr val="accent2"/>
-          </a:effectRef>
-          <a:fontRef idx="minor">
-            <a:schemeClr val="tx1"/>
-          </a:fontRef>
-        </p:style>
-      </p:cxnSp>
-      <p:sp>
-        <p:nvSpPr>
-          <p:cNvPr id="38" name="Arc 37"/>
-          <p:cNvSpPr/>
-          <p:nvPr/>
-        </p:nvSpPr>
-        <p:spPr>
-          <a:xfrm flipH="1">
-            <a:off x="3784600" y="4010660"/>
-            <a:ext cx="1861184" cy="1752600"/>
-          </a:xfrm>
-          <a:prstGeom prst="arc">
-            <a:avLst>
-              <a:gd name="adj1" fmla="val 16200000"/>
-              <a:gd name="adj2" fmla="val 20370779"/>
-            </a:avLst>
-          </a:prstGeom>
-          <a:ln>
-            <a:solidFill>
-              <a:schemeClr val="accent6">
-                <a:lumMod val="75000"/>
-              </a:schemeClr>
-            </a:solidFill>
-            <a:prstDash val="sysDot"/>
-            <a:tailEnd type="arrow"/>
-          </a:ln>
-        </p:spPr>
-        <p:style>
-          <a:lnRef idx="2">
-            <a:schemeClr val="accent2"/>
-          </a:lnRef>
-          <a:fillRef idx="0">
-            <a:schemeClr val="accent2"/>
-          </a:fillRef>
-          <a:effectRef idx="1">
-            <a:schemeClr val="accent2"/>
-          </a:effectRef>
-          <a:fontRef idx="minor">
-            <a:schemeClr val="tx1"/>
-          </a:fontRef>
-        </p:style>
-        <p:txBody>
-          <a:bodyPr rtlCol="0" anchor="ctr"/>
-          <a:lstStyle/>
-          <a:p>
-            <a:pPr algn="ctr"/>
-            <a:endParaRPr lang="en-CA"/>
-          </a:p>
-        </p:txBody>
-      </p:sp>
-      <p:sp>
-        <p:nvSpPr>
-          <p:cNvPr id="39" name="Arc 38"/>
-          <p:cNvSpPr/>
-          <p:nvPr/>
-        </p:nvSpPr>
-        <p:spPr>
-          <a:xfrm>
-            <a:off x="3845242" y="3870960"/>
-            <a:ext cx="1780858" cy="1981200"/>
-          </a:xfrm>
-          <a:prstGeom prst="arc">
-            <a:avLst>
-              <a:gd name="adj1" fmla="val 16200000"/>
-              <a:gd name="adj2" fmla="val 20370779"/>
-            </a:avLst>
-          </a:prstGeom>
-          <a:ln>
-            <a:solidFill>
-              <a:schemeClr val="accent6">
-                <a:lumMod val="75000"/>
-              </a:schemeClr>
-            </a:solidFill>
-            <a:prstDash val="sysDot"/>
-            <a:tailEnd type="arrow"/>
-          </a:ln>
-        </p:spPr>
-        <p:style>
-          <a:lnRef idx="2">
-            <a:schemeClr val="accent2"/>
-          </a:lnRef>
-          <a:fillRef idx="0">
-            <a:schemeClr val="accent2"/>
-          </a:fillRef>
-          <a:effectRef idx="1">
-            <a:schemeClr val="accent2"/>
-          </a:effectRef>
-          <a:fontRef idx="minor">
-            <a:schemeClr val="tx1"/>
-          </a:fontRef>
-        </p:style>
-        <p:txBody>
-          <a:bodyPr rtlCol="0" anchor="ctr"/>
-          <a:lstStyle/>
-          <a:p>
-            <a:pPr algn="ctr"/>
-            <a:endParaRPr lang="en-CA"/>
-          </a:p>
-        </p:txBody>
-      </p:sp>
-      <p:sp>
-        <p:nvSpPr>
-          <p:cNvPr id="40" name="TextBox 39"/>
-          <p:cNvSpPr txBox="1"/>
-          <p:nvPr/>
-        </p:nvSpPr>
-        <p:spPr>
-          <a:xfrm>
-            <a:off x="2044700" y="3713800"/>
-            <a:ext cx="2462725" cy="369332"/>
-          </a:xfrm>
-          <a:prstGeom prst="rect">
-            <a:avLst/>
-          </a:prstGeom>
-          <a:noFill/>
-        </p:spPr>
-        <p:txBody>
-          <a:bodyPr wrap="none" rtlCol="0">
-            <a:spAutoFit/>
-          </a:bodyPr>
-          <a:lstStyle/>
-          <a:p>
-            <a:r>
-              <a:rPr lang="en-US" dirty="0" err="1" smtClean="0">
-                <a:solidFill>
-                  <a:srgbClr val="FFC000"/>
-                </a:solidFill>
-              </a:rPr>
-              <a:t>FanAngles</a:t>
-            </a:r>
-            <a:r>
-              <a:rPr lang="en-US" dirty="0" smtClean="0">
-                <a:solidFill>
-                  <a:srgbClr val="FFC000"/>
-                </a:solidFill>
-              </a:rPr>
-              <a:t>[1] = -60 (deg)</a:t>
-            </a:r>
-            <a:endParaRPr lang="en-US" dirty="0">
-              <a:solidFill>
-                <a:srgbClr val="FFC000"/>
-              </a:solidFill>
-            </a:endParaRPr>
-          </a:p>
-        </p:txBody>
-      </p:sp>
-      <p:sp>
-        <p:nvSpPr>
-          <p:cNvPr id="41" name="TextBox 40"/>
-          <p:cNvSpPr txBox="1"/>
-          <p:nvPr/>
-        </p:nvSpPr>
-        <p:spPr>
-          <a:xfrm>
-            <a:off x="5016500" y="3561400"/>
-            <a:ext cx="2392193" cy="369332"/>
-          </a:xfrm>
-          <a:prstGeom prst="rect">
-            <a:avLst/>
-          </a:prstGeom>
-          <a:noFill/>
-        </p:spPr>
-        <p:txBody>
-          <a:bodyPr wrap="none" rtlCol="0">
-            <a:spAutoFit/>
-          </a:bodyPr>
-          <a:lstStyle/>
-          <a:p>
-            <a:r>
-              <a:rPr lang="en-US" dirty="0" err="1" smtClean="0">
-                <a:solidFill>
-                  <a:srgbClr val="FFC000"/>
-                </a:solidFill>
-              </a:rPr>
-              <a:t>FanAngles</a:t>
-            </a:r>
-            <a:r>
-              <a:rPr lang="en-US" dirty="0" smtClean="0">
-                <a:solidFill>
-                  <a:srgbClr val="FFC000"/>
-                </a:solidFill>
-              </a:rPr>
-              <a:t>[2] = 60 (deg)</a:t>
-            </a:r>
-            <a:endParaRPr lang="en-US" dirty="0">
-              <a:solidFill>
-                <a:srgbClr val="FFC000"/>
-              </a:solidFill>
-            </a:endParaRPr>
-          </a:p>
-        </p:txBody>
-      </p:sp>
       <p:cxnSp>
         <p:nvCxnSpPr>
           <p:cNvPr id="42" name="Straight Arrow Connector 41"/>
@@ -6364,8 +6076,8 @@
         </p:nvCxnSpPr>
         <p:spPr>
           <a:xfrm flipH="1">
-            <a:off x="4686300" y="4323400"/>
-            <a:ext cx="3873500" cy="495300"/>
+            <a:off x="2007994" y="4029740"/>
+            <a:ext cx="5656788" cy="0"/>
           </a:xfrm>
           <a:prstGeom prst="straightConnector1">
             <a:avLst/>
@@ -6404,8 +6116,8 @@
         </p:nvSpPr>
         <p:spPr>
           <a:xfrm>
-            <a:off x="5702300" y="4628200"/>
-            <a:ext cx="2386679" cy="369332"/>
+            <a:off x="3280566" y="3637072"/>
+            <a:ext cx="4796634" cy="369332"/>
           </a:xfrm>
           <a:prstGeom prst="rect">
             <a:avLst/>
@@ -6418,13 +6130,14 @@
           </a:bodyPr>
           <a:lstStyle/>
           <a:p>
+            <a:pPr marL="273050" indent="-273050"/>
             <a:r>
               <a:rPr lang="en-US" dirty="0" err="1" smtClean="0">
                 <a:solidFill>
                   <a:srgbClr val="FFC000"/>
                 </a:solidFill>
               </a:rPr>
-              <a:t>FanDepth</a:t>
+              <a:t>ClipRectangleSize</a:t>
             </a:r>
             <a:r>
               <a:rPr lang="en-US" dirty="0" smtClean="0">
@@ -6432,7 +6145,7 @@
                   <a:srgbClr val="FFC000"/>
                 </a:solidFill>
               </a:rPr>
-              <a:t> = 450 (pixels)</a:t>
+              <a:t> (first component) = 600 (pixels)</a:t>
             </a:r>
             <a:endParaRPr lang="en-US" dirty="0">
               <a:solidFill>
@@ -6450,8 +6163,8 @@
         </p:nvSpPr>
         <p:spPr>
           <a:xfrm>
-            <a:off x="3111500" y="5242560"/>
-            <a:ext cx="2717924" cy="369332"/>
+            <a:off x="1705754" y="5096540"/>
+            <a:ext cx="3655040" cy="369332"/>
           </a:xfrm>
           <a:prstGeom prst="rect">
             <a:avLst/>
@@ -6470,7 +6183,7 @@
                   <a:srgbClr val="FFC000"/>
                 </a:solidFill>
               </a:rPr>
-              <a:t>FanOrigin</a:t>
+              <a:t>ClipRectangleOrigin</a:t>
             </a:r>
             <a:r>
               <a:rPr lang="en-US" dirty="0" smtClean="0">
@@ -6478,7 +6191,7 @@
                   <a:srgbClr val="FFC000"/>
                 </a:solidFill>
               </a:rPr>
-              <a:t> = 320  40 (pixels)</a:t>
+              <a:t> = 20  40 (pixels)</a:t>
             </a:r>
             <a:endParaRPr lang="en-US" dirty="0">
               <a:solidFill>
@@ -6495,9 +6208,9 @@
           <p:nvPr/>
         </p:nvCxnSpPr>
         <p:spPr>
-          <a:xfrm flipV="1">
-            <a:off x="4178300" y="4704400"/>
-            <a:ext cx="533400" cy="614360"/>
+          <a:xfrm flipH="1" flipV="1">
+            <a:off x="2013682" y="4486940"/>
+            <a:ext cx="152400" cy="609600"/>
           </a:xfrm>
           <a:prstGeom prst="straightConnector1">
             <a:avLst/>
@@ -6534,7 +6247,7 @@
         </p:nvCxnSpPr>
         <p:spPr>
           <a:xfrm flipV="1">
-            <a:off x="1727200" y="5013960"/>
+            <a:off x="1830194" y="4867940"/>
             <a:ext cx="685800" cy="1588"/>
           </a:xfrm>
           <a:prstGeom prst="straightConnector1">
@@ -6582,7 +6295,7 @@
         </p:nvCxnSpPr>
         <p:spPr>
           <a:xfrm flipV="1">
-            <a:off x="1727200" y="4328160"/>
+            <a:off x="1830194" y="4182140"/>
             <a:ext cx="0" cy="685800"/>
           </a:xfrm>
           <a:prstGeom prst="straightConnector1">
@@ -6630,8 +6343,8 @@
         </p:nvSpPr>
         <p:spPr>
           <a:xfrm>
-            <a:off x="152400" y="4404360"/>
-            <a:ext cx="1591839" cy="861774"/>
+            <a:off x="255394" y="4258340"/>
+            <a:ext cx="1591839" cy="954107"/>
           </a:xfrm>
           <a:prstGeom prst="rect">
             <a:avLst/>
@@ -6646,7 +6359,7 @@
           <a:p>
             <a:pPr marL="342900" indent="-342900" algn="r"/>
             <a:r>
-              <a:rPr lang="en-US" sz="1600" b="1" dirty="0" smtClean="0">
+              <a:rPr lang="en-US" b="1" dirty="0" smtClean="0">
                 <a:solidFill>
                   <a:srgbClr val="FFC000"/>
                 </a:solidFill>
@@ -6654,7 +6367,7 @@
               <a:t>MF</a:t>
             </a:r>
             <a:r>
-              <a:rPr lang="en-US" sz="1600" dirty="0" smtClean="0">
+              <a:rPr lang="en-US" dirty="0" smtClean="0">
                 <a:solidFill>
                   <a:srgbClr val="FFC000"/>
                 </a:solidFill>
@@ -6665,12 +6378,12 @@
           <a:p>
             <a:pPr marL="342900" indent="-342900" algn="r"/>
             <a:r>
-              <a:rPr lang="en-US" sz="1600" dirty="0" smtClean="0">
+              <a:rPr lang="en-US" dirty="0" smtClean="0">
                 <a:solidFill>
                   <a:srgbClr val="FFC000"/>
                 </a:solidFill>
               </a:rPr>
-              <a:t>System origin</a:t>
+              <a:t>system origin</a:t>
             </a:r>
           </a:p>
           <a:p>
@@ -6693,14 +6406,146 @@
       </p:sp>
       <p:sp>
         <p:nvSpPr>
-          <p:cNvPr id="46" name="TextBox 45"/>
+          <p:cNvPr id="27" name="Rectangle 26"/>
+          <p:cNvSpPr/>
+          <p:nvPr/>
+        </p:nvSpPr>
+        <p:spPr>
+          <a:xfrm>
+            <a:off x="2007994" y="817672"/>
+            <a:ext cx="5656788" cy="3669268"/>
+          </a:xfrm>
+          <a:prstGeom prst="rect">
+            <a:avLst/>
+          </a:prstGeom>
+          <a:noFill/>
+          <a:ln>
+            <a:solidFill>
+              <a:srgbClr val="FF0000"/>
+            </a:solidFill>
+          </a:ln>
+        </p:spPr>
+        <p:style>
+          <a:lnRef idx="2">
+            <a:schemeClr val="accent1">
+              <a:shade val="50000"/>
+            </a:schemeClr>
+          </a:lnRef>
+          <a:fillRef idx="1">
+            <a:schemeClr val="accent1"/>
+          </a:fillRef>
+          <a:effectRef idx="0">
+            <a:schemeClr val="accent1"/>
+          </a:effectRef>
+          <a:fontRef idx="minor">
+            <a:schemeClr val="lt1"/>
+          </a:fontRef>
+        </p:style>
+        <p:txBody>
+          <a:bodyPr rtlCol="0" anchor="ctr"/>
+          <a:lstStyle/>
+          <a:p>
+            <a:pPr algn="ctr"/>
+            <a:endParaRPr lang="en-CA"/>
+          </a:p>
+        </p:txBody>
+      </p:sp>
+      <p:cxnSp>
+        <p:nvCxnSpPr>
+          <p:cNvPr id="36" name="Straight Arrow Connector 35"/>
+          <p:cNvCxnSpPr/>
+          <p:nvPr/>
+        </p:nvCxnSpPr>
+        <p:spPr>
+          <a:xfrm flipV="1">
+            <a:off x="3074794" y="817672"/>
+            <a:ext cx="0" cy="3669268"/>
+          </a:xfrm>
+          <a:prstGeom prst="straightConnector1">
+            <a:avLst/>
+          </a:prstGeom>
+          <a:ln>
+            <a:solidFill>
+              <a:schemeClr val="accent6">
+                <a:lumMod val="75000"/>
+              </a:schemeClr>
+            </a:solidFill>
+            <a:prstDash val="sysDot"/>
+            <a:headEnd type="arrow" w="med" len="med"/>
+            <a:tailEnd type="arrow" w="med" len="med"/>
+          </a:ln>
+        </p:spPr>
+        <p:style>
+          <a:lnRef idx="2">
+            <a:schemeClr val="accent2"/>
+          </a:lnRef>
+          <a:fillRef idx="0">
+            <a:schemeClr val="accent2"/>
+          </a:fillRef>
+          <a:effectRef idx="1">
+            <a:schemeClr val="accent2"/>
+          </a:effectRef>
+          <a:fontRef idx="minor">
+            <a:schemeClr val="tx1"/>
+          </a:fontRef>
+        </p:style>
+      </p:cxnSp>
+      <p:sp>
+        <p:nvSpPr>
+          <p:cNvPr id="44" name="TextBox 43"/>
           <p:cNvSpPr txBox="1"/>
           <p:nvPr/>
         </p:nvSpPr>
         <p:spPr>
           <a:xfrm>
-            <a:off x="228600" y="5520809"/>
-            <a:ext cx="8610600" cy="1015663"/>
+            <a:off x="3053991" y="2734340"/>
+            <a:ext cx="5099409" cy="369332"/>
+          </a:xfrm>
+          <a:prstGeom prst="rect">
+            <a:avLst/>
+          </a:prstGeom>
+          <a:noFill/>
+        </p:spPr>
+        <p:txBody>
+          <a:bodyPr wrap="none" rtlCol="0">
+            <a:spAutoFit/>
+          </a:bodyPr>
+          <a:lstStyle/>
+          <a:p>
+            <a:r>
+              <a:rPr lang="en-US" dirty="0" err="1" smtClean="0">
+                <a:solidFill>
+                  <a:srgbClr val="FFC000"/>
+                </a:solidFill>
+              </a:rPr>
+              <a:t>ClipRectangleSize</a:t>
+            </a:r>
+            <a:r>
+              <a:rPr lang="en-US" dirty="0" smtClean="0">
+                <a:solidFill>
+                  <a:srgbClr val="FFC000"/>
+                </a:solidFill>
+              </a:rPr>
+              <a:t> (second component) = 360 (pixels)</a:t>
+            </a:r>
+            <a:endParaRPr lang="en-US" dirty="0">
+              <a:solidFill>
+                <a:srgbClr val="FFC000"/>
+              </a:solidFill>
+            </a:endParaRPr>
+          </a:p>
+        </p:txBody>
+      </p:sp>
+      <p:sp>
+        <p:nvSpPr>
+          <p:cNvPr id="28" name="TextBox 27"/>
+          <p:cNvSpPr txBox="1"/>
+          <p:nvPr/>
+        </p:nvSpPr>
+        <p:spPr>
+          <a:xfrm>
+            <a:off x="114164" y="0"/>
+            <a:ext cx="8877436" cy="369332"/>
           </a:xfrm>
           <a:prstGeom prst="rect">
             <a:avLst/>
@@ -6715,151 +6560,32 @@
           <a:p>
             <a:pPr marL="342900" indent="-342900" algn="ctr"/>
             <a:r>
-              <a:rPr lang="en-US" sz="1200" b="1" dirty="0" smtClean="0"/>
-              <a:t>Fan is always defined in the MF coordinate system!</a:t>
-            </a:r>
-          </a:p>
-          <a:p>
-            <a:r>
-              <a:rPr lang="en-US" sz="1200" dirty="0" smtClean="0"/>
-              <a:t>If the </a:t>
-            </a:r>
-            <a:r>
-              <a:rPr lang="en-US" sz="1200" dirty="0" err="1" smtClean="0"/>
-              <a:t>UltrasoundImageOrientation</a:t>
-            </a:r>
-            <a:r>
-              <a:rPr lang="en-US" sz="1200" dirty="0" smtClean="0"/>
-              <a:t> in the stored file is not MF, and the file is loaded into a software that ignores the </a:t>
-            </a:r>
-            <a:r>
-              <a:rPr lang="en-US" sz="1200" dirty="0" err="1" smtClean="0"/>
-              <a:t>UltrasoundImageOrientation</a:t>
-            </a:r>
-            <a:r>
-              <a:rPr lang="en-US" sz="1200" dirty="0" smtClean="0"/>
-              <a:t> field (such as </a:t>
-            </a:r>
-            <a:r>
-              <a:rPr lang="en-US" sz="1200" dirty="0" err="1" smtClean="0"/>
-              <a:t>ImageJ</a:t>
-            </a:r>
-            <a:r>
-              <a:rPr lang="en-US" sz="1200" dirty="0" smtClean="0"/>
-              <a:t>, Slicer, </a:t>
-            </a:r>
-            <a:r>
-              <a:rPr lang="en-US" sz="1200" dirty="0" err="1" smtClean="0"/>
-              <a:t>Paraview</a:t>
-            </a:r>
-            <a:r>
-              <a:rPr lang="en-US" sz="1200" dirty="0" smtClean="0"/>
-              <a:t>) then the XY positions and orientations shown in the software has to be transformed. E.g., if </a:t>
-            </a:r>
-            <a:r>
-              <a:rPr lang="en-US" sz="1200" dirty="0" err="1" smtClean="0"/>
-              <a:t>UltrasoundImageOrientation</a:t>
-            </a:r>
-            <a:r>
-              <a:rPr lang="en-US" sz="1200" dirty="0" smtClean="0"/>
-              <a:t>=MN and the </a:t>
-            </a:r>
-            <a:r>
-              <a:rPr lang="en-US" sz="1200" dirty="0" err="1" smtClean="0"/>
-              <a:t>FanOrigin</a:t>
-            </a:r>
-            <a:r>
-              <a:rPr lang="en-US" sz="1200" dirty="0" smtClean="0"/>
-              <a:t> appears in the (320,440) position in </a:t>
-            </a:r>
-            <a:r>
-              <a:rPr lang="en-US" sz="1200" dirty="0" err="1" smtClean="0"/>
-              <a:t>ImageJ</a:t>
-            </a:r>
-            <a:r>
-              <a:rPr lang="en-US" sz="1200" dirty="0" smtClean="0"/>
-              <a:t> then the </a:t>
-            </a:r>
-            <a:r>
-              <a:rPr lang="en-US" sz="1200" dirty="0" err="1" smtClean="0"/>
-              <a:t>FanOrigin</a:t>
-            </a:r>
-            <a:r>
-              <a:rPr lang="en-US" sz="1200" dirty="0" smtClean="0"/>
-              <a:t> in the XML </a:t>
-            </a:r>
-            <a:r>
-              <a:rPr lang="en-US" sz="1200" dirty="0" err="1" smtClean="0"/>
-              <a:t>config</a:t>
-            </a:r>
-            <a:r>
-              <a:rPr lang="en-US" sz="1200" dirty="0" smtClean="0"/>
-              <a:t> file shall be (320,40).</a:t>
-            </a:r>
-            <a:endParaRPr lang="en-US" sz="1400" b="1" dirty="0"/>
-          </a:p>
-        </p:txBody>
-      </p:sp>
-      <p:sp>
-        <p:nvSpPr>
-          <p:cNvPr id="27" name="TextBox 26"/>
-          <p:cNvSpPr txBox="1"/>
-          <p:nvPr/>
-        </p:nvSpPr>
-        <p:spPr>
-          <a:xfrm>
-            <a:off x="114164" y="17237"/>
-            <a:ext cx="8877436" cy="400110"/>
-          </a:xfrm>
-          <a:prstGeom prst="rect">
-            <a:avLst/>
-          </a:prstGeom>
-          <a:noFill/>
-        </p:spPr>
-        <p:txBody>
-          <a:bodyPr wrap="square" rtlCol="0">
-            <a:spAutoFit/>
-          </a:bodyPr>
-          <a:lstStyle/>
-          <a:p>
-            <a:pPr marL="342900" indent="-342900" algn="ctr"/>
-            <a:r>
-              <a:rPr lang="en-US" sz="2000" b="1" dirty="0" smtClean="0">
+              <a:rPr lang="en-US" b="1" dirty="0" smtClean="0">
                 <a:latin typeface="+mj-lt"/>
               </a:rPr>
-              <a:t>Defining the region of interest for volume reconstruction - curvilinear transducer</a:t>
-            </a:r>
-            <a:endParaRPr lang="en-US" b="1" dirty="0">
+              <a:t>Defining </a:t>
+            </a:r>
+            <a:r>
+              <a:rPr lang="en-US" b="1" dirty="0" smtClean="0">
+                <a:latin typeface="+mj-lt"/>
+              </a:rPr>
+              <a:t>clipping rectangle for </a:t>
+            </a:r>
+            <a:r>
+              <a:rPr lang="en-US" b="1" dirty="0" smtClean="0">
+                <a:latin typeface="+mj-lt"/>
+              </a:rPr>
+              <a:t>volume </a:t>
+            </a:r>
+            <a:r>
+              <a:rPr lang="en-US" b="1" dirty="0" smtClean="0">
+                <a:latin typeface="+mj-lt"/>
+              </a:rPr>
+              <a:t>reconstruction</a:t>
+            </a:r>
+            <a:endParaRPr lang="en-US" sz="1600" b="1" dirty="0">
               <a:latin typeface="+mj-lt"/>
             </a:endParaRPr>
-          </a:p>
-        </p:txBody>
-      </p:sp>
-      <p:sp>
-        <p:nvSpPr>
-          <p:cNvPr id="2" name="Footer Placeholder 1"/>
-          <p:cNvSpPr>
-            <a:spLocks noGrp="1"/>
-          </p:cNvSpPr>
-          <p:nvPr>
-            <p:ph type="ftr" sz="quarter" idx="11"/>
-          </p:nvPr>
-        </p:nvSpPr>
-        <p:spPr>
-          <a:xfrm>
-            <a:off x="2743200" y="6459220"/>
-            <a:ext cx="3657600" cy="365125"/>
-          </a:xfrm>
-        </p:spPr>
-        <p:txBody>
-          <a:bodyPr/>
-          <a:lstStyle/>
-          <a:p>
-            <a:r>
-              <a:rPr lang="en-US" dirty="0" smtClean="0"/>
-              <a:t>Source: doc\specifications\UltrasoundImageOrientation.pptx</a:t>
-            </a:r>
-            <a:endParaRPr lang="en-US" dirty="0"/>
           </a:p>
         </p:txBody>
       </p:sp>
@@ -6905,7 +6631,7 @@
         </p:blipFill>
         <p:spPr bwMode="auto">
           <a:xfrm>
-            <a:off x="1746248" y="609600"/>
+            <a:off x="1746248" y="381000"/>
             <a:ext cx="5943600" cy="4495800"/>
           </a:xfrm>
           <a:prstGeom prst="rect">
@@ -6922,40 +6648,153 @@
       </p:pic>
       <p:sp>
         <p:nvSpPr>
-          <p:cNvPr id="9" name="TextBox 8"/>
-          <p:cNvSpPr txBox="1"/>
-          <p:nvPr/>
-        </p:nvSpPr>
-        <p:spPr>
-          <a:xfrm>
-            <a:off x="5055994" y="609600"/>
-            <a:ext cx="3249806" cy="369332"/>
-          </a:xfrm>
-          <a:prstGeom prst="rect">
-            <a:avLst/>
+          <p:cNvPr id="34" name="Pie 33"/>
+          <p:cNvSpPr/>
+          <p:nvPr/>
+        </p:nvSpPr>
+        <p:spPr>
+          <a:xfrm rot="10800000">
+            <a:off x="876300" y="866552"/>
+            <a:ext cx="7696200" cy="7467599"/>
+          </a:xfrm>
+          <a:prstGeom prst="pie">
+            <a:avLst>
+              <a:gd name="adj1" fmla="val 601583"/>
+              <a:gd name="adj2" fmla="val 10371574"/>
+            </a:avLst>
           </a:prstGeom>
           <a:noFill/>
-        </p:spPr>
-        <p:txBody>
-          <a:bodyPr wrap="square" rtlCol="0">
-            <a:spAutoFit/>
-          </a:bodyPr>
-          <a:lstStyle/>
-          <a:p>
-            <a:pPr marL="342900" indent="-342900"/>
-            <a:r>
-              <a:rPr lang="en-US" dirty="0" smtClean="0">
-                <a:solidFill>
-                  <a:schemeClr val="bg1"/>
-                </a:solidFill>
-              </a:rPr>
-              <a:t>Image size: 640x480 pixels</a:t>
-            </a:r>
-            <a:endParaRPr lang="en-US" dirty="0">
+          <a:ln>
+            <a:solidFill>
+              <a:srgbClr val="FF0000"/>
+            </a:solidFill>
+          </a:ln>
+        </p:spPr>
+        <p:style>
+          <a:lnRef idx="2">
+            <a:schemeClr val="accent1">
+              <a:shade val="50000"/>
+            </a:schemeClr>
+          </a:lnRef>
+          <a:fillRef idx="1">
+            <a:schemeClr val="accent1"/>
+          </a:fillRef>
+          <a:effectRef idx="0">
+            <a:schemeClr val="accent1"/>
+          </a:effectRef>
+          <a:fontRef idx="minor">
+            <a:schemeClr val="lt1"/>
+          </a:fontRef>
+        </p:style>
+        <p:txBody>
+          <a:bodyPr rtlCol="0" anchor="ctr"/>
+          <a:lstStyle/>
+          <a:p>
+            <a:pPr algn="ctr"/>
+            <a:endParaRPr lang="en-CA">
               <a:solidFill>
-                <a:schemeClr val="bg1"/>
+                <a:schemeClr val="tx1"/>
               </a:solidFill>
             </a:endParaRPr>
+          </a:p>
+        </p:txBody>
+      </p:sp>
+      <p:sp>
+        <p:nvSpPr>
+          <p:cNvPr id="28" name="Pie 27"/>
+          <p:cNvSpPr/>
+          <p:nvPr/>
+        </p:nvSpPr>
+        <p:spPr>
+          <a:xfrm rot="10800000">
+            <a:off x="4298832" y="4164063"/>
+            <a:ext cx="870068" cy="844224"/>
+          </a:xfrm>
+          <a:prstGeom prst="pie">
+            <a:avLst>
+              <a:gd name="adj1" fmla="val 601583"/>
+              <a:gd name="adj2" fmla="val 10371574"/>
+            </a:avLst>
+          </a:prstGeom>
+          <a:noFill/>
+          <a:ln>
+            <a:solidFill>
+              <a:srgbClr val="FF0000"/>
+            </a:solidFill>
+          </a:ln>
+        </p:spPr>
+        <p:style>
+          <a:lnRef idx="2">
+            <a:schemeClr val="accent1">
+              <a:shade val="50000"/>
+            </a:schemeClr>
+          </a:lnRef>
+          <a:fillRef idx="1">
+            <a:schemeClr val="accent1"/>
+          </a:fillRef>
+          <a:effectRef idx="0">
+            <a:schemeClr val="accent1"/>
+          </a:effectRef>
+          <a:fontRef idx="minor">
+            <a:schemeClr val="lt1"/>
+          </a:fontRef>
+        </p:style>
+        <p:txBody>
+          <a:bodyPr rtlCol="0" anchor="ctr"/>
+          <a:lstStyle/>
+          <a:p>
+            <a:pPr algn="ctr"/>
+            <a:endParaRPr lang="en-CA">
+              <a:solidFill>
+                <a:schemeClr val="tx1"/>
+              </a:solidFill>
+            </a:endParaRPr>
+          </a:p>
+        </p:txBody>
+      </p:sp>
+      <p:sp>
+        <p:nvSpPr>
+          <p:cNvPr id="3" name="Oval 2"/>
+          <p:cNvSpPr/>
+          <p:nvPr/>
+        </p:nvSpPr>
+        <p:spPr>
+          <a:xfrm>
+            <a:off x="4305919" y="4260110"/>
+            <a:ext cx="838989" cy="608526"/>
+          </a:xfrm>
+          <a:prstGeom prst="ellipse">
+            <a:avLst/>
+          </a:prstGeom>
+          <a:solidFill>
+            <a:schemeClr val="tx1"/>
+          </a:solidFill>
+          <a:ln>
+            <a:noFill/>
+          </a:ln>
+        </p:spPr>
+        <p:style>
+          <a:lnRef idx="2">
+            <a:schemeClr val="accent1">
+              <a:shade val="50000"/>
+            </a:schemeClr>
+          </a:lnRef>
+          <a:fillRef idx="1">
+            <a:schemeClr val="accent1"/>
+          </a:fillRef>
+          <a:effectRef idx="0">
+            <a:schemeClr val="accent1"/>
+          </a:effectRef>
+          <a:fontRef idx="minor">
+            <a:schemeClr val="lt1"/>
+          </a:fontRef>
+        </p:style>
+        <p:txBody>
+          <a:bodyPr rtlCol="0" anchor="ctr"/>
+          <a:lstStyle/>
+          <a:p>
+            <a:pPr algn="ctr"/>
+            <a:endParaRPr lang="en-US"/>
           </a:p>
         </p:txBody>
       </p:sp>
@@ -6967,7 +6806,7 @@
         </p:nvCxnSpPr>
         <p:spPr>
           <a:xfrm>
-            <a:off x="4636201" y="1765856"/>
+            <a:off x="4698865" y="1132738"/>
             <a:ext cx="609600" cy="0"/>
           </a:xfrm>
           <a:prstGeom prst="straightConnector1">
@@ -7005,7 +6844,7 @@
         </p:nvCxnSpPr>
         <p:spPr>
           <a:xfrm flipV="1">
-            <a:off x="4637789" y="1154668"/>
+            <a:off x="4700453" y="521550"/>
             <a:ext cx="0" cy="609600"/>
           </a:xfrm>
           <a:prstGeom prst="straightConnector1">
@@ -7043,7 +6882,7 @@
         </p:nvSpPr>
         <p:spPr>
           <a:xfrm>
-            <a:off x="4038600" y="1383268"/>
+            <a:off x="4101264" y="750150"/>
             <a:ext cx="332142" cy="369332"/>
           </a:xfrm>
           <a:prstGeom prst="rect">
@@ -7081,7 +6920,7 @@
         </p:nvSpPr>
         <p:spPr>
           <a:xfrm>
-            <a:off x="4636201" y="1992868"/>
+            <a:off x="4698865" y="1359750"/>
             <a:ext cx="333746" cy="369332"/>
           </a:xfrm>
           <a:prstGeom prst="rect">
@@ -7119,7 +6958,7 @@
         </p:nvCxnSpPr>
         <p:spPr>
           <a:xfrm>
-            <a:off x="4635407" y="1765062"/>
+            <a:off x="4698071" y="1131944"/>
             <a:ext cx="0" cy="532606"/>
           </a:xfrm>
           <a:prstGeom prst="straightConnector1">
@@ -7158,7 +6997,7 @@
         </p:nvSpPr>
         <p:spPr>
           <a:xfrm>
-            <a:off x="4636201" y="1078468"/>
+            <a:off x="4698865" y="445350"/>
             <a:ext cx="290464" cy="369332"/>
           </a:xfrm>
           <a:prstGeom prst="rect">
@@ -7196,7 +7035,7 @@
         </p:nvCxnSpPr>
         <p:spPr>
           <a:xfrm flipH="1" flipV="1">
-            <a:off x="4039436" y="1752600"/>
+            <a:off x="4102100" y="1119482"/>
             <a:ext cx="596765" cy="11668"/>
           </a:xfrm>
           <a:prstGeom prst="straightConnector1">
@@ -7235,7 +7074,7 @@
         </p:nvSpPr>
         <p:spPr>
           <a:xfrm>
-            <a:off x="5030036" y="1383268"/>
+            <a:off x="5092700" y="750150"/>
             <a:ext cx="381836" cy="369332"/>
           </a:xfrm>
           <a:prstGeom prst="rect">
@@ -7262,14 +7101,278 @@
       </p:sp>
       <p:cxnSp>
         <p:nvCxnSpPr>
+          <p:cNvPr id="35" name="Straight Arrow Connector 34"/>
+          <p:cNvCxnSpPr/>
+          <p:nvPr/>
+        </p:nvCxnSpPr>
+        <p:spPr>
+          <a:xfrm>
+            <a:off x="4711700" y="2807550"/>
+            <a:ext cx="0" cy="1752600"/>
+          </a:xfrm>
+          <a:prstGeom prst="straightConnector1">
+            <a:avLst/>
+          </a:prstGeom>
+          <a:ln>
+            <a:solidFill>
+              <a:schemeClr val="accent6">
+                <a:lumMod val="75000"/>
+              </a:schemeClr>
+            </a:solidFill>
+            <a:prstDash val="sysDot"/>
+            <a:headEnd type="none" w="med" len="med"/>
+            <a:tailEnd type="none" w="med" len="med"/>
+          </a:ln>
+        </p:spPr>
+        <p:style>
+          <a:lnRef idx="2">
+            <a:schemeClr val="accent2"/>
+          </a:lnRef>
+          <a:fillRef idx="0">
+            <a:schemeClr val="accent2"/>
+          </a:fillRef>
+          <a:effectRef idx="1">
+            <a:schemeClr val="accent2"/>
+          </a:effectRef>
+          <a:fontRef idx="minor">
+            <a:schemeClr val="tx1"/>
+          </a:fontRef>
+        </p:style>
+      </p:cxnSp>
+      <p:sp>
+        <p:nvSpPr>
+          <p:cNvPr id="38" name="Arc 37"/>
+          <p:cNvSpPr/>
+          <p:nvPr/>
+        </p:nvSpPr>
+        <p:spPr>
+          <a:xfrm flipH="1">
+            <a:off x="3574416" y="3556986"/>
+            <a:ext cx="2216784" cy="2415084"/>
+          </a:xfrm>
+          <a:prstGeom prst="arc">
+            <a:avLst>
+              <a:gd name="adj1" fmla="val 16200000"/>
+              <a:gd name="adj2" fmla="val 20370779"/>
+            </a:avLst>
+          </a:prstGeom>
+          <a:ln>
+            <a:solidFill>
+              <a:schemeClr val="accent6">
+                <a:lumMod val="75000"/>
+              </a:schemeClr>
+            </a:solidFill>
+            <a:prstDash val="sysDot"/>
+            <a:tailEnd type="arrow"/>
+          </a:ln>
+        </p:spPr>
+        <p:style>
+          <a:lnRef idx="2">
+            <a:schemeClr val="accent2"/>
+          </a:lnRef>
+          <a:fillRef idx="0">
+            <a:schemeClr val="accent2"/>
+          </a:fillRef>
+          <a:effectRef idx="1">
+            <a:schemeClr val="accent2"/>
+          </a:effectRef>
+          <a:fontRef idx="minor">
+            <a:schemeClr val="tx1"/>
+          </a:fontRef>
+        </p:style>
+        <p:txBody>
+          <a:bodyPr rtlCol="0" anchor="ctr"/>
+          <a:lstStyle/>
+          <a:p>
+            <a:pPr algn="ctr"/>
+            <a:endParaRPr lang="en-CA"/>
+          </a:p>
+        </p:txBody>
+      </p:sp>
+      <p:sp>
+        <p:nvSpPr>
+          <p:cNvPr id="39" name="Arc 38"/>
+          <p:cNvSpPr/>
+          <p:nvPr/>
+        </p:nvSpPr>
+        <p:spPr>
+          <a:xfrm>
+            <a:off x="3845242" y="3670006"/>
+            <a:ext cx="1780858" cy="1981200"/>
+          </a:xfrm>
+          <a:prstGeom prst="arc">
+            <a:avLst>
+              <a:gd name="adj1" fmla="val 16200000"/>
+              <a:gd name="adj2" fmla="val 20370779"/>
+            </a:avLst>
+          </a:prstGeom>
+          <a:ln>
+            <a:solidFill>
+              <a:schemeClr val="accent6">
+                <a:lumMod val="75000"/>
+              </a:schemeClr>
+            </a:solidFill>
+            <a:prstDash val="sysDot"/>
+            <a:tailEnd type="arrow"/>
+          </a:ln>
+        </p:spPr>
+        <p:style>
+          <a:lnRef idx="2">
+            <a:schemeClr val="accent2"/>
+          </a:lnRef>
+          <a:fillRef idx="0">
+            <a:schemeClr val="accent2"/>
+          </a:fillRef>
+          <a:effectRef idx="1">
+            <a:schemeClr val="accent2"/>
+          </a:effectRef>
+          <a:fontRef idx="minor">
+            <a:schemeClr val="tx1"/>
+          </a:fontRef>
+        </p:style>
+        <p:txBody>
+          <a:bodyPr rtlCol="0" anchor="ctr"/>
+          <a:lstStyle/>
+          <a:p>
+            <a:pPr algn="ctr"/>
+            <a:endParaRPr lang="en-CA"/>
+          </a:p>
+        </p:txBody>
+      </p:sp>
+      <p:sp>
+        <p:nvSpPr>
+          <p:cNvPr id="40" name="TextBox 39"/>
+          <p:cNvSpPr txBox="1"/>
+          <p:nvPr/>
+        </p:nvSpPr>
+        <p:spPr>
+          <a:xfrm>
+            <a:off x="1891390" y="3274615"/>
+            <a:ext cx="2829814" cy="369332"/>
+          </a:xfrm>
+          <a:prstGeom prst="rect">
+            <a:avLst/>
+          </a:prstGeom>
+          <a:noFill/>
+        </p:spPr>
+        <p:txBody>
+          <a:bodyPr wrap="none" rtlCol="0">
+            <a:spAutoFit/>
+          </a:bodyPr>
+          <a:lstStyle/>
+          <a:p>
+            <a:r>
+              <a:rPr lang="en-US" dirty="0" err="1" smtClean="0">
+                <a:solidFill>
+                  <a:srgbClr val="FFC000"/>
+                </a:solidFill>
+              </a:rPr>
+              <a:t>FanAnglesDeg</a:t>
+            </a:r>
+            <a:r>
+              <a:rPr lang="en-US" dirty="0" smtClean="0">
+                <a:solidFill>
+                  <a:srgbClr val="FFC000"/>
+                </a:solidFill>
+              </a:rPr>
+              <a:t>[1</a:t>
+            </a:r>
+            <a:r>
+              <a:rPr lang="en-US" dirty="0" smtClean="0">
+                <a:solidFill>
+                  <a:srgbClr val="FFC000"/>
+                </a:solidFill>
+              </a:rPr>
+              <a:t>] =</a:t>
+            </a:r>
+            <a:r>
+              <a:rPr lang="en-US" dirty="0">
+                <a:solidFill>
+                  <a:srgbClr val="FFC000"/>
+                </a:solidFill>
+              </a:rPr>
+              <a:t> </a:t>
+            </a:r>
+            <a:r>
+              <a:rPr lang="en-US" dirty="0" smtClean="0">
+                <a:solidFill>
+                  <a:srgbClr val="FFC000"/>
+                </a:solidFill>
+              </a:rPr>
+              <a:t>-60 (deg)</a:t>
+            </a:r>
+            <a:endParaRPr lang="en-US" dirty="0">
+              <a:solidFill>
+                <a:srgbClr val="FFC000"/>
+              </a:solidFill>
+            </a:endParaRPr>
+          </a:p>
+        </p:txBody>
+      </p:sp>
+      <p:sp>
+        <p:nvSpPr>
+          <p:cNvPr id="41" name="TextBox 40"/>
+          <p:cNvSpPr txBox="1"/>
+          <p:nvPr/>
+        </p:nvSpPr>
+        <p:spPr>
+          <a:xfrm>
+            <a:off x="4724400" y="3372618"/>
+            <a:ext cx="2759282" cy="369332"/>
+          </a:xfrm>
+          <a:prstGeom prst="rect">
+            <a:avLst/>
+          </a:prstGeom>
+          <a:noFill/>
+        </p:spPr>
+        <p:txBody>
+          <a:bodyPr wrap="none" rtlCol="0">
+            <a:spAutoFit/>
+          </a:bodyPr>
+          <a:lstStyle/>
+          <a:p>
+            <a:r>
+              <a:rPr lang="en-US" dirty="0" err="1" smtClean="0">
+                <a:solidFill>
+                  <a:srgbClr val="FFC000"/>
+                </a:solidFill>
+              </a:rPr>
+              <a:t>FanAnglesDeg</a:t>
+            </a:r>
+            <a:r>
+              <a:rPr lang="en-US" dirty="0" smtClean="0">
+                <a:solidFill>
+                  <a:srgbClr val="FFC000"/>
+                </a:solidFill>
+              </a:rPr>
+              <a:t>[2</a:t>
+            </a:r>
+            <a:r>
+              <a:rPr lang="en-US" dirty="0" smtClean="0">
+                <a:solidFill>
+                  <a:srgbClr val="FFC000"/>
+                </a:solidFill>
+              </a:rPr>
+              <a:t>] = 60 (deg)</a:t>
+            </a:r>
+            <a:endParaRPr lang="en-US" dirty="0">
+              <a:solidFill>
+                <a:srgbClr val="FFC000"/>
+              </a:solidFill>
+            </a:endParaRPr>
+          </a:p>
+        </p:txBody>
+      </p:sp>
+      <p:cxnSp>
+        <p:nvCxnSpPr>
           <p:cNvPr id="42" name="Straight Arrow Connector 41"/>
           <p:cNvCxnSpPr/>
           <p:nvPr/>
         </p:nvCxnSpPr>
         <p:spPr>
           <a:xfrm flipH="1">
-            <a:off x="1905000" y="4267200"/>
-            <a:ext cx="5638800" cy="0"/>
+            <a:off x="4686300" y="4603129"/>
+            <a:ext cx="495934" cy="71321"/>
           </a:xfrm>
           <a:prstGeom prst="straightConnector1">
             <a:avLst/>
@@ -7307,56 +7410,9 @@
           <p:nvPr/>
         </p:nvSpPr>
         <p:spPr>
-          <a:xfrm>
-            <a:off x="3235656" y="3952965"/>
-            <a:ext cx="4275594" cy="338554"/>
-          </a:xfrm>
-          <a:prstGeom prst="rect">
-            <a:avLst/>
-          </a:prstGeom>
-          <a:noFill/>
-        </p:spPr>
-        <p:txBody>
-          <a:bodyPr wrap="none" rtlCol="0">
-            <a:spAutoFit/>
-          </a:bodyPr>
-          <a:lstStyle/>
-          <a:p>
-            <a:pPr marL="273050" indent="-273050"/>
-            <a:r>
-              <a:rPr lang="en-US" sz="1600" dirty="0" err="1" smtClean="0">
-                <a:solidFill>
-                  <a:srgbClr val="FFC000"/>
-                </a:solidFill>
-              </a:rPr>
-              <a:t>ClipRectangleSize</a:t>
-            </a:r>
-            <a:r>
-              <a:rPr lang="en-US" sz="1600" dirty="0" smtClean="0">
-                <a:solidFill>
-                  <a:srgbClr val="FFC000"/>
-                </a:solidFill>
-              </a:rPr>
-              <a:t> (first component) = 600 (pixels)</a:t>
-            </a:r>
-            <a:endParaRPr lang="en-US" sz="1600" dirty="0">
-              <a:solidFill>
-                <a:srgbClr val="FFC000"/>
-              </a:solidFill>
-            </a:endParaRPr>
-          </a:p>
-        </p:txBody>
-      </p:sp>
-      <p:sp>
-        <p:nvSpPr>
-          <p:cNvPr id="50" name="TextBox 49"/>
-          <p:cNvSpPr txBox="1"/>
-          <p:nvPr/>
-        </p:nvSpPr>
-        <p:spPr>
-          <a:xfrm>
-            <a:off x="1602760" y="5334000"/>
-            <a:ext cx="3655040" cy="369332"/>
+          <a:xfrm rot="21184683">
+            <a:off x="4724400" y="4429642"/>
+            <a:ext cx="3194721" cy="369332"/>
           </a:xfrm>
           <a:prstGeom prst="rect">
             <a:avLst/>
@@ -7375,7 +7431,7 @@
                   <a:srgbClr val="FFC000"/>
                 </a:solidFill>
               </a:rPr>
-              <a:t>ClipRectangleOrigin</a:t>
+              <a:t>FanRadiusStartPixel</a:t>
             </a:r>
             <a:r>
               <a:rPr lang="en-US" dirty="0" smtClean="0">
@@ -7383,7 +7439,15 @@
                   <a:srgbClr val="FFC000"/>
                 </a:solidFill>
               </a:rPr>
-              <a:t> = 20  40 (pixels)</a:t>
+              <a:t> </a:t>
+            </a:r>
+            <a:r>
+              <a:rPr lang="en-US" dirty="0" smtClean="0">
+                <a:solidFill>
+                  <a:srgbClr val="FFC000"/>
+                </a:solidFill>
+              </a:rPr>
+              <a:t>= 50 (pixels)</a:t>
             </a:r>
             <a:endParaRPr lang="en-US" dirty="0">
               <a:solidFill>
@@ -7393,6 +7457,52 @@
           </a:p>
         </p:txBody>
       </p:sp>
+      <p:sp>
+        <p:nvSpPr>
+          <p:cNvPr id="50" name="TextBox 49"/>
+          <p:cNvSpPr txBox="1"/>
+          <p:nvPr/>
+        </p:nvSpPr>
+        <p:spPr>
+          <a:xfrm>
+            <a:off x="2997076" y="5098310"/>
+            <a:ext cx="2717924" cy="369332"/>
+          </a:xfrm>
+          <a:prstGeom prst="rect">
+            <a:avLst/>
+          </a:prstGeom>
+          <a:noFill/>
+        </p:spPr>
+        <p:txBody>
+          <a:bodyPr wrap="none" rtlCol="0">
+            <a:spAutoFit/>
+          </a:bodyPr>
+          <a:lstStyle/>
+          <a:p>
+            <a:r>
+              <a:rPr lang="en-US" dirty="0" err="1" smtClean="0">
+                <a:solidFill>
+                  <a:srgbClr val="FFC000"/>
+                </a:solidFill>
+              </a:rPr>
+              <a:t>FanOrigin</a:t>
+            </a:r>
+            <a:r>
+              <a:rPr lang="en-US" dirty="0" smtClean="0">
+                <a:solidFill>
+                  <a:srgbClr val="FFC000"/>
+                </a:solidFill>
+              </a:rPr>
+              <a:t> = 320  40 (pixels)</a:t>
+            </a:r>
+            <a:endParaRPr lang="en-US" dirty="0">
+              <a:solidFill>
+                <a:srgbClr val="FFC000"/>
+              </a:solidFill>
+            </a:endParaRPr>
+          </a:p>
+        </p:txBody>
+      </p:sp>
       <p:cxnSp>
         <p:nvCxnSpPr>
           <p:cNvPr id="51" name="Straight Arrow Connector 50"/>
@@ -7400,9 +7510,9 @@
           <p:nvPr/>
         </p:nvCxnSpPr>
         <p:spPr>
-          <a:xfrm flipH="1" flipV="1">
-            <a:off x="1910688" y="4724400"/>
-            <a:ext cx="152400" cy="609600"/>
+          <a:xfrm flipV="1">
+            <a:off x="3657600" y="4560151"/>
+            <a:ext cx="1054100" cy="538159"/>
           </a:xfrm>
           <a:prstGeom prst="straightConnector1">
             <a:avLst/>
@@ -7439,7 +7549,7 @@
         </p:nvCxnSpPr>
         <p:spPr>
           <a:xfrm flipV="1">
-            <a:off x="1727200" y="5105400"/>
+            <a:off x="1727200" y="4869710"/>
             <a:ext cx="685800" cy="1588"/>
           </a:xfrm>
           <a:prstGeom prst="straightConnector1">
@@ -7487,7 +7597,7 @@
         </p:nvCxnSpPr>
         <p:spPr>
           <a:xfrm flipV="1">
-            <a:off x="1727200" y="4419600"/>
+            <a:off x="1727200" y="4183910"/>
             <a:ext cx="0" cy="685800"/>
           </a:xfrm>
           <a:prstGeom prst="straightConnector1">
@@ -7535,8 +7645,8 @@
         </p:nvSpPr>
         <p:spPr>
           <a:xfrm>
-            <a:off x="152400" y="4495800"/>
-            <a:ext cx="1591839" cy="861774"/>
+            <a:off x="110795" y="4366394"/>
+            <a:ext cx="1591839" cy="923330"/>
           </a:xfrm>
           <a:prstGeom prst="rect">
             <a:avLst/>
@@ -7551,7 +7661,7 @@
           <a:p>
             <a:pPr marL="342900" indent="-342900" algn="r"/>
             <a:r>
-              <a:rPr lang="en-US" sz="1600" b="1" dirty="0" smtClean="0">
+              <a:rPr lang="en-US" b="1" dirty="0" smtClean="0">
                 <a:solidFill>
                   <a:srgbClr val="FFC000"/>
                 </a:solidFill>
@@ -7559,7 +7669,7 @@
               <a:t>MF</a:t>
             </a:r>
             <a:r>
-              <a:rPr lang="en-US" sz="1600" dirty="0" smtClean="0">
+              <a:rPr lang="en-US" dirty="0" smtClean="0">
                 <a:solidFill>
                   <a:srgbClr val="FFC000"/>
                 </a:solidFill>
@@ -7570,12 +7680,12 @@
           <a:p>
             <a:pPr marL="342900" indent="-342900" algn="r"/>
             <a:r>
-              <a:rPr lang="en-US" sz="1600" dirty="0" smtClean="0">
+              <a:rPr lang="en-US" dirty="0" smtClean="0">
                 <a:solidFill>
                   <a:srgbClr val="FFC000"/>
                 </a:solidFill>
               </a:rPr>
-              <a:t>system origin</a:t>
+              <a:t>System origin</a:t>
             </a:r>
           </a:p>
           <a:p>
@@ -7598,14 +7708,14 @@
       </p:sp>
       <p:sp>
         <p:nvSpPr>
-          <p:cNvPr id="46" name="TextBox 45"/>
+          <p:cNvPr id="27" name="TextBox 26"/>
           <p:cNvSpPr txBox="1"/>
           <p:nvPr/>
         </p:nvSpPr>
         <p:spPr>
           <a:xfrm>
-            <a:off x="228600" y="5791200"/>
-            <a:ext cx="8610600" cy="830997"/>
+            <a:off x="114164" y="0"/>
+            <a:ext cx="8877436" cy="369332"/>
           </a:xfrm>
           <a:prstGeom prst="rect">
             <a:avLst/>
@@ -7620,79 +7730,45 @@
           <a:p>
             <a:pPr marL="342900" indent="-342900" algn="ctr"/>
             <a:r>
-              <a:rPr lang="en-US" sz="1600" b="1" dirty="0" err="1" smtClean="0"/>
-              <a:t>ClipRectangle</a:t>
-            </a:r>
-            <a:r>
-              <a:rPr lang="en-US" sz="1600" b="1" dirty="0" smtClean="0"/>
-              <a:t> is always defined in the MF coordinate system!</a:t>
-            </a:r>
-          </a:p>
-          <a:p>
-            <a:pPr marL="342900" indent="-342900" algn="ctr"/>
-            <a:r>
-              <a:rPr lang="en-US" sz="1600" dirty="0" smtClean="0"/>
-              <a:t>Clipping rectangle must be always defined.  Clipping fan is optional. All pixels that are outside the clipping rectangle or the clipping fan will be ignored in volume reconstruction.</a:t>
-            </a:r>
-          </a:p>
-        </p:txBody>
-      </p:sp>
-      <p:sp>
-        <p:nvSpPr>
-          <p:cNvPr id="27" name="Rectangle 26"/>
-          <p:cNvSpPr/>
-          <p:nvPr/>
-        </p:nvSpPr>
-        <p:spPr>
-          <a:xfrm>
-            <a:off x="1905000" y="1066800"/>
-            <a:ext cx="5638800" cy="3657600"/>
-          </a:xfrm>
-          <a:prstGeom prst="rect">
-            <a:avLst/>
-          </a:prstGeom>
-          <a:noFill/>
-          <a:ln>
-            <a:solidFill>
-              <a:srgbClr val="FF0000"/>
-            </a:solidFill>
-          </a:ln>
-        </p:spPr>
-        <p:style>
-          <a:lnRef idx="2">
-            <a:schemeClr val="accent1">
-              <a:shade val="50000"/>
-            </a:schemeClr>
-          </a:lnRef>
-          <a:fillRef idx="1">
-            <a:schemeClr val="accent1"/>
-          </a:fillRef>
-          <a:effectRef idx="0">
-            <a:schemeClr val="accent1"/>
-          </a:effectRef>
-          <a:fontRef idx="minor">
-            <a:schemeClr val="lt1"/>
-          </a:fontRef>
-        </p:style>
-        <p:txBody>
-          <a:bodyPr rtlCol="0" anchor="ctr"/>
-          <a:lstStyle/>
-          <a:p>
-            <a:pPr algn="ctr"/>
-            <a:endParaRPr lang="en-CA"/>
+              <a:rPr lang="en-US" b="1" dirty="0" smtClean="0">
+                <a:latin typeface="+mj-lt"/>
+              </a:rPr>
+              <a:t>Defining </a:t>
+            </a:r>
+            <a:r>
+              <a:rPr lang="en-US" b="1" dirty="0" smtClean="0">
+                <a:latin typeface="+mj-lt"/>
+              </a:rPr>
+              <a:t>clipping fan for </a:t>
+            </a:r>
+            <a:r>
+              <a:rPr lang="en-US" b="1" dirty="0" smtClean="0">
+                <a:latin typeface="+mj-lt"/>
+              </a:rPr>
+              <a:t>volume </a:t>
+            </a:r>
+            <a:r>
+              <a:rPr lang="en-US" b="1" dirty="0" smtClean="0">
+                <a:latin typeface="+mj-lt"/>
+              </a:rPr>
+              <a:t>reconstruction</a:t>
+            </a:r>
+            <a:endParaRPr lang="en-US" sz="1600" b="1" dirty="0">
+              <a:latin typeface="+mj-lt"/>
+            </a:endParaRPr>
           </a:p>
         </p:txBody>
       </p:sp>
       <p:cxnSp>
         <p:nvCxnSpPr>
-          <p:cNvPr id="36" name="Straight Arrow Connector 35"/>
+          <p:cNvPr id="29" name="Straight Arrow Connector 28"/>
           <p:cNvCxnSpPr/>
           <p:nvPr/>
         </p:nvCxnSpPr>
         <p:spPr>
           <a:xfrm flipV="1">
-            <a:off x="2971800" y="1066800"/>
-            <a:ext cx="0" cy="3657600"/>
+            <a:off x="4699001" y="3899903"/>
+            <a:ext cx="3790316" cy="573970"/>
           </a:xfrm>
           <a:prstGeom prst="straightConnector1">
             <a:avLst/>
@@ -7725,14 +7801,14 @@
       </p:cxnSp>
       <p:sp>
         <p:nvSpPr>
-          <p:cNvPr id="44" name="TextBox 43"/>
+          <p:cNvPr id="30" name="TextBox 29"/>
           <p:cNvSpPr txBox="1"/>
           <p:nvPr/>
         </p:nvSpPr>
         <p:spPr>
-          <a:xfrm>
-            <a:off x="2563504" y="2709446"/>
-            <a:ext cx="4542590" cy="338554"/>
+          <a:xfrm rot="21049164">
+            <a:off x="5556840" y="3737609"/>
+            <a:ext cx="3287310" cy="369332"/>
           </a:xfrm>
           <a:prstGeom prst="rect">
             <a:avLst/>
@@ -7746,22 +7822,30 @@
           <a:lstStyle/>
           <a:p>
             <a:r>
-              <a:rPr lang="en-US" sz="1600" dirty="0" err="1" smtClean="0">
+              <a:rPr lang="en-US" dirty="0" err="1" smtClean="0">
                 <a:solidFill>
                   <a:srgbClr val="FFC000"/>
                 </a:solidFill>
               </a:rPr>
-              <a:t>ClipRectangleSize</a:t>
-            </a:r>
-            <a:r>
-              <a:rPr lang="en-US" sz="1600" dirty="0" smtClean="0">
+              <a:t>FanRadiusEndPixel</a:t>
+            </a:r>
+            <a:r>
+              <a:rPr lang="en-US" dirty="0" smtClean="0">
                 <a:solidFill>
                   <a:srgbClr val="FFC000"/>
                 </a:solidFill>
               </a:rPr>
-              <a:t> (second component) = 360 (pixels)</a:t>
-            </a:r>
-            <a:endParaRPr lang="en-US" sz="1600" dirty="0">
+              <a:t> </a:t>
+            </a:r>
+            <a:r>
+              <a:rPr lang="en-US" dirty="0" smtClean="0">
+                <a:solidFill>
+                  <a:srgbClr val="FFC000"/>
+                </a:solidFill>
+              </a:rPr>
+              <a:t>= 450 (pixels)</a:t>
+            </a:r>
+            <a:endParaRPr lang="en-US" dirty="0">
               <a:solidFill>
                 <a:srgbClr val="FFC000"/>
               </a:solidFill>
@@ -7771,14 +7855,14 @@
       </p:sp>
       <p:sp>
         <p:nvSpPr>
-          <p:cNvPr id="28" name="TextBox 27"/>
+          <p:cNvPr id="43" name="TextBox 42"/>
           <p:cNvSpPr txBox="1"/>
           <p:nvPr/>
         </p:nvSpPr>
         <p:spPr>
           <a:xfrm>
-            <a:off x="114164" y="108677"/>
-            <a:ext cx="8877436" cy="400110"/>
+            <a:off x="5817994" y="4881378"/>
+            <a:ext cx="2792606" cy="369332"/>
           </a:xfrm>
           <a:prstGeom prst="rect">
             <a:avLst/>
@@ -7791,42 +7875,10 @@
           </a:bodyPr>
           <a:lstStyle/>
           <a:p>
-            <a:pPr marL="342900" indent="-342900" algn="ctr"/>
-            <a:r>
-              <a:rPr lang="en-US" sz="2000" b="1" dirty="0" smtClean="0">
-                <a:latin typeface="+mj-lt"/>
-              </a:rPr>
-              <a:t>Defining the region of interest for volume reconstruction - linear transducer</a:t>
-            </a:r>
-            <a:endParaRPr lang="en-US" b="1" dirty="0">
-              <a:latin typeface="+mj-lt"/>
-            </a:endParaRPr>
-          </a:p>
-        </p:txBody>
-      </p:sp>
-      <p:sp>
-        <p:nvSpPr>
-          <p:cNvPr id="2" name="Footer Placeholder 1"/>
-          <p:cNvSpPr>
-            <a:spLocks noGrp="1"/>
-          </p:cNvSpPr>
-          <p:nvPr>
-            <p:ph type="ftr" sz="quarter" idx="11"/>
-          </p:nvPr>
-        </p:nvSpPr>
-        <p:spPr>
-          <a:xfrm>
-            <a:off x="2743200" y="6477000"/>
-            <a:ext cx="3657600" cy="365125"/>
-          </a:xfrm>
-        </p:spPr>
-        <p:txBody>
-          <a:bodyPr/>
-          <a:lstStyle/>
-          <a:p>
+            <a:pPr marL="342900" indent="-342900"/>
             <a:r>
               <a:rPr lang="en-US" dirty="0" smtClean="0"/>
-              <a:t>Source: doc\specifications\UltrasoundImageOrientation.pptx</a:t>
+              <a:t>Image size: 640x480 pixels</a:t>
             </a:r>
             <a:endParaRPr lang="en-US" dirty="0"/>
           </a:p>
@@ -8430,7 +8482,7 @@
         <p:spPr>
           <a:xfrm>
             <a:off x="114164" y="108677"/>
-            <a:ext cx="8877436" cy="400110"/>
+            <a:ext cx="8877436" cy="369332"/>
           </a:xfrm>
           <a:prstGeom prst="rect">
             <a:avLst/>
@@ -8445,12 +8497,12 @@
           <a:p>
             <a:pPr marL="342900" indent="-342900" algn="ctr"/>
             <a:r>
-              <a:rPr lang="en-US" sz="2000" b="1" dirty="0" smtClean="0">
+              <a:rPr lang="en-US" b="1" dirty="0" smtClean="0">
                 <a:latin typeface="+mj-lt"/>
               </a:rPr>
               <a:t>Defining the transducer geometry for RF scan conversion - curvilinear transducer</a:t>
             </a:r>
-            <a:endParaRPr lang="en-US" b="1" dirty="0">
+            <a:endParaRPr lang="en-US" sz="1600" b="1" dirty="0">
               <a:latin typeface="+mj-lt"/>
             </a:endParaRPr>
           </a:p>
@@ -8878,15 +8930,7 @@
                   <a:srgbClr val="FFC000"/>
                 </a:solidFill>
               </a:rPr>
-              <a:t> = -</a:t>
-            </a:r>
-            <a:r>
-              <a:rPr lang="en-US" sz="1100" dirty="0" smtClean="0">
-                <a:solidFill>
-                  <a:srgbClr val="FFC000"/>
-                </a:solidFill>
-              </a:rPr>
-              <a:t>3.0 </a:t>
+              <a:t> = -3.0 </a:t>
             </a:r>
             <a:endParaRPr lang="en-US" sz="1100" dirty="0">
               <a:solidFill>
@@ -10401,23 +10445,7 @@
                   <a:srgbClr val="FFC000"/>
                 </a:solidFill>
               </a:rPr>
-              <a:t>[1] </a:t>
-            </a:r>
-            <a:r>
-              <a:rPr lang="en-US" sz="1100" dirty="0" smtClean="0">
-                <a:solidFill>
-                  <a:srgbClr val="FFC000"/>
-                </a:solidFill>
-              </a:rPr>
-              <a:t>= </a:t>
-            </a:r>
-            <a:r>
-              <a:rPr lang="en-US" sz="1100" dirty="0" smtClean="0">
-                <a:solidFill>
-                  <a:srgbClr val="FFC000"/>
-                </a:solidFill>
-              </a:rPr>
-              <a:t>53</a:t>
+              <a:t>[1] = 53</a:t>
             </a:r>
             <a:endParaRPr lang="en-US" sz="1100" dirty="0">
               <a:solidFill>
@@ -10843,23 +10871,7 @@
                   <a:srgbClr val="FFC000"/>
                 </a:solidFill>
               </a:rPr>
-              <a:t>[0] </a:t>
-            </a:r>
-            <a:r>
-              <a:rPr lang="en-US" sz="1100" dirty="0" smtClean="0">
-                <a:solidFill>
-                  <a:srgbClr val="FFC000"/>
-                </a:solidFill>
-              </a:rPr>
-              <a:t>= </a:t>
-            </a:r>
-            <a:r>
-              <a:rPr lang="en-US" sz="1100" dirty="0" smtClean="0">
-                <a:solidFill>
-                  <a:srgbClr val="FFC000"/>
-                </a:solidFill>
-              </a:rPr>
-              <a:t>410</a:t>
+              <a:t>[0] = 410</a:t>
             </a:r>
             <a:endParaRPr lang="en-US" sz="1100" dirty="0">
               <a:solidFill>
@@ -12287,23 +12299,7 @@
                   <a:srgbClr val="FFC000"/>
                 </a:solidFill>
               </a:rPr>
-              <a:t>[1] </a:t>
-            </a:r>
-            <a:r>
-              <a:rPr lang="en-US" sz="1100" dirty="0" smtClean="0">
-                <a:solidFill>
-                  <a:srgbClr val="FFC000"/>
-                </a:solidFill>
-              </a:rPr>
-              <a:t>= </a:t>
-            </a:r>
-            <a:r>
-              <a:rPr lang="en-US" sz="1100" dirty="0" smtClean="0">
-                <a:solidFill>
-                  <a:srgbClr val="FFC000"/>
-                </a:solidFill>
-              </a:rPr>
-              <a:t>15</a:t>
+              <a:t>[1] = 15</a:t>
             </a:r>
             <a:endParaRPr lang="en-US" sz="1100" dirty="0">
               <a:solidFill>
@@ -12389,23 +12385,7 @@
                   <a:srgbClr val="FFC000"/>
                 </a:solidFill>
               </a:rPr>
-              <a:t>[0] </a:t>
-            </a:r>
-            <a:r>
-              <a:rPr lang="en-US" sz="1100" dirty="0" smtClean="0">
-                <a:solidFill>
-                  <a:srgbClr val="FFC000"/>
-                </a:solidFill>
-              </a:rPr>
-              <a:t>= </a:t>
-            </a:r>
-            <a:r>
-              <a:rPr lang="en-US" sz="1100" dirty="0" smtClean="0">
-                <a:solidFill>
-                  <a:srgbClr val="FFC000"/>
-                </a:solidFill>
-              </a:rPr>
-              <a:t>150</a:t>
+              <a:t>[0] = 150</a:t>
             </a:r>
             <a:endParaRPr lang="en-US" sz="1100" dirty="0">
               <a:solidFill>

</xml_diff>

<commit_message>
re #845: Fixed linear transducer center pixel definition in documentation
git-svn-id: https://subversion.assembla.com/svn/plus/trunk/doc@3846 c04e96f8-ac36-4ff2-8b34-4a5e34ef045f
</commit_message>
<xml_diff>
--- a/specifications/UltrasoundImageOrientation.pptx
+++ b/specifications/UltrasoundImageOrientation.pptx
@@ -215,7 +215,7 @@
           <a:p>
             <a:fld id="{96529989-2A3A-4071-8AAB-A4A4DA00AA76}" type="datetimeFigureOut">
               <a:rPr lang="en-CA" smtClean="0"/>
-              <a:t>2014-08-06</a:t>
+              <a:t>2014-11-15</a:t>
             </a:fld>
             <a:endParaRPr lang="en-CA"/>
           </a:p>
@@ -664,7 +664,7 @@
           <a:p>
             <a:fld id="{9BAB7AD8-7DA6-49ED-A6A1-3E576430A444}" type="datetime1">
               <a:rPr lang="en-US" smtClean="0"/>
-              <a:t>8/6/2014</a:t>
+              <a:t>2014-11-15</a:t>
             </a:fld>
             <a:endParaRPr lang="en-US"/>
           </a:p>
@@ -834,7 +834,7 @@
           <a:p>
             <a:fld id="{6A30A583-A045-42C3-B180-810431823F7C}" type="datetime1">
               <a:rPr lang="en-US" smtClean="0"/>
-              <a:t>8/6/2014</a:t>
+              <a:t>2014-11-15</a:t>
             </a:fld>
             <a:endParaRPr lang="en-US"/>
           </a:p>
@@ -1014,7 +1014,7 @@
           <a:p>
             <a:fld id="{8C706EE2-A389-49DA-852C-A25EEA0096A5}" type="datetime1">
               <a:rPr lang="en-US" smtClean="0"/>
-              <a:t>8/6/2014</a:t>
+              <a:t>2014-11-15</a:t>
             </a:fld>
             <a:endParaRPr lang="en-US"/>
           </a:p>
@@ -1184,7 +1184,7 @@
           <a:p>
             <a:fld id="{FAE799BF-65A4-44D1-9626-4CB2683479A0}" type="datetime1">
               <a:rPr lang="en-US" smtClean="0"/>
-              <a:t>8/6/2014</a:t>
+              <a:t>2014-11-15</a:t>
             </a:fld>
             <a:endParaRPr lang="en-US"/>
           </a:p>
@@ -1430,7 +1430,7 @@
           <a:p>
             <a:fld id="{C58770DA-FA6F-402B-A47E-99A02268F9C9}" type="datetime1">
               <a:rPr lang="en-US" smtClean="0"/>
-              <a:t>8/6/2014</a:t>
+              <a:t>2014-11-15</a:t>
             </a:fld>
             <a:endParaRPr lang="en-US"/>
           </a:p>
@@ -1718,7 +1718,7 @@
           <a:p>
             <a:fld id="{D7425FA0-417C-40D8-84E5-0BBAE59E3627}" type="datetime1">
               <a:rPr lang="en-US" smtClean="0"/>
-              <a:t>8/6/2014</a:t>
+              <a:t>2014-11-15</a:t>
             </a:fld>
             <a:endParaRPr lang="en-US"/>
           </a:p>
@@ -2140,7 +2140,7 @@
           <a:p>
             <a:fld id="{84DF6B02-38C3-4CBB-A488-70C85C7D6D5F}" type="datetime1">
               <a:rPr lang="en-US" smtClean="0"/>
-              <a:t>8/6/2014</a:t>
+              <a:t>2014-11-15</a:t>
             </a:fld>
             <a:endParaRPr lang="en-US"/>
           </a:p>
@@ -2258,7 +2258,7 @@
           <a:p>
             <a:fld id="{E82731BF-6D24-4EBE-983D-DBF326ECDFD5}" type="datetime1">
               <a:rPr lang="en-US" smtClean="0"/>
-              <a:t>8/6/2014</a:t>
+              <a:t>2014-11-15</a:t>
             </a:fld>
             <a:endParaRPr lang="en-US"/>
           </a:p>
@@ -2353,7 +2353,7 @@
           <a:p>
             <a:fld id="{11A30BEF-A390-4EED-B356-2EDD103CB91A}" type="datetime1">
               <a:rPr lang="en-US" smtClean="0"/>
-              <a:t>8/6/2014</a:t>
+              <a:t>2014-11-15</a:t>
             </a:fld>
             <a:endParaRPr lang="en-US"/>
           </a:p>
@@ -2630,7 +2630,7 @@
           <a:p>
             <a:fld id="{2EFEA545-71A4-4166-A3E6-0B73A95A4B04}" type="datetime1">
               <a:rPr lang="en-US" smtClean="0"/>
-              <a:t>8/6/2014</a:t>
+              <a:t>2014-11-15</a:t>
             </a:fld>
             <a:endParaRPr lang="en-US"/>
           </a:p>
@@ -2883,7 +2883,7 @@
           <a:p>
             <a:fld id="{6BA77AC2-5E11-4AE9-8C29-3721D388FBC1}" type="datetime1">
               <a:rPr lang="en-US" smtClean="0"/>
-              <a:t>8/6/2014</a:t>
+              <a:t>2014-11-15</a:t>
             </a:fld>
             <a:endParaRPr lang="en-US"/>
           </a:p>
@@ -3096,7 +3096,7 @@
           <a:p>
             <a:fld id="{C405AE0A-D4D8-4B96-AA9E-22A2EF91B3C7}" type="datetime1">
               <a:rPr lang="en-US" smtClean="0"/>
-              <a:t>8/6/2014</a:t>
+              <a:t>2014-11-15</a:t>
             </a:fld>
             <a:endParaRPr lang="en-US"/>
           </a:p>
@@ -6563,25 +6563,7 @@
               <a:rPr lang="en-US" b="1" dirty="0" smtClean="0">
                 <a:latin typeface="+mj-lt"/>
               </a:rPr>
-              <a:t>Defining </a:t>
-            </a:r>
-            <a:r>
-              <a:rPr lang="en-US" b="1" dirty="0" smtClean="0">
-                <a:latin typeface="+mj-lt"/>
-              </a:rPr>
-              <a:t>clipping rectangle for </a:t>
-            </a:r>
-            <a:r>
-              <a:rPr lang="en-US" b="1" dirty="0" smtClean="0">
-                <a:latin typeface="+mj-lt"/>
-              </a:rPr>
-              <a:t>volume </a:t>
-            </a:r>
-            <a:r>
-              <a:rPr lang="en-US" b="1" dirty="0" smtClean="0">
-                <a:latin typeface="+mj-lt"/>
-              </a:rPr>
-              <a:t>reconstruction</a:t>
+              <a:t>Defining clipping rectangle for volume reconstruction</a:t>
             </a:r>
             <a:endParaRPr lang="en-US" sz="1600" b="1" dirty="0">
               <a:latin typeface="+mj-lt"/>
@@ -7275,15 +7257,7 @@
                   <a:srgbClr val="FFC000"/>
                 </a:solidFill>
               </a:rPr>
-              <a:t>[1</a:t>
-            </a:r>
-            <a:r>
-              <a:rPr lang="en-US" dirty="0" smtClean="0">
-                <a:solidFill>
-                  <a:srgbClr val="FFC000"/>
-                </a:solidFill>
-              </a:rPr>
-              <a:t>] =</a:t>
+              <a:t>[1] =</a:t>
             </a:r>
             <a:r>
               <a:rPr lang="en-US" dirty="0">
@@ -7345,15 +7319,7 @@
                   <a:srgbClr val="FFC000"/>
                 </a:solidFill>
               </a:rPr>
-              <a:t>[2</a:t>
-            </a:r>
-            <a:r>
-              <a:rPr lang="en-US" dirty="0" smtClean="0">
-                <a:solidFill>
-                  <a:srgbClr val="FFC000"/>
-                </a:solidFill>
-              </a:rPr>
-              <a:t>] = 60 (deg)</a:t>
+              <a:t>[2] = 60 (deg)</a:t>
             </a:r>
             <a:endParaRPr lang="en-US" dirty="0">
               <a:solidFill>
@@ -7439,15 +7405,7 @@
                   <a:srgbClr val="FFC000"/>
                 </a:solidFill>
               </a:rPr>
-              <a:t> </a:t>
-            </a:r>
-            <a:r>
-              <a:rPr lang="en-US" dirty="0" smtClean="0">
-                <a:solidFill>
-                  <a:srgbClr val="FFC000"/>
-                </a:solidFill>
-              </a:rPr>
-              <a:t>= 50 (pixels)</a:t>
+              <a:t> = 50 (pixels)</a:t>
             </a:r>
             <a:endParaRPr lang="en-US" dirty="0">
               <a:solidFill>
@@ -7733,25 +7691,7 @@
               <a:rPr lang="en-US" b="1" dirty="0" smtClean="0">
                 <a:latin typeface="+mj-lt"/>
               </a:rPr>
-              <a:t>Defining </a:t>
-            </a:r>
-            <a:r>
-              <a:rPr lang="en-US" b="1" dirty="0" smtClean="0">
-                <a:latin typeface="+mj-lt"/>
-              </a:rPr>
-              <a:t>clipping fan for </a:t>
-            </a:r>
-            <a:r>
-              <a:rPr lang="en-US" b="1" dirty="0" smtClean="0">
-                <a:latin typeface="+mj-lt"/>
-              </a:rPr>
-              <a:t>volume </a:t>
-            </a:r>
-            <a:r>
-              <a:rPr lang="en-US" b="1" dirty="0" smtClean="0">
-                <a:latin typeface="+mj-lt"/>
-              </a:rPr>
-              <a:t>reconstruction</a:t>
+              <a:t>Defining clipping fan for volume reconstruction</a:t>
             </a:r>
             <a:endParaRPr lang="en-US" sz="1600" b="1" dirty="0">
               <a:latin typeface="+mj-lt"/>
@@ -7835,15 +7775,7 @@
                   <a:srgbClr val="FFC000"/>
                 </a:solidFill>
               </a:rPr>
-              <a:t> </a:t>
-            </a:r>
-            <a:r>
-              <a:rPr lang="en-US" dirty="0" smtClean="0">
-                <a:solidFill>
-                  <a:srgbClr val="FFC000"/>
-                </a:solidFill>
-              </a:rPr>
-              <a:t>= 450 (pixels)</a:t>
+              <a:t> = 450 (pixels)</a:t>
             </a:r>
             <a:endParaRPr lang="en-US" dirty="0">
               <a:solidFill>
@@ -10999,7 +10931,7 @@
         </p:nvSpPr>
         <p:spPr>
           <a:xfrm>
-            <a:off x="1371078" y="624432"/>
+            <a:off x="1371078" y="895478"/>
             <a:ext cx="5867400" cy="4669448"/>
           </a:xfrm>
           <a:prstGeom prst="rect">
@@ -11055,7 +10987,7 @@
         </p:blipFill>
         <p:spPr bwMode="auto">
           <a:xfrm>
-            <a:off x="2819400" y="882879"/>
+            <a:off x="2819400" y="1153925"/>
             <a:ext cx="2957699" cy="3917722"/>
           </a:xfrm>
           <a:prstGeom prst="rect">
@@ -11104,7 +11036,7 @@
         </p:nvCxnSpPr>
         <p:spPr>
           <a:xfrm flipV="1">
-            <a:off x="5943600" y="886045"/>
+            <a:off x="5943600" y="1157091"/>
             <a:ext cx="0" cy="3914556"/>
           </a:xfrm>
           <a:prstGeom prst="straightConnector1">
@@ -11144,7 +11076,7 @@
         </p:nvSpPr>
         <p:spPr>
           <a:xfrm>
-            <a:off x="4604232" y="2633782"/>
+            <a:off x="4604232" y="2904828"/>
             <a:ext cx="2253246" cy="338554"/>
           </a:xfrm>
           <a:prstGeom prst="rect">
@@ -11265,7 +11197,7 @@
         </p:nvSpPr>
         <p:spPr>
           <a:xfrm>
-            <a:off x="1020800" y="969791"/>
+            <a:off x="1020800" y="1240837"/>
             <a:ext cx="290464" cy="369332"/>
           </a:xfrm>
           <a:prstGeom prst="rect">
@@ -11303,7 +11235,7 @@
         </p:nvSpPr>
         <p:spPr>
           <a:xfrm>
-            <a:off x="1748279" y="272323"/>
+            <a:off x="1748279" y="543369"/>
             <a:ext cx="381836" cy="369332"/>
           </a:xfrm>
           <a:prstGeom prst="rect">
@@ -11336,7 +11268,7 @@
         </p:nvCxnSpPr>
         <p:spPr>
           <a:xfrm flipV="1">
-            <a:off x="1376169" y="622843"/>
+            <a:off x="1376169" y="893889"/>
             <a:ext cx="685800" cy="1588"/>
           </a:xfrm>
           <a:prstGeom prst="straightConnector1">
@@ -11384,7 +11316,7 @@
         </p:nvCxnSpPr>
         <p:spPr>
           <a:xfrm>
-            <a:off x="1376169" y="621265"/>
+            <a:off x="1376169" y="892311"/>
             <a:ext cx="0" cy="609392"/>
           </a:xfrm>
           <a:prstGeom prst="straightConnector1">
@@ -11432,7 +11364,7 @@
         </p:nvSpPr>
         <p:spPr>
           <a:xfrm>
-            <a:off x="757679" y="348523"/>
+            <a:off x="757679" y="619569"/>
             <a:ext cx="677439" cy="369332"/>
           </a:xfrm>
           <a:prstGeom prst="rect">
@@ -11471,7 +11403,7 @@
         </p:nvCxnSpPr>
         <p:spPr>
           <a:xfrm flipH="1">
-            <a:off x="5334000" y="4800600"/>
+            <a:off x="5334000" y="5071646"/>
             <a:ext cx="723900" cy="0"/>
           </a:xfrm>
           <a:prstGeom prst="straightConnector1">
@@ -11511,7 +11443,7 @@
         </p:nvCxnSpPr>
         <p:spPr>
           <a:xfrm flipH="1">
-            <a:off x="6253635" y="5293879"/>
+            <a:off x="6253635" y="5564925"/>
             <a:ext cx="1442565" cy="0"/>
           </a:xfrm>
           <a:prstGeom prst="straightConnector1">
@@ -11551,7 +11483,7 @@
         </p:nvCxnSpPr>
         <p:spPr>
           <a:xfrm flipH="1">
-            <a:off x="2696958" y="622843"/>
+            <a:off x="2696958" y="893889"/>
             <a:ext cx="4008120" cy="0"/>
           </a:xfrm>
           <a:prstGeom prst="straightConnector1">
@@ -11591,7 +11523,7 @@
         </p:nvSpPr>
         <p:spPr>
           <a:xfrm>
-            <a:off x="6317357" y="2176046"/>
+            <a:off x="6317357" y="2447092"/>
             <a:ext cx="2639953" cy="338554"/>
           </a:xfrm>
           <a:prstGeom prst="rect">
@@ -11637,7 +11569,7 @@
         </p:nvCxnSpPr>
         <p:spPr>
           <a:xfrm flipV="1">
-            <a:off x="7315200" y="623480"/>
+            <a:off x="7315200" y="894526"/>
             <a:ext cx="0" cy="4670400"/>
           </a:xfrm>
           <a:prstGeom prst="straightConnector1">
@@ -11677,7 +11609,7 @@
         </p:nvCxnSpPr>
         <p:spPr>
           <a:xfrm flipV="1">
-            <a:off x="1371078" y="2372169"/>
+            <a:off x="1371078" y="2643215"/>
             <a:ext cx="5091" cy="3222697"/>
           </a:xfrm>
           <a:prstGeom prst="straightConnector1">
@@ -11717,7 +11649,7 @@
         </p:nvCxnSpPr>
         <p:spPr>
           <a:xfrm flipV="1">
-            <a:off x="5779770" y="4038600"/>
+            <a:off x="5779770" y="4309646"/>
             <a:ext cx="0" cy="990600"/>
           </a:xfrm>
           <a:prstGeom prst="straightConnector1">
@@ -11757,7 +11689,7 @@
         </p:nvCxnSpPr>
         <p:spPr>
           <a:xfrm flipV="1">
-            <a:off x="7238478" y="4539524"/>
+            <a:off x="7238478" y="4810570"/>
             <a:ext cx="522" cy="1055342"/>
           </a:xfrm>
           <a:prstGeom prst="straightConnector1">
@@ -11797,7 +11729,7 @@
         </p:nvCxnSpPr>
         <p:spPr>
           <a:xfrm flipH="1">
-            <a:off x="2819400" y="4876800"/>
+            <a:off x="2819400" y="5147846"/>
             <a:ext cx="2929746" cy="0"/>
           </a:xfrm>
           <a:prstGeom prst="straightConnector1">
@@ -11837,7 +11769,7 @@
         </p:nvCxnSpPr>
         <p:spPr>
           <a:xfrm flipH="1">
-            <a:off x="1371078" y="5410200"/>
+            <a:off x="1371078" y="5681246"/>
             <a:ext cx="5867400" cy="0"/>
           </a:xfrm>
           <a:prstGeom prst="straightConnector1">
@@ -11877,7 +11809,7 @@
         </p:nvSpPr>
         <p:spPr>
           <a:xfrm>
-            <a:off x="3051271" y="4843046"/>
+            <a:off x="3051271" y="5114092"/>
             <a:ext cx="2511329" cy="338554"/>
           </a:xfrm>
           <a:prstGeom prst="rect">
@@ -11931,7 +11863,7 @@
         </p:nvSpPr>
         <p:spPr>
           <a:xfrm>
-            <a:off x="2917938" y="5410200"/>
+            <a:off x="2917938" y="5681246"/>
             <a:ext cx="2639953" cy="338554"/>
           </a:xfrm>
           <a:prstGeom prst="rect">
@@ -12056,7 +11988,7 @@
         </p:nvCxnSpPr>
         <p:spPr>
           <a:xfrm flipH="1">
-            <a:off x="5322570" y="891540"/>
+            <a:off x="5322570" y="1162586"/>
             <a:ext cx="723900" cy="0"/>
           </a:xfrm>
           <a:prstGeom prst="straightConnector1">
@@ -12096,7 +12028,7 @@
         </p:nvCxnSpPr>
         <p:spPr>
           <a:xfrm flipV="1">
-            <a:off x="2819400" y="4038600"/>
+            <a:off x="2819400" y="4309646"/>
             <a:ext cx="0" cy="990600"/>
           </a:xfrm>
           <a:prstGeom prst="straightConnector1">
@@ -12136,7 +12068,7 @@
         </p:nvCxnSpPr>
         <p:spPr>
           <a:xfrm flipH="1">
-            <a:off x="4406358" y="880110"/>
+            <a:off x="4406358" y="1151156"/>
             <a:ext cx="3442242" cy="9644"/>
           </a:xfrm>
           <a:prstGeom prst="straightConnector1">
@@ -12170,14 +12102,201 @@
       </p:cxnSp>
       <p:cxnSp>
         <p:nvCxnSpPr>
-          <p:cNvPr id="56" name="Straight Arrow Connector 55"/>
+          <p:cNvPr id="58" name="Straight Arrow Connector 57"/>
           <p:cNvCxnSpPr/>
           <p:nvPr/>
         </p:nvCxnSpPr>
         <p:spPr>
-          <a:xfrm flipH="1">
-            <a:off x="3400330" y="1524000"/>
-            <a:ext cx="1447800" cy="0"/>
+          <a:xfrm>
+            <a:off x="7772400" y="892076"/>
+            <a:ext cx="0" cy="293619"/>
+          </a:xfrm>
+          <a:prstGeom prst="straightConnector1">
+            <a:avLst/>
+          </a:prstGeom>
+          <a:ln>
+            <a:solidFill>
+              <a:schemeClr val="accent6">
+                <a:lumMod val="75000"/>
+              </a:schemeClr>
+            </a:solidFill>
+            <a:prstDash val="sysDot"/>
+            <a:headEnd type="none" w="med" len="med"/>
+            <a:tailEnd type="arrow" w="med" len="med"/>
+          </a:ln>
+        </p:spPr>
+        <p:style>
+          <a:lnRef idx="2">
+            <a:schemeClr val="accent2"/>
+          </a:lnRef>
+          <a:fillRef idx="0">
+            <a:schemeClr val="accent2"/>
+          </a:fillRef>
+          <a:effectRef idx="1">
+            <a:schemeClr val="accent2"/>
+          </a:effectRef>
+          <a:fontRef idx="minor">
+            <a:schemeClr val="tx1"/>
+          </a:fontRef>
+        </p:style>
+      </p:cxnSp>
+      <p:sp>
+        <p:nvSpPr>
+          <p:cNvPr id="59" name="TextBox 58"/>
+          <p:cNvSpPr txBox="1"/>
+          <p:nvPr/>
+        </p:nvSpPr>
+        <p:spPr>
+          <a:xfrm>
+            <a:off x="7791489" y="804446"/>
+            <a:ext cx="1276311" cy="430887"/>
+          </a:xfrm>
+          <a:prstGeom prst="rect">
+            <a:avLst/>
+          </a:prstGeom>
+          <a:noFill/>
+        </p:spPr>
+        <p:txBody>
+          <a:bodyPr wrap="none" rtlCol="0">
+            <a:spAutoFit/>
+          </a:bodyPr>
+          <a:lstStyle/>
+          <a:p>
+            <a:r>
+              <a:rPr lang="en-US" sz="1100" dirty="0" smtClean="0">
+                <a:solidFill>
+                  <a:srgbClr val="FFC000"/>
+                </a:solidFill>
+              </a:rPr>
+              <a:t>Transducer</a:t>
+            </a:r>
+            <a:br>
+              <a:rPr lang="en-US" sz="1100" dirty="0" smtClean="0">
+                <a:solidFill>
+                  <a:srgbClr val="FFC000"/>
+                </a:solidFill>
+              </a:rPr>
+            </a:br>
+            <a:r>
+              <a:rPr lang="en-US" sz="1100" dirty="0" err="1" smtClean="0">
+                <a:solidFill>
+                  <a:srgbClr val="FFC000"/>
+                </a:solidFill>
+              </a:rPr>
+              <a:t>CenterPixel</a:t>
+            </a:r>
+            <a:r>
+              <a:rPr lang="en-US" sz="1100" dirty="0" smtClean="0">
+                <a:solidFill>
+                  <a:srgbClr val="FFC000"/>
+                </a:solidFill>
+              </a:rPr>
+              <a:t>[1] = 15</a:t>
+            </a:r>
+            <a:endParaRPr lang="en-US" sz="1100" dirty="0">
+              <a:solidFill>
+                <a:srgbClr val="FFC000"/>
+              </a:solidFill>
+            </a:endParaRPr>
+          </a:p>
+        </p:txBody>
+      </p:sp>
+      <p:cxnSp>
+        <p:nvCxnSpPr>
+          <p:cNvPr id="60" name="Straight Arrow Connector 59"/>
+          <p:cNvCxnSpPr/>
+          <p:nvPr/>
+        </p:nvCxnSpPr>
+        <p:spPr>
+          <a:xfrm>
+            <a:off x="1366607" y="548030"/>
+            <a:ext cx="2976793" cy="0"/>
+          </a:xfrm>
+          <a:prstGeom prst="straightConnector1">
+            <a:avLst/>
+          </a:prstGeom>
+          <a:ln>
+            <a:solidFill>
+              <a:schemeClr val="accent6">
+                <a:lumMod val="75000"/>
+              </a:schemeClr>
+            </a:solidFill>
+            <a:prstDash val="sysDot"/>
+            <a:headEnd type="none" w="med" len="med"/>
+            <a:tailEnd type="arrow" w="med" len="med"/>
+          </a:ln>
+        </p:spPr>
+        <p:style>
+          <a:lnRef idx="2">
+            <a:schemeClr val="accent2"/>
+          </a:lnRef>
+          <a:fillRef idx="0">
+            <a:schemeClr val="accent2"/>
+          </a:fillRef>
+          <a:effectRef idx="1">
+            <a:schemeClr val="accent2"/>
+          </a:effectRef>
+          <a:fontRef idx="minor">
+            <a:schemeClr val="tx1"/>
+          </a:fontRef>
+        </p:style>
+      </p:cxnSp>
+      <p:sp>
+        <p:nvSpPr>
+          <p:cNvPr id="64" name="TextBox 63"/>
+          <p:cNvSpPr txBox="1"/>
+          <p:nvPr/>
+        </p:nvSpPr>
+        <p:spPr>
+          <a:xfrm>
+            <a:off x="1981200" y="319430"/>
+            <a:ext cx="1989647" cy="261610"/>
+          </a:xfrm>
+          <a:prstGeom prst="rect">
+            <a:avLst/>
+          </a:prstGeom>
+          <a:noFill/>
+        </p:spPr>
+        <p:txBody>
+          <a:bodyPr wrap="none" rtlCol="0">
+            <a:spAutoFit/>
+          </a:bodyPr>
+          <a:lstStyle/>
+          <a:p>
+            <a:r>
+              <a:rPr lang="en-US" sz="1100" dirty="0" err="1" smtClean="0">
+                <a:solidFill>
+                  <a:srgbClr val="FFC000"/>
+                </a:solidFill>
+              </a:rPr>
+              <a:t>TransducerCenterPixel</a:t>
+            </a:r>
+            <a:r>
+              <a:rPr lang="en-US" sz="1100" dirty="0" smtClean="0">
+                <a:solidFill>
+                  <a:srgbClr val="FFC000"/>
+                </a:solidFill>
+              </a:rPr>
+              <a:t>[0] = 150</a:t>
+            </a:r>
+            <a:endParaRPr lang="en-US" sz="1100" dirty="0">
+              <a:solidFill>
+                <a:srgbClr val="FFC000"/>
+              </a:solidFill>
+            </a:endParaRPr>
+          </a:p>
+        </p:txBody>
+      </p:sp>
+      <p:cxnSp>
+        <p:nvCxnSpPr>
+          <p:cNvPr id="65" name="Straight Arrow Connector 64"/>
+          <p:cNvCxnSpPr/>
+          <p:nvPr/>
+        </p:nvCxnSpPr>
+        <p:spPr>
+          <a:xfrm flipH="1" flipV="1">
+            <a:off x="4406358" y="892076"/>
+            <a:ext cx="3432581" cy="16454"/>
           </a:xfrm>
           <a:prstGeom prst="straightConnector1">
             <a:avLst/>
@@ -12210,201 +12329,14 @@
       </p:cxnSp>
       <p:cxnSp>
         <p:nvCxnSpPr>
-          <p:cNvPr id="58" name="Straight Arrow Connector 57"/>
+          <p:cNvPr id="66" name="Straight Arrow Connector 65"/>
           <p:cNvCxnSpPr/>
           <p:nvPr/>
         </p:nvCxnSpPr>
         <p:spPr>
-          <a:xfrm>
-            <a:off x="7772400" y="621030"/>
-            <a:ext cx="0" cy="293619"/>
-          </a:xfrm>
-          <a:prstGeom prst="straightConnector1">
-            <a:avLst/>
-          </a:prstGeom>
-          <a:ln>
-            <a:solidFill>
-              <a:schemeClr val="accent6">
-                <a:lumMod val="75000"/>
-              </a:schemeClr>
-            </a:solidFill>
-            <a:prstDash val="sysDot"/>
-            <a:headEnd type="none" w="med" len="med"/>
-            <a:tailEnd type="arrow" w="med" len="med"/>
-          </a:ln>
-        </p:spPr>
-        <p:style>
-          <a:lnRef idx="2">
-            <a:schemeClr val="accent2"/>
-          </a:lnRef>
-          <a:fillRef idx="0">
-            <a:schemeClr val="accent2"/>
-          </a:fillRef>
-          <a:effectRef idx="1">
-            <a:schemeClr val="accent2"/>
-          </a:effectRef>
-          <a:fontRef idx="minor">
-            <a:schemeClr val="tx1"/>
-          </a:fontRef>
-        </p:style>
-      </p:cxnSp>
-      <p:sp>
-        <p:nvSpPr>
-          <p:cNvPr id="59" name="TextBox 58"/>
-          <p:cNvSpPr txBox="1"/>
-          <p:nvPr/>
-        </p:nvSpPr>
-        <p:spPr>
-          <a:xfrm>
-            <a:off x="7791489" y="533400"/>
-            <a:ext cx="1276311" cy="430887"/>
-          </a:xfrm>
-          <a:prstGeom prst="rect">
-            <a:avLst/>
-          </a:prstGeom>
-          <a:noFill/>
-        </p:spPr>
-        <p:txBody>
-          <a:bodyPr wrap="none" rtlCol="0">
-            <a:spAutoFit/>
-          </a:bodyPr>
-          <a:lstStyle/>
-          <a:p>
-            <a:r>
-              <a:rPr lang="en-US" sz="1100" dirty="0" smtClean="0">
-                <a:solidFill>
-                  <a:srgbClr val="FFC000"/>
-                </a:solidFill>
-              </a:rPr>
-              <a:t>Transducer</a:t>
-            </a:r>
-            <a:br>
-              <a:rPr lang="en-US" sz="1100" dirty="0" smtClean="0">
-                <a:solidFill>
-                  <a:srgbClr val="FFC000"/>
-                </a:solidFill>
-              </a:rPr>
-            </a:br>
-            <a:r>
-              <a:rPr lang="en-US" sz="1100" dirty="0" err="1" smtClean="0">
-                <a:solidFill>
-                  <a:srgbClr val="FFC000"/>
-                </a:solidFill>
-              </a:rPr>
-              <a:t>CenterPixel</a:t>
-            </a:r>
-            <a:r>
-              <a:rPr lang="en-US" sz="1100" dirty="0" smtClean="0">
-                <a:solidFill>
-                  <a:srgbClr val="FFC000"/>
-                </a:solidFill>
-              </a:rPr>
-              <a:t>[1] = 15</a:t>
-            </a:r>
-            <a:endParaRPr lang="en-US" sz="1100" dirty="0">
-              <a:solidFill>
-                <a:srgbClr val="FFC000"/>
-              </a:solidFill>
-            </a:endParaRPr>
-          </a:p>
-        </p:txBody>
-      </p:sp>
-      <p:cxnSp>
-        <p:nvCxnSpPr>
-          <p:cNvPr id="60" name="Straight Arrow Connector 59"/>
-          <p:cNvCxnSpPr/>
-          <p:nvPr/>
-        </p:nvCxnSpPr>
-        <p:spPr>
-          <a:xfrm>
-            <a:off x="1344662" y="1931768"/>
-            <a:ext cx="1474738" cy="0"/>
-          </a:xfrm>
-          <a:prstGeom prst="straightConnector1">
-            <a:avLst/>
-          </a:prstGeom>
-          <a:ln>
-            <a:solidFill>
-              <a:schemeClr val="accent6">
-                <a:lumMod val="75000"/>
-              </a:schemeClr>
-            </a:solidFill>
-            <a:prstDash val="sysDot"/>
-            <a:headEnd type="none" w="med" len="med"/>
-            <a:tailEnd type="arrow" w="med" len="med"/>
-          </a:ln>
-        </p:spPr>
-        <p:style>
-          <a:lnRef idx="2">
-            <a:schemeClr val="accent2"/>
-          </a:lnRef>
-          <a:fillRef idx="0">
-            <a:schemeClr val="accent2"/>
-          </a:fillRef>
-          <a:effectRef idx="1">
-            <a:schemeClr val="accent2"/>
-          </a:effectRef>
-          <a:fontRef idx="minor">
-            <a:schemeClr val="tx1"/>
-          </a:fontRef>
-        </p:style>
-      </p:cxnSp>
-      <p:sp>
-        <p:nvSpPr>
-          <p:cNvPr id="64" name="TextBox 63"/>
-          <p:cNvSpPr txBox="1"/>
-          <p:nvPr/>
-        </p:nvSpPr>
-        <p:spPr>
-          <a:xfrm>
-            <a:off x="753553" y="1643390"/>
-            <a:ext cx="1989647" cy="261610"/>
-          </a:xfrm>
-          <a:prstGeom prst="rect">
-            <a:avLst/>
-          </a:prstGeom>
-          <a:noFill/>
-        </p:spPr>
-        <p:txBody>
-          <a:bodyPr wrap="none" rtlCol="0">
-            <a:spAutoFit/>
-          </a:bodyPr>
-          <a:lstStyle/>
-          <a:p>
-            <a:r>
-              <a:rPr lang="en-US" sz="1100" dirty="0" err="1" smtClean="0">
-                <a:solidFill>
-                  <a:srgbClr val="FFC000"/>
-                </a:solidFill>
-              </a:rPr>
-              <a:t>TransducerCenterPixel</a:t>
-            </a:r>
-            <a:r>
-              <a:rPr lang="en-US" sz="1100" dirty="0" smtClean="0">
-                <a:solidFill>
-                  <a:srgbClr val="FFC000"/>
-                </a:solidFill>
-              </a:rPr>
-              <a:t>[0] = 150</a:t>
-            </a:r>
-            <a:endParaRPr lang="en-US" sz="1100" dirty="0">
-              <a:solidFill>
-                <a:srgbClr val="FFC000"/>
-              </a:solidFill>
-            </a:endParaRPr>
-          </a:p>
-        </p:txBody>
-      </p:sp>
-      <p:cxnSp>
-        <p:nvCxnSpPr>
-          <p:cNvPr id="65" name="Straight Arrow Connector 64"/>
-          <p:cNvCxnSpPr/>
-          <p:nvPr/>
-        </p:nvCxnSpPr>
-        <p:spPr>
-          <a:xfrm flipH="1" flipV="1">
-            <a:off x="4406358" y="621030"/>
-            <a:ext cx="3432581" cy="16454"/>
+          <a:xfrm flipV="1">
+            <a:off x="4343400" y="395630"/>
+            <a:ext cx="0" cy="956846"/>
           </a:xfrm>
           <a:prstGeom prst="straightConnector1">
             <a:avLst/>
@@ -12437,54 +12369,14 @@
       </p:cxnSp>
       <p:cxnSp>
         <p:nvCxnSpPr>
-          <p:cNvPr id="66" name="Straight Arrow Connector 65"/>
-          <p:cNvCxnSpPr/>
-          <p:nvPr/>
-        </p:nvCxnSpPr>
-        <p:spPr>
-          <a:xfrm flipV="1">
-            <a:off x="2819400" y="621030"/>
-            <a:ext cx="0" cy="1436370"/>
-          </a:xfrm>
-          <a:prstGeom prst="straightConnector1">
-            <a:avLst/>
-          </a:prstGeom>
-          <a:ln>
-            <a:solidFill>
-              <a:schemeClr val="accent6">
-                <a:lumMod val="75000"/>
-              </a:schemeClr>
-            </a:solidFill>
-            <a:prstDash val="sysDot"/>
-            <a:headEnd type="none" w="med" len="med"/>
-            <a:tailEnd type="none" w="med" len="med"/>
-          </a:ln>
-        </p:spPr>
-        <p:style>
-          <a:lnRef idx="2">
-            <a:schemeClr val="accent2"/>
-          </a:lnRef>
-          <a:fillRef idx="0">
-            <a:schemeClr val="accent2"/>
-          </a:fillRef>
-          <a:effectRef idx="1">
-            <a:schemeClr val="accent2"/>
-          </a:effectRef>
-          <a:fontRef idx="minor">
-            <a:schemeClr val="tx1"/>
-          </a:fontRef>
-        </p:style>
-      </p:cxnSp>
-      <p:cxnSp>
-        <p:nvCxnSpPr>
           <p:cNvPr id="67" name="Straight Arrow Connector 66"/>
           <p:cNvCxnSpPr/>
           <p:nvPr/>
         </p:nvCxnSpPr>
         <p:spPr>
           <a:xfrm flipV="1">
-            <a:off x="1371600" y="609600"/>
-            <a:ext cx="0" cy="1436370"/>
+            <a:off x="1371600" y="395630"/>
+            <a:ext cx="0" cy="956846"/>
           </a:xfrm>
           <a:prstGeom prst="straightConnector1">
             <a:avLst/>

</xml_diff>

<commit_message>
re #955: Added 3D transducer axes description
git-svn-id: https://subversion.assembla.com/svn/plus/trunk/doc@3959 c04e96f8-ac36-4ff2-8b34-4a5e34ef045f
</commit_message>
<xml_diff>
--- a/specifications/UltrasoundImageOrientation.pptx
+++ b/specifications/UltrasoundImageOrientation.pptx
@@ -215,7 +215,7 @@
           <a:p>
             <a:fld id="{96529989-2A3A-4071-8AAB-A4A4DA00AA76}" type="datetimeFigureOut">
               <a:rPr lang="en-CA" smtClean="0"/>
-              <a:t>2014-11-15</a:t>
+              <a:t>05/02/2015</a:t>
             </a:fld>
             <a:endParaRPr lang="en-CA"/>
           </a:p>
@@ -664,7 +664,7 @@
           <a:p>
             <a:fld id="{9BAB7AD8-7DA6-49ED-A6A1-3E576430A444}" type="datetime1">
               <a:rPr lang="en-US" smtClean="0"/>
-              <a:t>2014-11-15</a:t>
+              <a:t>2/5/2015</a:t>
             </a:fld>
             <a:endParaRPr lang="en-US"/>
           </a:p>
@@ -834,7 +834,7 @@
           <a:p>
             <a:fld id="{6A30A583-A045-42C3-B180-810431823F7C}" type="datetime1">
               <a:rPr lang="en-US" smtClean="0"/>
-              <a:t>2014-11-15</a:t>
+              <a:t>2/5/2015</a:t>
             </a:fld>
             <a:endParaRPr lang="en-US"/>
           </a:p>
@@ -1014,7 +1014,7 @@
           <a:p>
             <a:fld id="{8C706EE2-A389-49DA-852C-A25EEA0096A5}" type="datetime1">
               <a:rPr lang="en-US" smtClean="0"/>
-              <a:t>2014-11-15</a:t>
+              <a:t>2/5/2015</a:t>
             </a:fld>
             <a:endParaRPr lang="en-US"/>
           </a:p>
@@ -1184,7 +1184,7 @@
           <a:p>
             <a:fld id="{FAE799BF-65A4-44D1-9626-4CB2683479A0}" type="datetime1">
               <a:rPr lang="en-US" smtClean="0"/>
-              <a:t>2014-11-15</a:t>
+              <a:t>2/5/2015</a:t>
             </a:fld>
             <a:endParaRPr lang="en-US"/>
           </a:p>
@@ -1430,7 +1430,7 @@
           <a:p>
             <a:fld id="{C58770DA-FA6F-402B-A47E-99A02268F9C9}" type="datetime1">
               <a:rPr lang="en-US" smtClean="0"/>
-              <a:t>2014-11-15</a:t>
+              <a:t>2/5/2015</a:t>
             </a:fld>
             <a:endParaRPr lang="en-US"/>
           </a:p>
@@ -1718,7 +1718,7 @@
           <a:p>
             <a:fld id="{D7425FA0-417C-40D8-84E5-0BBAE59E3627}" type="datetime1">
               <a:rPr lang="en-US" smtClean="0"/>
-              <a:t>2014-11-15</a:t>
+              <a:t>2/5/2015</a:t>
             </a:fld>
             <a:endParaRPr lang="en-US"/>
           </a:p>
@@ -2140,7 +2140,7 @@
           <a:p>
             <a:fld id="{84DF6B02-38C3-4CBB-A488-70C85C7D6D5F}" type="datetime1">
               <a:rPr lang="en-US" smtClean="0"/>
-              <a:t>2014-11-15</a:t>
+              <a:t>2/5/2015</a:t>
             </a:fld>
             <a:endParaRPr lang="en-US"/>
           </a:p>
@@ -2258,7 +2258,7 @@
           <a:p>
             <a:fld id="{E82731BF-6D24-4EBE-983D-DBF326ECDFD5}" type="datetime1">
               <a:rPr lang="en-US" smtClean="0"/>
-              <a:t>2014-11-15</a:t>
+              <a:t>2/5/2015</a:t>
             </a:fld>
             <a:endParaRPr lang="en-US"/>
           </a:p>
@@ -2353,7 +2353,7 @@
           <a:p>
             <a:fld id="{11A30BEF-A390-4EED-B356-2EDD103CB91A}" type="datetime1">
               <a:rPr lang="en-US" smtClean="0"/>
-              <a:t>2014-11-15</a:t>
+              <a:t>2/5/2015</a:t>
             </a:fld>
             <a:endParaRPr lang="en-US"/>
           </a:p>
@@ -2630,7 +2630,7 @@
           <a:p>
             <a:fld id="{2EFEA545-71A4-4166-A3E6-0B73A95A4B04}" type="datetime1">
               <a:rPr lang="en-US" smtClean="0"/>
-              <a:t>2014-11-15</a:t>
+              <a:t>2/5/2015</a:t>
             </a:fld>
             <a:endParaRPr lang="en-US"/>
           </a:p>
@@ -2883,7 +2883,7 @@
           <a:p>
             <a:fld id="{6BA77AC2-5E11-4AE9-8C29-3721D388FBC1}" type="datetime1">
               <a:rPr lang="en-US" smtClean="0"/>
-              <a:t>2014-11-15</a:t>
+              <a:t>2/5/2015</a:t>
             </a:fld>
             <a:endParaRPr lang="en-US"/>
           </a:p>
@@ -3096,7 +3096,7 @@
           <a:p>
             <a:fld id="{C405AE0A-D4D8-4B96-AA9E-22A2EF91B3C7}" type="datetime1">
               <a:rPr lang="en-US" smtClean="0"/>
-              <a:t>2014-11-15</a:t>
+              <a:t>2/5/2015</a:t>
             </a:fld>
             <a:endParaRPr lang="en-US"/>
           </a:p>
@@ -3472,188 +3472,16 @@
           <a:chExt cx="0" cy="0"/>
         </a:xfrm>
       </p:grpSpPr>
-      <p:pic>
-        <p:nvPicPr>
-          <p:cNvPr id="1026" name="Picture 2"/>
-          <p:cNvPicPr>
-            <a:picLocks noChangeAspect="1" noChangeArrowheads="1"/>
-          </p:cNvPicPr>
-          <p:nvPr/>
-        </p:nvPicPr>
-        <p:blipFill>
-          <a:blip r:embed="rId2" cstate="print"/>
-          <a:srcRect/>
-          <a:stretch>
-            <a:fillRect/>
-          </a:stretch>
-        </p:blipFill>
-        <p:spPr bwMode="auto">
-          <a:xfrm>
-            <a:off x="1219200" y="2438400"/>
-            <a:ext cx="1306978" cy="2819400"/>
-          </a:xfrm>
-          <a:prstGeom prst="rect">
-            <a:avLst/>
-          </a:prstGeom>
-          <a:noFill/>
-          <a:ln w="9525">
-            <a:noFill/>
-            <a:miter lim="800000"/>
-            <a:headEnd/>
-            <a:tailEnd/>
-          </a:ln>
-        </p:spPr>
-      </p:pic>
-      <p:pic>
-        <p:nvPicPr>
-          <p:cNvPr id="1027" name="Picture 3"/>
-          <p:cNvPicPr>
-            <a:picLocks noChangeAspect="1" noChangeArrowheads="1"/>
-          </p:cNvPicPr>
-          <p:nvPr/>
-        </p:nvPicPr>
-        <p:blipFill>
-          <a:blip r:embed="rId3" cstate="print"/>
-          <a:srcRect/>
-          <a:stretch>
-            <a:fillRect/>
-          </a:stretch>
-        </p:blipFill>
-        <p:spPr bwMode="auto">
-          <a:xfrm>
-            <a:off x="6324600" y="2438400"/>
-            <a:ext cx="1981200" cy="2746844"/>
-          </a:xfrm>
-          <a:prstGeom prst="rect">
-            <a:avLst/>
-          </a:prstGeom>
-          <a:noFill/>
-          <a:ln w="9525">
-            <a:noFill/>
-            <a:miter lim="800000"/>
-            <a:headEnd/>
-            <a:tailEnd/>
-          </a:ln>
-        </p:spPr>
-      </p:pic>
-      <p:pic>
-        <p:nvPicPr>
-          <p:cNvPr id="1032" name="Picture 8"/>
-          <p:cNvPicPr>
-            <a:picLocks noChangeAspect="1" noChangeArrowheads="1"/>
-          </p:cNvPicPr>
-          <p:nvPr/>
-        </p:nvPicPr>
-        <p:blipFill>
-          <a:blip r:embed="rId4" cstate="print"/>
-          <a:srcRect/>
-          <a:stretch>
-            <a:fillRect/>
-          </a:stretch>
-        </p:blipFill>
-        <p:spPr bwMode="auto">
-          <a:xfrm>
-            <a:off x="2044657" y="1459468"/>
-            <a:ext cx="3833813" cy="841921"/>
-          </a:xfrm>
-          <a:prstGeom prst="rect">
-            <a:avLst/>
-          </a:prstGeom>
-          <a:noFill/>
-          <a:ln w="9525">
-            <a:noFill/>
-            <a:miter lim="800000"/>
-            <a:headEnd/>
-            <a:tailEnd/>
-          </a:ln>
-        </p:spPr>
-      </p:pic>
-      <p:cxnSp>
-        <p:nvCxnSpPr>
-          <p:cNvPr id="12" name="Straight Arrow Connector 11"/>
-          <p:cNvCxnSpPr/>
-          <p:nvPr/>
-        </p:nvCxnSpPr>
-        <p:spPr>
-          <a:xfrm rot="10800000">
-            <a:off x="990600" y="4724400"/>
-            <a:ext cx="885454" cy="1588"/>
-          </a:xfrm>
-          <a:prstGeom prst="straightConnector1">
-            <a:avLst/>
-          </a:prstGeom>
-          <a:ln>
-            <a:solidFill>
-              <a:schemeClr val="accent6">
-                <a:lumMod val="75000"/>
-              </a:schemeClr>
-            </a:solidFill>
-            <a:tailEnd type="arrow"/>
-          </a:ln>
-        </p:spPr>
-        <p:style>
-          <a:lnRef idx="2">
-            <a:schemeClr val="accent2"/>
-          </a:lnRef>
-          <a:fillRef idx="0">
-            <a:schemeClr val="accent2"/>
-          </a:fillRef>
-          <a:effectRef idx="1">
-            <a:schemeClr val="accent2"/>
-          </a:effectRef>
-          <a:fontRef idx="minor">
-            <a:schemeClr val="tx1"/>
-          </a:fontRef>
-        </p:style>
-      </p:cxnSp>
-      <p:cxnSp>
-        <p:nvCxnSpPr>
-          <p:cNvPr id="14" name="Straight Arrow Connector 13"/>
-          <p:cNvCxnSpPr/>
-          <p:nvPr/>
-        </p:nvCxnSpPr>
-        <p:spPr>
-          <a:xfrm rot="5400000">
-            <a:off x="1479814" y="5120640"/>
-            <a:ext cx="792480" cy="1588"/>
-          </a:xfrm>
-          <a:prstGeom prst="straightConnector1">
-            <a:avLst/>
-          </a:prstGeom>
-          <a:ln>
-            <a:solidFill>
-              <a:schemeClr val="accent6">
-                <a:lumMod val="75000"/>
-              </a:schemeClr>
-            </a:solidFill>
-            <a:tailEnd type="arrow"/>
-          </a:ln>
-        </p:spPr>
-        <p:style>
-          <a:lnRef idx="2">
-            <a:schemeClr val="accent2"/>
-          </a:lnRef>
-          <a:fillRef idx="0">
-            <a:schemeClr val="accent2"/>
-          </a:fillRef>
-          <a:effectRef idx="1">
-            <a:schemeClr val="accent2"/>
-          </a:effectRef>
-          <a:fontRef idx="minor">
-            <a:schemeClr val="tx1"/>
-          </a:fontRef>
-        </p:style>
-      </p:cxnSp>
-      <p:sp>
-        <p:nvSpPr>
-          <p:cNvPr id="19" name="TextBox 18"/>
+      <p:sp>
+        <p:nvSpPr>
+          <p:cNvPr id="59" name="TextBox 58"/>
           <p:cNvSpPr txBox="1"/>
           <p:nvPr/>
         </p:nvSpPr>
         <p:spPr>
           <a:xfrm>
-            <a:off x="838200" y="4343400"/>
-            <a:ext cx="381836" cy="369332"/>
+            <a:off x="2186121" y="183903"/>
+            <a:ext cx="3195105" cy="2031325"/>
           </a:xfrm>
           <a:prstGeom prst="rect">
             <a:avLst/>
@@ -3666,691 +3494,6 @@
           </a:bodyPr>
           <a:lstStyle/>
           <a:p>
-            <a:r>
-              <a:rPr lang="en-US" dirty="0" smtClean="0"/>
-              <a:t>M</a:t>
-            </a:r>
-            <a:endParaRPr lang="en-US" dirty="0"/>
-          </a:p>
-        </p:txBody>
-      </p:sp>
-      <p:sp>
-        <p:nvSpPr>
-          <p:cNvPr id="20" name="TextBox 19"/>
-          <p:cNvSpPr txBox="1"/>
-          <p:nvPr/>
-        </p:nvSpPr>
-        <p:spPr>
-          <a:xfrm>
-            <a:off x="1952254" y="5334000"/>
-            <a:ext cx="290464" cy="369332"/>
-          </a:xfrm>
-          <a:prstGeom prst="rect">
-            <a:avLst/>
-          </a:prstGeom>
-          <a:noFill/>
-        </p:spPr>
-        <p:txBody>
-          <a:bodyPr wrap="none" rtlCol="0">
-            <a:spAutoFit/>
-          </a:bodyPr>
-          <a:lstStyle/>
-          <a:p>
-            <a:r>
-              <a:rPr lang="en-US" dirty="0" smtClean="0"/>
-              <a:t>F</a:t>
-            </a:r>
-            <a:endParaRPr lang="en-US" dirty="0"/>
-          </a:p>
-        </p:txBody>
-      </p:sp>
-      <p:cxnSp>
-        <p:nvCxnSpPr>
-          <p:cNvPr id="21" name="Straight Arrow Connector 20"/>
-          <p:cNvCxnSpPr/>
-          <p:nvPr/>
-        </p:nvCxnSpPr>
-        <p:spPr>
-          <a:xfrm rot="16200000" flipV="1">
-            <a:off x="1456954" y="4305300"/>
-            <a:ext cx="838994" cy="794"/>
-          </a:xfrm>
-          <a:prstGeom prst="straightConnector1">
-            <a:avLst/>
-          </a:prstGeom>
-          <a:ln>
-            <a:solidFill>
-              <a:schemeClr val="accent6">
-                <a:lumMod val="75000"/>
-              </a:schemeClr>
-            </a:solidFill>
-            <a:prstDash val="sysDot"/>
-            <a:tailEnd type="arrow"/>
-          </a:ln>
-        </p:spPr>
-        <p:style>
-          <a:lnRef idx="2">
-            <a:schemeClr val="accent2"/>
-          </a:lnRef>
-          <a:fillRef idx="0">
-            <a:schemeClr val="accent2"/>
-          </a:fillRef>
-          <a:effectRef idx="1">
-            <a:schemeClr val="accent2"/>
-          </a:effectRef>
-          <a:fontRef idx="minor">
-            <a:schemeClr val="tx1"/>
-          </a:fontRef>
-        </p:style>
-      </p:cxnSp>
-      <p:sp>
-        <p:nvSpPr>
-          <p:cNvPr id="23" name="TextBox 22"/>
-          <p:cNvSpPr txBox="1"/>
-          <p:nvPr/>
-        </p:nvSpPr>
-        <p:spPr>
-          <a:xfrm>
-            <a:off x="1952254" y="3733800"/>
-            <a:ext cx="333746" cy="369332"/>
-          </a:xfrm>
-          <a:prstGeom prst="rect">
-            <a:avLst/>
-          </a:prstGeom>
-          <a:noFill/>
-        </p:spPr>
-        <p:txBody>
-          <a:bodyPr wrap="none" rtlCol="0">
-            <a:spAutoFit/>
-          </a:bodyPr>
-          <a:lstStyle/>
-          <a:p>
-            <a:r>
-              <a:rPr lang="en-US" dirty="0" smtClean="0"/>
-              <a:t>N</a:t>
-            </a:r>
-            <a:endParaRPr lang="en-US" dirty="0"/>
-          </a:p>
-        </p:txBody>
-      </p:sp>
-      <p:cxnSp>
-        <p:nvCxnSpPr>
-          <p:cNvPr id="24" name="Straight Arrow Connector 23"/>
-          <p:cNvCxnSpPr/>
-          <p:nvPr/>
-        </p:nvCxnSpPr>
-        <p:spPr>
-          <a:xfrm flipV="1">
-            <a:off x="1905000" y="4724400"/>
-            <a:ext cx="838200" cy="794"/>
-          </a:xfrm>
-          <a:prstGeom prst="straightConnector1">
-            <a:avLst/>
-          </a:prstGeom>
-          <a:ln>
-            <a:solidFill>
-              <a:schemeClr val="accent6">
-                <a:lumMod val="75000"/>
-              </a:schemeClr>
-            </a:solidFill>
-            <a:prstDash val="sysDot"/>
-            <a:tailEnd type="arrow"/>
-          </a:ln>
-        </p:spPr>
-        <p:style>
-          <a:lnRef idx="2">
-            <a:schemeClr val="accent2"/>
-          </a:lnRef>
-          <a:fillRef idx="0">
-            <a:schemeClr val="accent2"/>
-          </a:fillRef>
-          <a:effectRef idx="1">
-            <a:schemeClr val="accent2"/>
-          </a:effectRef>
-          <a:fontRef idx="minor">
-            <a:schemeClr val="tx1"/>
-          </a:fontRef>
-        </p:style>
-      </p:cxnSp>
-      <p:sp>
-        <p:nvSpPr>
-          <p:cNvPr id="28" name="TextBox 27"/>
-          <p:cNvSpPr txBox="1"/>
-          <p:nvPr/>
-        </p:nvSpPr>
-        <p:spPr>
-          <a:xfrm>
-            <a:off x="2590800" y="4343400"/>
-            <a:ext cx="332142" cy="369332"/>
-          </a:xfrm>
-          <a:prstGeom prst="rect">
-            <a:avLst/>
-          </a:prstGeom>
-          <a:noFill/>
-        </p:spPr>
-        <p:txBody>
-          <a:bodyPr wrap="none" rtlCol="0">
-            <a:spAutoFit/>
-          </a:bodyPr>
-          <a:lstStyle/>
-          <a:p>
-            <a:r>
-              <a:rPr lang="en-US" dirty="0"/>
-              <a:t>U</a:t>
-            </a:r>
-          </a:p>
-        </p:txBody>
-      </p:sp>
-      <p:cxnSp>
-        <p:nvCxnSpPr>
-          <p:cNvPr id="29" name="Straight Arrow Connector 28"/>
-          <p:cNvCxnSpPr/>
-          <p:nvPr/>
-        </p:nvCxnSpPr>
-        <p:spPr>
-          <a:xfrm rot="10800000" flipV="1">
-            <a:off x="7162800" y="4958232"/>
-            <a:ext cx="885454" cy="227012"/>
-          </a:xfrm>
-          <a:prstGeom prst="straightConnector1">
-            <a:avLst/>
-          </a:prstGeom>
-          <a:ln>
-            <a:solidFill>
-              <a:schemeClr val="accent6">
-                <a:lumMod val="75000"/>
-              </a:schemeClr>
-            </a:solidFill>
-            <a:tailEnd type="arrow"/>
-          </a:ln>
-        </p:spPr>
-        <p:style>
-          <a:lnRef idx="2">
-            <a:schemeClr val="accent2"/>
-          </a:lnRef>
-          <a:fillRef idx="0">
-            <a:schemeClr val="accent2"/>
-          </a:fillRef>
-          <a:effectRef idx="1">
-            <a:schemeClr val="accent2"/>
-          </a:effectRef>
-          <a:fontRef idx="minor">
-            <a:schemeClr val="tx1"/>
-          </a:fontRef>
-        </p:style>
-      </p:cxnSp>
-      <p:cxnSp>
-        <p:nvCxnSpPr>
-          <p:cNvPr id="30" name="Straight Arrow Connector 29"/>
-          <p:cNvCxnSpPr/>
-          <p:nvPr/>
-        </p:nvCxnSpPr>
-        <p:spPr>
-          <a:xfrm rot="16200000" flipH="1">
-            <a:off x="7962900" y="5070944"/>
-            <a:ext cx="609600" cy="381000"/>
-          </a:xfrm>
-          <a:prstGeom prst="straightConnector1">
-            <a:avLst/>
-          </a:prstGeom>
-          <a:ln>
-            <a:solidFill>
-              <a:schemeClr val="accent6">
-                <a:lumMod val="75000"/>
-              </a:schemeClr>
-            </a:solidFill>
-            <a:tailEnd type="arrow"/>
-          </a:ln>
-        </p:spPr>
-        <p:style>
-          <a:lnRef idx="2">
-            <a:schemeClr val="accent2"/>
-          </a:lnRef>
-          <a:fillRef idx="0">
-            <a:schemeClr val="accent2"/>
-          </a:fillRef>
-          <a:effectRef idx="1">
-            <a:schemeClr val="accent2"/>
-          </a:effectRef>
-          <a:fontRef idx="minor">
-            <a:schemeClr val="tx1"/>
-          </a:fontRef>
-        </p:style>
-      </p:cxnSp>
-      <p:sp>
-        <p:nvSpPr>
-          <p:cNvPr id="31" name="TextBox 30"/>
-          <p:cNvSpPr txBox="1"/>
-          <p:nvPr/>
-        </p:nvSpPr>
-        <p:spPr>
-          <a:xfrm>
-            <a:off x="7010400" y="4815912"/>
-            <a:ext cx="381836" cy="369332"/>
-          </a:xfrm>
-          <a:prstGeom prst="rect">
-            <a:avLst/>
-          </a:prstGeom>
-          <a:noFill/>
-        </p:spPr>
-        <p:txBody>
-          <a:bodyPr wrap="none" rtlCol="0">
-            <a:spAutoFit/>
-          </a:bodyPr>
-          <a:lstStyle/>
-          <a:p>
-            <a:r>
-              <a:rPr lang="en-US" dirty="0" smtClean="0"/>
-              <a:t>M</a:t>
-            </a:r>
-            <a:endParaRPr lang="en-US" dirty="0"/>
-          </a:p>
-        </p:txBody>
-      </p:sp>
-      <p:sp>
-        <p:nvSpPr>
-          <p:cNvPr id="32" name="TextBox 31"/>
-          <p:cNvSpPr txBox="1"/>
-          <p:nvPr/>
-        </p:nvSpPr>
-        <p:spPr>
-          <a:xfrm>
-            <a:off x="8382000" y="5490044"/>
-            <a:ext cx="290464" cy="369332"/>
-          </a:xfrm>
-          <a:prstGeom prst="rect">
-            <a:avLst/>
-          </a:prstGeom>
-          <a:noFill/>
-        </p:spPr>
-        <p:txBody>
-          <a:bodyPr wrap="none" rtlCol="0">
-            <a:spAutoFit/>
-          </a:bodyPr>
-          <a:lstStyle/>
-          <a:p>
-            <a:r>
-              <a:rPr lang="en-US" dirty="0" smtClean="0"/>
-              <a:t>F</a:t>
-            </a:r>
-            <a:endParaRPr lang="en-US" dirty="0"/>
-          </a:p>
-        </p:txBody>
-      </p:sp>
-      <p:cxnSp>
-        <p:nvCxnSpPr>
-          <p:cNvPr id="43" name="Straight Arrow Connector 42"/>
-          <p:cNvCxnSpPr/>
-          <p:nvPr/>
-        </p:nvCxnSpPr>
-        <p:spPr>
-          <a:xfrm rot="5400000">
-            <a:off x="5242491" y="2388341"/>
-            <a:ext cx="685800" cy="47254"/>
-          </a:xfrm>
-          <a:prstGeom prst="straightConnector1">
-            <a:avLst/>
-          </a:prstGeom>
-          <a:ln>
-            <a:solidFill>
-              <a:schemeClr val="accent6">
-                <a:lumMod val="75000"/>
-              </a:schemeClr>
-            </a:solidFill>
-            <a:tailEnd type="arrow"/>
-          </a:ln>
-        </p:spPr>
-        <p:style>
-          <a:lnRef idx="2">
-            <a:schemeClr val="accent2"/>
-          </a:lnRef>
-          <a:fillRef idx="0">
-            <a:schemeClr val="accent2"/>
-          </a:fillRef>
-          <a:effectRef idx="1">
-            <a:schemeClr val="accent2"/>
-          </a:effectRef>
-          <a:fontRef idx="minor">
-            <a:schemeClr val="tx1"/>
-          </a:fontRef>
-        </p:style>
-      </p:cxnSp>
-      <p:cxnSp>
-        <p:nvCxnSpPr>
-          <p:cNvPr id="45" name="Straight Arrow Connector 44"/>
-          <p:cNvCxnSpPr/>
-          <p:nvPr/>
-        </p:nvCxnSpPr>
-        <p:spPr>
-          <a:xfrm rot="10800000">
-            <a:off x="5104564" y="1688068"/>
-            <a:ext cx="504454" cy="381000"/>
-          </a:xfrm>
-          <a:prstGeom prst="straightConnector1">
-            <a:avLst/>
-          </a:prstGeom>
-          <a:ln>
-            <a:solidFill>
-              <a:schemeClr val="accent6">
-                <a:lumMod val="75000"/>
-              </a:schemeClr>
-            </a:solidFill>
-            <a:tailEnd type="arrow"/>
-          </a:ln>
-        </p:spPr>
-        <p:style>
-          <a:lnRef idx="2">
-            <a:schemeClr val="accent2"/>
-          </a:lnRef>
-          <a:fillRef idx="0">
-            <a:schemeClr val="accent2"/>
-          </a:fillRef>
-          <a:effectRef idx="1">
-            <a:schemeClr val="accent2"/>
-          </a:effectRef>
-          <a:fontRef idx="minor">
-            <a:schemeClr val="tx1"/>
-          </a:fontRef>
-        </p:style>
-      </p:cxnSp>
-      <p:sp>
-        <p:nvSpPr>
-          <p:cNvPr id="47" name="TextBox 46"/>
-          <p:cNvSpPr txBox="1"/>
-          <p:nvPr/>
-        </p:nvSpPr>
-        <p:spPr>
-          <a:xfrm>
-            <a:off x="5561764" y="2678668"/>
-            <a:ext cx="381836" cy="369332"/>
-          </a:xfrm>
-          <a:prstGeom prst="rect">
-            <a:avLst/>
-          </a:prstGeom>
-          <a:noFill/>
-        </p:spPr>
-        <p:txBody>
-          <a:bodyPr wrap="none" rtlCol="0">
-            <a:spAutoFit/>
-          </a:bodyPr>
-          <a:lstStyle/>
-          <a:p>
-            <a:r>
-              <a:rPr lang="en-US" dirty="0" smtClean="0"/>
-              <a:t>M</a:t>
-            </a:r>
-            <a:endParaRPr lang="en-US" dirty="0"/>
-          </a:p>
-        </p:txBody>
-      </p:sp>
-      <p:sp>
-        <p:nvSpPr>
-          <p:cNvPr id="48" name="TextBox 47"/>
-          <p:cNvSpPr txBox="1"/>
-          <p:nvPr/>
-        </p:nvSpPr>
-        <p:spPr>
-          <a:xfrm>
-            <a:off x="4952164" y="1383268"/>
-            <a:ext cx="290464" cy="369332"/>
-          </a:xfrm>
-          <a:prstGeom prst="rect">
-            <a:avLst/>
-          </a:prstGeom>
-          <a:noFill/>
-        </p:spPr>
-        <p:txBody>
-          <a:bodyPr wrap="none" rtlCol="0">
-            <a:spAutoFit/>
-          </a:bodyPr>
-          <a:lstStyle/>
-          <a:p>
-            <a:r>
-              <a:rPr lang="en-US" dirty="0" smtClean="0"/>
-              <a:t>F</a:t>
-            </a:r>
-            <a:endParaRPr lang="en-US" dirty="0"/>
-          </a:p>
-        </p:txBody>
-      </p:sp>
-      <p:cxnSp>
-        <p:nvCxnSpPr>
-          <p:cNvPr id="49" name="Straight Arrow Connector 48"/>
-          <p:cNvCxnSpPr/>
-          <p:nvPr/>
-        </p:nvCxnSpPr>
-        <p:spPr>
-          <a:xfrm rot="10800000">
-            <a:off x="4790238" y="1664253"/>
-            <a:ext cx="504454" cy="381000"/>
-          </a:xfrm>
-          <a:prstGeom prst="straightConnector1">
-            <a:avLst/>
-          </a:prstGeom>
-          <a:ln>
-            <a:tailEnd type="arrow"/>
-          </a:ln>
-        </p:spPr>
-        <p:style>
-          <a:lnRef idx="2">
-            <a:schemeClr val="accent5"/>
-          </a:lnRef>
-          <a:fillRef idx="0">
-            <a:schemeClr val="accent5"/>
-          </a:fillRef>
-          <a:effectRef idx="1">
-            <a:schemeClr val="accent5"/>
-          </a:effectRef>
-          <a:fontRef idx="minor">
-            <a:schemeClr val="tx1"/>
-          </a:fontRef>
-        </p:style>
-      </p:cxnSp>
-      <p:cxnSp>
-        <p:nvCxnSpPr>
-          <p:cNvPr id="50" name="Straight Arrow Connector 49"/>
-          <p:cNvCxnSpPr/>
-          <p:nvPr/>
-        </p:nvCxnSpPr>
-        <p:spPr>
-          <a:xfrm>
-            <a:off x="5295064" y="2038588"/>
-            <a:ext cx="807720" cy="60960"/>
-          </a:xfrm>
-          <a:prstGeom prst="straightConnector1">
-            <a:avLst/>
-          </a:prstGeom>
-          <a:ln>
-            <a:tailEnd type="arrow"/>
-          </a:ln>
-        </p:spPr>
-        <p:style>
-          <a:lnRef idx="2">
-            <a:schemeClr val="accent5"/>
-          </a:lnRef>
-          <a:fillRef idx="0">
-            <a:schemeClr val="accent5"/>
-          </a:fillRef>
-          <a:effectRef idx="1">
-            <a:schemeClr val="accent5"/>
-          </a:effectRef>
-          <a:fontRef idx="minor">
-            <a:schemeClr val="tx1"/>
-          </a:fontRef>
-        </p:style>
-      </p:cxnSp>
-      <p:sp>
-        <p:nvSpPr>
-          <p:cNvPr id="55" name="TextBox 54"/>
-          <p:cNvSpPr txBox="1"/>
-          <p:nvPr/>
-        </p:nvSpPr>
-        <p:spPr>
-          <a:xfrm>
-            <a:off x="5866564" y="1699736"/>
-            <a:ext cx="381836" cy="369332"/>
-          </a:xfrm>
-          <a:prstGeom prst="rect">
-            <a:avLst/>
-          </a:prstGeom>
-          <a:noFill/>
-        </p:spPr>
-        <p:txBody>
-          <a:bodyPr wrap="none" rtlCol="0">
-            <a:spAutoFit/>
-          </a:bodyPr>
-          <a:lstStyle/>
-          <a:p>
-            <a:r>
-              <a:rPr lang="en-US" dirty="0" smtClean="0"/>
-              <a:t>M</a:t>
-            </a:r>
-            <a:endParaRPr lang="en-US" dirty="0"/>
-          </a:p>
-        </p:txBody>
-      </p:sp>
-      <p:sp>
-        <p:nvSpPr>
-          <p:cNvPr id="56" name="TextBox 55"/>
-          <p:cNvSpPr txBox="1"/>
-          <p:nvPr/>
-        </p:nvSpPr>
-        <p:spPr>
-          <a:xfrm>
-            <a:off x="4571164" y="1383268"/>
-            <a:ext cx="290464" cy="369332"/>
-          </a:xfrm>
-          <a:prstGeom prst="rect">
-            <a:avLst/>
-          </a:prstGeom>
-          <a:noFill/>
-        </p:spPr>
-        <p:txBody>
-          <a:bodyPr wrap="none" rtlCol="0">
-            <a:spAutoFit/>
-          </a:bodyPr>
-          <a:lstStyle/>
-          <a:p>
-            <a:r>
-              <a:rPr lang="en-US" dirty="0" smtClean="0"/>
-              <a:t>F</a:t>
-            </a:r>
-            <a:endParaRPr lang="en-US" dirty="0"/>
-          </a:p>
-        </p:txBody>
-      </p:sp>
-      <p:sp>
-        <p:nvSpPr>
-          <p:cNvPr id="57" name="Oval 56"/>
-          <p:cNvSpPr/>
-          <p:nvPr/>
-        </p:nvSpPr>
-        <p:spPr>
-          <a:xfrm>
-            <a:off x="1196340" y="4617720"/>
-            <a:ext cx="228600" cy="289560"/>
-          </a:xfrm>
-          <a:prstGeom prst="ellipse">
-            <a:avLst/>
-          </a:prstGeom>
-          <a:noFill/>
-          <a:ln w="9525">
-            <a:solidFill>
-              <a:srgbClr val="00B050"/>
-            </a:solidFill>
-            <a:prstDash val="sysDash"/>
-          </a:ln>
-        </p:spPr>
-        <p:style>
-          <a:lnRef idx="2">
-            <a:schemeClr val="accent3"/>
-          </a:lnRef>
-          <a:fillRef idx="1">
-            <a:schemeClr val="lt1"/>
-          </a:fillRef>
-          <a:effectRef idx="0">
-            <a:schemeClr val="accent3"/>
-          </a:effectRef>
-          <a:fontRef idx="minor">
-            <a:schemeClr val="dk1"/>
-          </a:fontRef>
-        </p:style>
-        <p:txBody>
-          <a:bodyPr rtlCol="0" anchor="ctr"/>
-          <a:lstStyle/>
-          <a:p>
-            <a:pPr algn="ctr"/>
-            <a:endParaRPr lang="en-US"/>
-          </a:p>
-        </p:txBody>
-      </p:sp>
-      <p:sp>
-        <p:nvSpPr>
-          <p:cNvPr id="58" name="Oval 57"/>
-          <p:cNvSpPr/>
-          <p:nvPr/>
-        </p:nvSpPr>
-        <p:spPr>
-          <a:xfrm>
-            <a:off x="7772400" y="4804244"/>
-            <a:ext cx="228600" cy="289560"/>
-          </a:xfrm>
-          <a:prstGeom prst="ellipse">
-            <a:avLst/>
-          </a:prstGeom>
-          <a:noFill/>
-          <a:ln w="9525">
-            <a:solidFill>
-              <a:srgbClr val="00B050"/>
-            </a:solidFill>
-            <a:prstDash val="sysDash"/>
-          </a:ln>
-        </p:spPr>
-        <p:style>
-          <a:lnRef idx="2">
-            <a:schemeClr val="accent3"/>
-          </a:lnRef>
-          <a:fillRef idx="1">
-            <a:schemeClr val="lt1"/>
-          </a:fillRef>
-          <a:effectRef idx="0">
-            <a:schemeClr val="accent3"/>
-          </a:effectRef>
-          <a:fontRef idx="minor">
-            <a:schemeClr val="dk1"/>
-          </a:fontRef>
-        </p:style>
-        <p:txBody>
-          <a:bodyPr rtlCol="0" anchor="ctr"/>
-          <a:lstStyle/>
-          <a:p>
-            <a:pPr algn="ctr"/>
-            <a:endParaRPr lang="en-US"/>
-          </a:p>
-        </p:txBody>
-      </p:sp>
-      <p:sp>
-        <p:nvSpPr>
-          <p:cNvPr id="59" name="TextBox 58"/>
-          <p:cNvSpPr txBox="1"/>
-          <p:nvPr/>
-        </p:nvSpPr>
-        <p:spPr>
-          <a:xfrm>
-            <a:off x="3657600" y="3810000"/>
-            <a:ext cx="2506968" cy="1477328"/>
-          </a:xfrm>
-          <a:prstGeom prst="rect">
-            <a:avLst/>
-          </a:prstGeom>
-          <a:noFill/>
-        </p:spPr>
-        <p:txBody>
-          <a:bodyPr wrap="none" rtlCol="0">
-            <a:spAutoFit/>
-          </a:bodyPr>
-          <a:lstStyle/>
-          <a:p>
             <a:pPr marL="342900" indent="-342900"/>
             <a:r>
               <a:rPr lang="en-US" b="1" dirty="0" smtClean="0"/>
@@ -4358,112 +3501,741 @@
             </a:r>
           </a:p>
           <a:p>
-            <a:pPr marL="342900" indent="-342900"/>
+            <a:pPr marL="342900" indent="-342900">
+              <a:buFont typeface="Arial" panose="020B0604020202020204" pitchFamily="34" charset="0"/>
+              <a:buChar char="•"/>
+            </a:pPr>
             <a:r>
               <a:rPr lang="en-US" dirty="0" smtClean="0"/>
               <a:t>M = marked</a:t>
             </a:r>
           </a:p>
           <a:p>
-            <a:pPr marL="342900" indent="-342900"/>
+            <a:pPr marL="342900" indent="-342900">
+              <a:buFont typeface="Arial" panose="020B0604020202020204" pitchFamily="34" charset="0"/>
+              <a:buChar char="•"/>
+            </a:pPr>
             <a:r>
               <a:rPr lang="en-US" dirty="0" smtClean="0"/>
               <a:t>U = unmarked = -marked</a:t>
             </a:r>
           </a:p>
           <a:p>
-            <a:pPr marL="342900" indent="-342900"/>
+            <a:pPr marL="342900" indent="-342900">
+              <a:buFont typeface="Arial" panose="020B0604020202020204" pitchFamily="34" charset="0"/>
+              <a:buChar char="•"/>
+            </a:pPr>
             <a:r>
               <a:rPr lang="en-US" dirty="0" smtClean="0"/>
               <a:t>F = far</a:t>
             </a:r>
           </a:p>
           <a:p>
-            <a:pPr marL="342900" indent="-342900"/>
+            <a:pPr marL="342900" indent="-342900">
+              <a:buFont typeface="Arial" panose="020B0604020202020204" pitchFamily="34" charset="0"/>
+              <a:buChar char="•"/>
+            </a:pPr>
             <a:r>
               <a:rPr lang="en-US" dirty="0" smtClean="0"/>
-              <a:t>N = near = -far</a:t>
+              <a:t>N = near = -</a:t>
+            </a:r>
+            <a:r>
+              <a:rPr lang="en-US" dirty="0" smtClean="0"/>
+              <a:t>far</a:t>
+            </a:r>
+          </a:p>
+          <a:p>
+            <a:pPr marL="342900" indent="-342900">
+              <a:buFont typeface="Arial" panose="020B0604020202020204" pitchFamily="34" charset="0"/>
+              <a:buChar char="•"/>
+            </a:pPr>
+            <a:r>
+              <a:rPr lang="en-US" dirty="0" smtClean="0"/>
+              <a:t>A = ascending = cross(M,F)</a:t>
+            </a:r>
+          </a:p>
+          <a:p>
+            <a:pPr marL="342900" indent="-342900">
+              <a:buFont typeface="Arial" panose="020B0604020202020204" pitchFamily="34" charset="0"/>
+              <a:buChar char="•"/>
+            </a:pPr>
+            <a:r>
+              <a:rPr lang="en-US" dirty="0" smtClean="0"/>
+              <a:t>D = descending = -ascending</a:t>
             </a:r>
             <a:endParaRPr lang="en-US" dirty="0"/>
           </a:p>
         </p:txBody>
       </p:sp>
-      <p:sp>
-        <p:nvSpPr>
-          <p:cNvPr id="62" name="TextBox 61"/>
-          <p:cNvSpPr txBox="1"/>
-          <p:nvPr/>
-        </p:nvSpPr>
-        <p:spPr>
-          <a:xfrm>
-            <a:off x="739140" y="4823460"/>
-            <a:ext cx="704680" cy="307777"/>
-          </a:xfrm>
-          <a:prstGeom prst="rect">
-            <a:avLst/>
-          </a:prstGeom>
-          <a:noFill/>
-        </p:spPr>
-        <p:txBody>
-          <a:bodyPr wrap="none" rtlCol="0">
-            <a:spAutoFit/>
-          </a:bodyPr>
-          <a:lstStyle/>
-          <a:p>
-            <a:r>
-              <a:rPr lang="en-US" sz="1400" dirty="0" smtClean="0">
+      <p:grpSp>
+        <p:nvGrpSpPr>
+          <p:cNvPr id="75" name="Group 74"/>
+          <p:cNvGrpSpPr/>
+          <p:nvPr/>
+        </p:nvGrpSpPr>
+        <p:grpSpPr>
+          <a:xfrm>
+            <a:off x="265507" y="609600"/>
+            <a:ext cx="2183802" cy="3264932"/>
+            <a:chOff x="265507" y="609600"/>
+            <a:chExt cx="2183802" cy="3264932"/>
+          </a:xfrm>
+        </p:grpSpPr>
+        <p:pic>
+          <p:nvPicPr>
+            <p:cNvPr id="1026" name="Picture 2"/>
+            <p:cNvPicPr>
+              <a:picLocks noChangeAspect="1" noChangeArrowheads="1"/>
+            </p:cNvPicPr>
+            <p:nvPr/>
+          </p:nvPicPr>
+          <p:blipFill>
+            <a:blip r:embed="rId2" cstate="print"/>
+            <a:srcRect/>
+            <a:stretch>
+              <a:fillRect/>
+            </a:stretch>
+          </p:blipFill>
+          <p:spPr bwMode="auto">
+            <a:xfrm>
+              <a:off x="745567" y="609600"/>
+              <a:ext cx="1306978" cy="2819400"/>
+            </a:xfrm>
+            <a:prstGeom prst="rect">
+              <a:avLst/>
+            </a:prstGeom>
+            <a:noFill/>
+            <a:ln w="9525">
+              <a:noFill/>
+              <a:miter lim="800000"/>
+              <a:headEnd/>
+              <a:tailEnd/>
+            </a:ln>
+          </p:spPr>
+        </p:pic>
+        <p:cxnSp>
+          <p:nvCxnSpPr>
+            <p:cNvPr id="12" name="Straight Arrow Connector 11"/>
+            <p:cNvCxnSpPr/>
+            <p:nvPr/>
+          </p:nvCxnSpPr>
+          <p:spPr>
+            <a:xfrm rot="10800000">
+              <a:off x="516967" y="2895600"/>
+              <a:ext cx="885454" cy="1588"/>
+            </a:xfrm>
+            <a:prstGeom prst="straightConnector1">
+              <a:avLst/>
+            </a:prstGeom>
+            <a:ln>
+              <a:solidFill>
+                <a:schemeClr val="accent6">
+                  <a:lumMod val="75000"/>
+                </a:schemeClr>
+              </a:solidFill>
+              <a:tailEnd type="arrow"/>
+            </a:ln>
+          </p:spPr>
+          <p:style>
+            <a:lnRef idx="2">
+              <a:schemeClr val="accent2"/>
+            </a:lnRef>
+            <a:fillRef idx="0">
+              <a:schemeClr val="accent2"/>
+            </a:fillRef>
+            <a:effectRef idx="1">
+              <a:schemeClr val="accent2"/>
+            </a:effectRef>
+            <a:fontRef idx="minor">
+              <a:schemeClr val="tx1"/>
+            </a:fontRef>
+          </p:style>
+        </p:cxnSp>
+        <p:cxnSp>
+          <p:nvCxnSpPr>
+            <p:cNvPr id="14" name="Straight Arrow Connector 13"/>
+            <p:cNvCxnSpPr/>
+            <p:nvPr/>
+          </p:nvCxnSpPr>
+          <p:spPr>
+            <a:xfrm rot="5400000">
+              <a:off x="1006181" y="3291840"/>
+              <a:ext cx="792480" cy="1588"/>
+            </a:xfrm>
+            <a:prstGeom prst="straightConnector1">
+              <a:avLst/>
+            </a:prstGeom>
+            <a:ln>
+              <a:solidFill>
+                <a:schemeClr val="accent6">
+                  <a:lumMod val="75000"/>
+                </a:schemeClr>
+              </a:solidFill>
+              <a:tailEnd type="arrow"/>
+            </a:ln>
+          </p:spPr>
+          <p:style>
+            <a:lnRef idx="2">
+              <a:schemeClr val="accent2"/>
+            </a:lnRef>
+            <a:fillRef idx="0">
+              <a:schemeClr val="accent2"/>
+            </a:fillRef>
+            <a:effectRef idx="1">
+              <a:schemeClr val="accent2"/>
+            </a:effectRef>
+            <a:fontRef idx="minor">
+              <a:schemeClr val="tx1"/>
+            </a:fontRef>
+          </p:style>
+        </p:cxnSp>
+        <p:sp>
+          <p:nvSpPr>
+            <p:cNvPr id="19" name="TextBox 18"/>
+            <p:cNvSpPr txBox="1"/>
+            <p:nvPr/>
+          </p:nvSpPr>
+          <p:spPr>
+            <a:xfrm>
+              <a:off x="364567" y="2514600"/>
+              <a:ext cx="381836" cy="369332"/>
+            </a:xfrm>
+            <a:prstGeom prst="rect">
+              <a:avLst/>
+            </a:prstGeom>
+            <a:noFill/>
+          </p:spPr>
+          <p:txBody>
+            <a:bodyPr wrap="none" rtlCol="0">
+              <a:spAutoFit/>
+            </a:bodyPr>
+            <a:lstStyle/>
+            <a:p>
+              <a:r>
+                <a:rPr lang="en-US" dirty="0" smtClean="0"/>
+                <a:t>M</a:t>
+              </a:r>
+              <a:endParaRPr lang="en-US" dirty="0"/>
+            </a:p>
+          </p:txBody>
+        </p:sp>
+        <p:sp>
+          <p:nvSpPr>
+            <p:cNvPr id="20" name="TextBox 19"/>
+            <p:cNvSpPr txBox="1"/>
+            <p:nvPr/>
+          </p:nvSpPr>
+          <p:spPr>
+            <a:xfrm>
+              <a:off x="1478621" y="3505200"/>
+              <a:ext cx="290464" cy="369332"/>
+            </a:xfrm>
+            <a:prstGeom prst="rect">
+              <a:avLst/>
+            </a:prstGeom>
+            <a:noFill/>
+          </p:spPr>
+          <p:txBody>
+            <a:bodyPr wrap="none" rtlCol="0">
+              <a:spAutoFit/>
+            </a:bodyPr>
+            <a:lstStyle/>
+            <a:p>
+              <a:r>
+                <a:rPr lang="en-US" dirty="0" smtClean="0"/>
+                <a:t>F</a:t>
+              </a:r>
+              <a:endParaRPr lang="en-US" dirty="0"/>
+            </a:p>
+          </p:txBody>
+        </p:sp>
+        <p:cxnSp>
+          <p:nvCxnSpPr>
+            <p:cNvPr id="21" name="Straight Arrow Connector 20"/>
+            <p:cNvCxnSpPr/>
+            <p:nvPr/>
+          </p:nvCxnSpPr>
+          <p:spPr>
+            <a:xfrm rot="16200000" flipV="1">
+              <a:off x="983321" y="2476500"/>
+              <a:ext cx="838994" cy="794"/>
+            </a:xfrm>
+            <a:prstGeom prst="straightConnector1">
+              <a:avLst/>
+            </a:prstGeom>
+            <a:ln>
+              <a:solidFill>
+                <a:schemeClr val="accent6">
+                  <a:lumMod val="75000"/>
+                </a:schemeClr>
+              </a:solidFill>
+              <a:prstDash val="sysDot"/>
+              <a:tailEnd type="arrow"/>
+            </a:ln>
+          </p:spPr>
+          <p:style>
+            <a:lnRef idx="2">
+              <a:schemeClr val="accent2"/>
+            </a:lnRef>
+            <a:fillRef idx="0">
+              <a:schemeClr val="accent2"/>
+            </a:fillRef>
+            <a:effectRef idx="1">
+              <a:schemeClr val="accent2"/>
+            </a:effectRef>
+            <a:fontRef idx="minor">
+              <a:schemeClr val="tx1"/>
+            </a:fontRef>
+          </p:style>
+        </p:cxnSp>
+        <p:sp>
+          <p:nvSpPr>
+            <p:cNvPr id="23" name="TextBox 22"/>
+            <p:cNvSpPr txBox="1"/>
+            <p:nvPr/>
+          </p:nvSpPr>
+          <p:spPr>
+            <a:xfrm>
+              <a:off x="1478621" y="1905000"/>
+              <a:ext cx="333746" cy="369332"/>
+            </a:xfrm>
+            <a:prstGeom prst="rect">
+              <a:avLst/>
+            </a:prstGeom>
+            <a:noFill/>
+          </p:spPr>
+          <p:txBody>
+            <a:bodyPr wrap="none" rtlCol="0">
+              <a:spAutoFit/>
+            </a:bodyPr>
+            <a:lstStyle/>
+            <a:p>
+              <a:r>
+                <a:rPr lang="en-US" dirty="0" smtClean="0"/>
+                <a:t>N</a:t>
+              </a:r>
+              <a:endParaRPr lang="en-US" dirty="0"/>
+            </a:p>
+          </p:txBody>
+        </p:sp>
+        <p:cxnSp>
+          <p:nvCxnSpPr>
+            <p:cNvPr id="24" name="Straight Arrow Connector 23"/>
+            <p:cNvCxnSpPr/>
+            <p:nvPr/>
+          </p:nvCxnSpPr>
+          <p:spPr>
+            <a:xfrm flipV="1">
+              <a:off x="1431367" y="2895600"/>
+              <a:ext cx="838200" cy="794"/>
+            </a:xfrm>
+            <a:prstGeom prst="straightConnector1">
+              <a:avLst/>
+            </a:prstGeom>
+            <a:ln>
+              <a:solidFill>
+                <a:schemeClr val="accent6">
+                  <a:lumMod val="75000"/>
+                </a:schemeClr>
+              </a:solidFill>
+              <a:prstDash val="sysDot"/>
+              <a:tailEnd type="arrow"/>
+            </a:ln>
+          </p:spPr>
+          <p:style>
+            <a:lnRef idx="2">
+              <a:schemeClr val="accent2"/>
+            </a:lnRef>
+            <a:fillRef idx="0">
+              <a:schemeClr val="accent2"/>
+            </a:fillRef>
+            <a:effectRef idx="1">
+              <a:schemeClr val="accent2"/>
+            </a:effectRef>
+            <a:fontRef idx="minor">
+              <a:schemeClr val="tx1"/>
+            </a:fontRef>
+          </p:style>
+        </p:cxnSp>
+        <p:sp>
+          <p:nvSpPr>
+            <p:cNvPr id="28" name="TextBox 27"/>
+            <p:cNvSpPr txBox="1"/>
+            <p:nvPr/>
+          </p:nvSpPr>
+          <p:spPr>
+            <a:xfrm>
+              <a:off x="2117167" y="2514600"/>
+              <a:ext cx="332142" cy="369332"/>
+            </a:xfrm>
+            <a:prstGeom prst="rect">
+              <a:avLst/>
+            </a:prstGeom>
+            <a:noFill/>
+          </p:spPr>
+          <p:txBody>
+            <a:bodyPr wrap="none" rtlCol="0">
+              <a:spAutoFit/>
+            </a:bodyPr>
+            <a:lstStyle/>
+            <a:p>
+              <a:r>
+                <a:rPr lang="en-US" dirty="0"/>
+                <a:t>U</a:t>
+              </a:r>
+            </a:p>
+          </p:txBody>
+        </p:sp>
+        <p:sp>
+          <p:nvSpPr>
+            <p:cNvPr id="57" name="Oval 56"/>
+            <p:cNvSpPr/>
+            <p:nvPr/>
+          </p:nvSpPr>
+          <p:spPr>
+            <a:xfrm>
+              <a:off x="722707" y="2788920"/>
+              <a:ext cx="228600" cy="289560"/>
+            </a:xfrm>
+            <a:prstGeom prst="ellipse">
+              <a:avLst/>
+            </a:prstGeom>
+            <a:noFill/>
+            <a:ln w="9525">
+              <a:solidFill>
+                <a:srgbClr val="00B050"/>
+              </a:solidFill>
+              <a:prstDash val="sysDash"/>
+            </a:ln>
+          </p:spPr>
+          <p:style>
+            <a:lnRef idx="2">
+              <a:schemeClr val="accent3"/>
+            </a:lnRef>
+            <a:fillRef idx="1">
+              <a:schemeClr val="lt1"/>
+            </a:fillRef>
+            <a:effectRef idx="0">
+              <a:schemeClr val="accent3"/>
+            </a:effectRef>
+            <a:fontRef idx="minor">
+              <a:schemeClr val="dk1"/>
+            </a:fontRef>
+          </p:style>
+          <p:txBody>
+            <a:bodyPr rtlCol="0" anchor="ctr"/>
+            <a:lstStyle/>
+            <a:p>
+              <a:pPr algn="ctr"/>
+              <a:endParaRPr lang="en-US"/>
+            </a:p>
+          </p:txBody>
+        </p:sp>
+        <p:sp>
+          <p:nvSpPr>
+            <p:cNvPr id="62" name="TextBox 61"/>
+            <p:cNvSpPr txBox="1"/>
+            <p:nvPr/>
+          </p:nvSpPr>
+          <p:spPr>
+            <a:xfrm>
+              <a:off x="265507" y="2994660"/>
+              <a:ext cx="704680" cy="307777"/>
+            </a:xfrm>
+            <a:prstGeom prst="rect">
+              <a:avLst/>
+            </a:prstGeom>
+            <a:noFill/>
+          </p:spPr>
+          <p:txBody>
+            <a:bodyPr wrap="none" rtlCol="0">
+              <a:spAutoFit/>
+            </a:bodyPr>
+            <a:lstStyle/>
+            <a:p>
+              <a:r>
+                <a:rPr lang="en-US" sz="1400" dirty="0" smtClean="0">
+                  <a:solidFill>
+                    <a:srgbClr val="00B050"/>
+                  </a:solidFill>
+                </a:rPr>
+                <a:t>marker</a:t>
+              </a:r>
+              <a:endParaRPr lang="en-US" sz="1400" dirty="0">
                 <a:solidFill>
                   <a:srgbClr val="00B050"/>
                 </a:solidFill>
-              </a:rPr>
-              <a:t>marker</a:t>
-            </a:r>
-            <a:endParaRPr lang="en-US" sz="1400" dirty="0">
+              </a:endParaRPr>
+            </a:p>
+          </p:txBody>
+        </p:sp>
+      </p:grpSp>
+      <p:grpSp>
+        <p:nvGrpSpPr>
+          <p:cNvPr id="78" name="Group 77"/>
+          <p:cNvGrpSpPr/>
+          <p:nvPr/>
+        </p:nvGrpSpPr>
+        <p:grpSpPr>
+          <a:xfrm>
+            <a:off x="6588035" y="531578"/>
+            <a:ext cx="2347864" cy="3420976"/>
+            <a:chOff x="6588035" y="531578"/>
+            <a:chExt cx="2347864" cy="3420976"/>
+          </a:xfrm>
+        </p:grpSpPr>
+        <p:pic>
+          <p:nvPicPr>
+            <p:cNvPr id="1027" name="Picture 3"/>
+            <p:cNvPicPr>
+              <a:picLocks noChangeAspect="1" noChangeArrowheads="1"/>
+            </p:cNvPicPr>
+            <p:nvPr/>
+          </p:nvPicPr>
+          <p:blipFill>
+            <a:blip r:embed="rId3" cstate="print"/>
+            <a:srcRect/>
+            <a:stretch>
+              <a:fillRect/>
+            </a:stretch>
+          </p:blipFill>
+          <p:spPr bwMode="auto">
+            <a:xfrm>
+              <a:off x="6588035" y="531578"/>
+              <a:ext cx="1981200" cy="2746844"/>
+            </a:xfrm>
+            <a:prstGeom prst="rect">
+              <a:avLst/>
+            </a:prstGeom>
+            <a:noFill/>
+            <a:ln w="9525">
+              <a:noFill/>
+              <a:miter lim="800000"/>
+              <a:headEnd/>
+              <a:tailEnd/>
+            </a:ln>
+          </p:spPr>
+        </p:pic>
+        <p:cxnSp>
+          <p:nvCxnSpPr>
+            <p:cNvPr id="29" name="Straight Arrow Connector 28"/>
+            <p:cNvCxnSpPr/>
+            <p:nvPr/>
+          </p:nvCxnSpPr>
+          <p:spPr>
+            <a:xfrm rot="10800000" flipV="1">
+              <a:off x="7426235" y="3051410"/>
+              <a:ext cx="885454" cy="227012"/>
+            </a:xfrm>
+            <a:prstGeom prst="straightConnector1">
+              <a:avLst/>
+            </a:prstGeom>
+            <a:ln>
+              <a:solidFill>
+                <a:schemeClr val="accent6">
+                  <a:lumMod val="75000"/>
+                </a:schemeClr>
+              </a:solidFill>
+              <a:tailEnd type="arrow"/>
+            </a:ln>
+          </p:spPr>
+          <p:style>
+            <a:lnRef idx="2">
+              <a:schemeClr val="accent2"/>
+            </a:lnRef>
+            <a:fillRef idx="0">
+              <a:schemeClr val="accent2"/>
+            </a:fillRef>
+            <a:effectRef idx="1">
+              <a:schemeClr val="accent2"/>
+            </a:effectRef>
+            <a:fontRef idx="minor">
+              <a:schemeClr val="tx1"/>
+            </a:fontRef>
+          </p:style>
+        </p:cxnSp>
+        <p:cxnSp>
+          <p:nvCxnSpPr>
+            <p:cNvPr id="30" name="Straight Arrow Connector 29"/>
+            <p:cNvCxnSpPr/>
+            <p:nvPr/>
+          </p:nvCxnSpPr>
+          <p:spPr>
+            <a:xfrm rot="16200000" flipH="1">
+              <a:off x="8226335" y="3164122"/>
+              <a:ext cx="609600" cy="381000"/>
+            </a:xfrm>
+            <a:prstGeom prst="straightConnector1">
+              <a:avLst/>
+            </a:prstGeom>
+            <a:ln>
+              <a:solidFill>
+                <a:schemeClr val="accent6">
+                  <a:lumMod val="75000"/>
+                </a:schemeClr>
+              </a:solidFill>
+              <a:tailEnd type="arrow"/>
+            </a:ln>
+          </p:spPr>
+          <p:style>
+            <a:lnRef idx="2">
+              <a:schemeClr val="accent2"/>
+            </a:lnRef>
+            <a:fillRef idx="0">
+              <a:schemeClr val="accent2"/>
+            </a:fillRef>
+            <a:effectRef idx="1">
+              <a:schemeClr val="accent2"/>
+            </a:effectRef>
+            <a:fontRef idx="minor">
+              <a:schemeClr val="tx1"/>
+            </a:fontRef>
+          </p:style>
+        </p:cxnSp>
+        <p:sp>
+          <p:nvSpPr>
+            <p:cNvPr id="31" name="TextBox 30"/>
+            <p:cNvSpPr txBox="1"/>
+            <p:nvPr/>
+          </p:nvSpPr>
+          <p:spPr>
+            <a:xfrm>
+              <a:off x="7273835" y="2909090"/>
+              <a:ext cx="381836" cy="369332"/>
+            </a:xfrm>
+            <a:prstGeom prst="rect">
+              <a:avLst/>
+            </a:prstGeom>
+            <a:noFill/>
+          </p:spPr>
+          <p:txBody>
+            <a:bodyPr wrap="none" rtlCol="0">
+              <a:spAutoFit/>
+            </a:bodyPr>
+            <a:lstStyle/>
+            <a:p>
+              <a:r>
+                <a:rPr lang="en-US" dirty="0" smtClean="0"/>
+                <a:t>M</a:t>
+              </a:r>
+              <a:endParaRPr lang="en-US" dirty="0"/>
+            </a:p>
+          </p:txBody>
+        </p:sp>
+        <p:sp>
+          <p:nvSpPr>
+            <p:cNvPr id="32" name="TextBox 31"/>
+            <p:cNvSpPr txBox="1"/>
+            <p:nvPr/>
+          </p:nvSpPr>
+          <p:spPr>
+            <a:xfrm>
+              <a:off x="8645435" y="3583222"/>
+              <a:ext cx="290464" cy="369332"/>
+            </a:xfrm>
+            <a:prstGeom prst="rect">
+              <a:avLst/>
+            </a:prstGeom>
+            <a:noFill/>
+          </p:spPr>
+          <p:txBody>
+            <a:bodyPr wrap="none" rtlCol="0">
+              <a:spAutoFit/>
+            </a:bodyPr>
+            <a:lstStyle/>
+            <a:p>
+              <a:r>
+                <a:rPr lang="en-US" dirty="0" smtClean="0"/>
+                <a:t>F</a:t>
+              </a:r>
+              <a:endParaRPr lang="en-US" dirty="0"/>
+            </a:p>
+          </p:txBody>
+        </p:sp>
+        <p:sp>
+          <p:nvSpPr>
+            <p:cNvPr id="58" name="Oval 57"/>
+            <p:cNvSpPr/>
+            <p:nvPr/>
+          </p:nvSpPr>
+          <p:spPr>
+            <a:xfrm>
+              <a:off x="8035835" y="2897422"/>
+              <a:ext cx="228600" cy="289560"/>
+            </a:xfrm>
+            <a:prstGeom prst="ellipse">
+              <a:avLst/>
+            </a:prstGeom>
+            <a:noFill/>
+            <a:ln w="9525">
               <a:solidFill>
                 <a:srgbClr val="00B050"/>
               </a:solidFill>
-            </a:endParaRPr>
-          </a:p>
-        </p:txBody>
-      </p:sp>
-      <p:sp>
-        <p:nvSpPr>
-          <p:cNvPr id="64" name="TextBox 63"/>
-          <p:cNvSpPr txBox="1"/>
-          <p:nvPr/>
-        </p:nvSpPr>
-        <p:spPr>
-          <a:xfrm>
-            <a:off x="7239000" y="4572000"/>
-            <a:ext cx="704680" cy="307777"/>
-          </a:xfrm>
-          <a:prstGeom prst="rect">
-            <a:avLst/>
-          </a:prstGeom>
-          <a:noFill/>
-        </p:spPr>
-        <p:txBody>
-          <a:bodyPr wrap="none" rtlCol="0">
-            <a:spAutoFit/>
-          </a:bodyPr>
-          <a:lstStyle/>
-          <a:p>
-            <a:r>
-              <a:rPr lang="en-US" sz="1400" dirty="0" smtClean="0">
+              <a:prstDash val="sysDash"/>
+            </a:ln>
+          </p:spPr>
+          <p:style>
+            <a:lnRef idx="2">
+              <a:schemeClr val="accent3"/>
+            </a:lnRef>
+            <a:fillRef idx="1">
+              <a:schemeClr val="lt1"/>
+            </a:fillRef>
+            <a:effectRef idx="0">
+              <a:schemeClr val="accent3"/>
+            </a:effectRef>
+            <a:fontRef idx="minor">
+              <a:schemeClr val="dk1"/>
+            </a:fontRef>
+          </p:style>
+          <p:txBody>
+            <a:bodyPr rtlCol="0" anchor="ctr"/>
+            <a:lstStyle/>
+            <a:p>
+              <a:pPr algn="ctr"/>
+              <a:endParaRPr lang="en-US"/>
+            </a:p>
+          </p:txBody>
+        </p:sp>
+        <p:sp>
+          <p:nvSpPr>
+            <p:cNvPr id="64" name="TextBox 63"/>
+            <p:cNvSpPr txBox="1"/>
+            <p:nvPr/>
+          </p:nvSpPr>
+          <p:spPr>
+            <a:xfrm>
+              <a:off x="7502435" y="2665178"/>
+              <a:ext cx="704680" cy="307777"/>
+            </a:xfrm>
+            <a:prstGeom prst="rect">
+              <a:avLst/>
+            </a:prstGeom>
+            <a:noFill/>
+          </p:spPr>
+          <p:txBody>
+            <a:bodyPr wrap="none" rtlCol="0">
+              <a:spAutoFit/>
+            </a:bodyPr>
+            <a:lstStyle/>
+            <a:p>
+              <a:r>
+                <a:rPr lang="en-US" sz="1400" dirty="0" smtClean="0">
+                  <a:solidFill>
+                    <a:srgbClr val="00B050"/>
+                  </a:solidFill>
+                </a:rPr>
+                <a:t>marker</a:t>
+              </a:r>
+              <a:endParaRPr lang="en-US" sz="1400" dirty="0">
                 <a:solidFill>
                   <a:srgbClr val="00B050"/>
                 </a:solidFill>
-              </a:rPr>
-              <a:t>marker</a:t>
-            </a:r>
-            <a:endParaRPr lang="en-US" sz="1400" dirty="0">
-              <a:solidFill>
-                <a:srgbClr val="00B050"/>
-              </a:solidFill>
-            </a:endParaRPr>
-          </a:p>
-        </p:txBody>
-      </p:sp>
+              </a:endParaRPr>
+            </a:p>
+          </p:txBody>
+        </p:sp>
+      </p:grpSp>
       <p:sp>
         <p:nvSpPr>
           <p:cNvPr id="2" name="Footer Placeholder 1"/>
@@ -4487,6 +4259,1046 @@
           </a:p>
         </p:txBody>
       </p:sp>
+      <p:grpSp>
+        <p:nvGrpSpPr>
+          <p:cNvPr id="72" name="Group 71"/>
+          <p:cNvGrpSpPr/>
+          <p:nvPr/>
+        </p:nvGrpSpPr>
+        <p:grpSpPr>
+          <a:xfrm>
+            <a:off x="1000390" y="4379306"/>
+            <a:ext cx="2153453" cy="1921917"/>
+            <a:chOff x="1000390" y="4379306"/>
+            <a:chExt cx="2153453" cy="1921917"/>
+          </a:xfrm>
+        </p:grpSpPr>
+        <p:pic>
+          <p:nvPicPr>
+            <p:cNvPr id="1030" name="Picture 6" descr="http://ultrasoundvirtualdemo.com/images/ge/transducers/RSP6-16.jpg"/>
+            <p:cNvPicPr>
+              <a:picLocks noChangeAspect="1" noChangeArrowheads="1"/>
+            </p:cNvPicPr>
+            <p:nvPr/>
+          </p:nvPicPr>
+          <p:blipFill>
+            <a:blip r:embed="rId4" cstate="print">
+              <a:extLst>
+                <a:ext uri="{28A0092B-C50C-407E-A947-70E740481C1C}">
+                  <a14:useLocalDpi xmlns:a14="http://schemas.microsoft.com/office/drawing/2010/main" val="0"/>
+                </a:ext>
+              </a:extLst>
+            </a:blip>
+            <a:srcRect/>
+            <a:stretch>
+              <a:fillRect/>
+            </a:stretch>
+          </p:blipFill>
+          <p:spPr bwMode="auto">
+            <a:xfrm>
+              <a:off x="1385291" y="4380435"/>
+              <a:ext cx="1768552" cy="1496330"/>
+            </a:xfrm>
+            <a:prstGeom prst="rect">
+              <a:avLst/>
+            </a:prstGeom>
+            <a:noFill/>
+            <a:extLst>
+              <a:ext uri="{909E8E84-426E-40DD-AFC4-6F175D3DCCD1}">
+                <a14:hiddenFill xmlns:a14="http://schemas.microsoft.com/office/drawing/2010/main">
+                  <a:solidFill>
+                    <a:srgbClr val="FFFFFF"/>
+                  </a:solidFill>
+                </a14:hiddenFill>
+              </a:ext>
+            </a:extLst>
+          </p:spPr>
+        </p:pic>
+        <p:cxnSp>
+          <p:nvCxnSpPr>
+            <p:cNvPr id="63" name="Straight Arrow Connector 62"/>
+            <p:cNvCxnSpPr/>
+            <p:nvPr/>
+          </p:nvCxnSpPr>
+          <p:spPr>
+            <a:xfrm flipH="1" flipV="1">
+              <a:off x="1303621" y="5329531"/>
+              <a:ext cx="608762" cy="80669"/>
+            </a:xfrm>
+            <a:prstGeom prst="straightConnector1">
+              <a:avLst/>
+            </a:prstGeom>
+            <a:ln>
+              <a:solidFill>
+                <a:schemeClr val="accent6">
+                  <a:lumMod val="75000"/>
+                </a:schemeClr>
+              </a:solidFill>
+              <a:tailEnd type="arrow"/>
+            </a:ln>
+          </p:spPr>
+          <p:style>
+            <a:lnRef idx="2">
+              <a:schemeClr val="accent2"/>
+            </a:lnRef>
+            <a:fillRef idx="0">
+              <a:schemeClr val="accent2"/>
+            </a:fillRef>
+            <a:effectRef idx="1">
+              <a:schemeClr val="accent2"/>
+            </a:effectRef>
+            <a:fontRef idx="minor">
+              <a:schemeClr val="tx1"/>
+            </a:fontRef>
+          </p:style>
+        </p:cxnSp>
+        <p:cxnSp>
+          <p:nvCxnSpPr>
+            <p:cNvPr id="65" name="Straight Arrow Connector 64"/>
+            <p:cNvCxnSpPr/>
+            <p:nvPr/>
+          </p:nvCxnSpPr>
+          <p:spPr>
+            <a:xfrm flipH="1" flipV="1">
+              <a:off x="1679974" y="4692078"/>
+              <a:ext cx="235914" cy="742179"/>
+            </a:xfrm>
+            <a:prstGeom prst="straightConnector1">
+              <a:avLst/>
+            </a:prstGeom>
+            <a:ln>
+              <a:solidFill>
+                <a:schemeClr val="accent6">
+                  <a:lumMod val="75000"/>
+                </a:schemeClr>
+              </a:solidFill>
+              <a:tailEnd type="arrow"/>
+            </a:ln>
+          </p:spPr>
+          <p:style>
+            <a:lnRef idx="2">
+              <a:schemeClr val="accent2"/>
+            </a:lnRef>
+            <a:fillRef idx="0">
+              <a:schemeClr val="accent2"/>
+            </a:fillRef>
+            <a:effectRef idx="1">
+              <a:schemeClr val="accent2"/>
+            </a:effectRef>
+            <a:fontRef idx="minor">
+              <a:schemeClr val="tx1"/>
+            </a:fontRef>
+          </p:style>
+        </p:cxnSp>
+        <p:sp>
+          <p:nvSpPr>
+            <p:cNvPr id="66" name="TextBox 65"/>
+            <p:cNvSpPr txBox="1"/>
+            <p:nvPr/>
+          </p:nvSpPr>
+          <p:spPr>
+            <a:xfrm>
+              <a:off x="1558377" y="4379306"/>
+              <a:ext cx="317716" cy="369332"/>
+            </a:xfrm>
+            <a:prstGeom prst="rect">
+              <a:avLst/>
+            </a:prstGeom>
+            <a:noFill/>
+          </p:spPr>
+          <p:txBody>
+            <a:bodyPr wrap="none" rtlCol="0">
+              <a:spAutoFit/>
+            </a:bodyPr>
+            <a:lstStyle/>
+            <a:p>
+              <a:r>
+                <a:rPr lang="en-US" dirty="0" smtClean="0"/>
+                <a:t>A</a:t>
+              </a:r>
+              <a:endParaRPr lang="en-US" dirty="0"/>
+            </a:p>
+          </p:txBody>
+        </p:sp>
+        <p:sp>
+          <p:nvSpPr>
+            <p:cNvPr id="67" name="TextBox 66"/>
+            <p:cNvSpPr txBox="1"/>
+            <p:nvPr/>
+          </p:nvSpPr>
+          <p:spPr>
+            <a:xfrm>
+              <a:off x="1000390" y="5105154"/>
+              <a:ext cx="381836" cy="369332"/>
+            </a:xfrm>
+            <a:prstGeom prst="rect">
+              <a:avLst/>
+            </a:prstGeom>
+            <a:noFill/>
+          </p:spPr>
+          <p:txBody>
+            <a:bodyPr wrap="none" rtlCol="0">
+              <a:spAutoFit/>
+            </a:bodyPr>
+            <a:lstStyle/>
+            <a:p>
+              <a:r>
+                <a:rPr lang="en-US" dirty="0" smtClean="0"/>
+                <a:t>M</a:t>
+              </a:r>
+              <a:endParaRPr lang="en-US" dirty="0"/>
+            </a:p>
+          </p:txBody>
+        </p:sp>
+        <p:cxnSp>
+          <p:nvCxnSpPr>
+            <p:cNvPr id="68" name="Straight Arrow Connector 67"/>
+            <p:cNvCxnSpPr/>
+            <p:nvPr/>
+          </p:nvCxnSpPr>
+          <p:spPr>
+            <a:xfrm flipH="1">
+              <a:off x="1484943" y="5413077"/>
+              <a:ext cx="427703" cy="432001"/>
+            </a:xfrm>
+            <a:prstGeom prst="straightConnector1">
+              <a:avLst/>
+            </a:prstGeom>
+            <a:ln>
+              <a:solidFill>
+                <a:schemeClr val="accent6">
+                  <a:lumMod val="75000"/>
+                </a:schemeClr>
+              </a:solidFill>
+              <a:tailEnd type="arrow"/>
+            </a:ln>
+          </p:spPr>
+          <p:style>
+            <a:lnRef idx="2">
+              <a:schemeClr val="accent2"/>
+            </a:lnRef>
+            <a:fillRef idx="0">
+              <a:schemeClr val="accent2"/>
+            </a:fillRef>
+            <a:effectRef idx="1">
+              <a:schemeClr val="accent2"/>
+            </a:effectRef>
+            <a:fontRef idx="minor">
+              <a:schemeClr val="tx1"/>
+            </a:fontRef>
+          </p:style>
+        </p:cxnSp>
+        <p:sp>
+          <p:nvSpPr>
+            <p:cNvPr id="69" name="TextBox 68"/>
+            <p:cNvSpPr txBox="1"/>
+            <p:nvPr/>
+          </p:nvSpPr>
+          <p:spPr>
+            <a:xfrm>
+              <a:off x="1303621" y="5851200"/>
+              <a:ext cx="290464" cy="369332"/>
+            </a:xfrm>
+            <a:prstGeom prst="rect">
+              <a:avLst/>
+            </a:prstGeom>
+            <a:noFill/>
+          </p:spPr>
+          <p:txBody>
+            <a:bodyPr wrap="none" rtlCol="0">
+              <a:spAutoFit/>
+            </a:bodyPr>
+            <a:lstStyle/>
+            <a:p>
+              <a:r>
+                <a:rPr lang="en-US" dirty="0" smtClean="0"/>
+                <a:t>F</a:t>
+              </a:r>
+              <a:endParaRPr lang="en-US" dirty="0"/>
+            </a:p>
+          </p:txBody>
+        </p:sp>
+        <p:cxnSp>
+          <p:nvCxnSpPr>
+            <p:cNvPr id="70" name="Straight Arrow Connector 69"/>
+            <p:cNvCxnSpPr>
+              <a:endCxn id="71" idx="1"/>
+            </p:cNvCxnSpPr>
+            <p:nvPr/>
+          </p:nvCxnSpPr>
+          <p:spPr>
+            <a:xfrm>
+              <a:off x="1907760" y="5393441"/>
+              <a:ext cx="255396" cy="723116"/>
+            </a:xfrm>
+            <a:prstGeom prst="straightConnector1">
+              <a:avLst/>
+            </a:prstGeom>
+            <a:ln>
+              <a:solidFill>
+                <a:schemeClr val="accent6">
+                  <a:lumMod val="75000"/>
+                </a:schemeClr>
+              </a:solidFill>
+              <a:prstDash val="sysDot"/>
+              <a:tailEnd type="arrow"/>
+            </a:ln>
+          </p:spPr>
+          <p:style>
+            <a:lnRef idx="2">
+              <a:schemeClr val="accent2"/>
+            </a:lnRef>
+            <a:fillRef idx="0">
+              <a:schemeClr val="accent2"/>
+            </a:fillRef>
+            <a:effectRef idx="1">
+              <a:schemeClr val="accent2"/>
+            </a:effectRef>
+            <a:fontRef idx="minor">
+              <a:schemeClr val="tx1"/>
+            </a:fontRef>
+          </p:style>
+        </p:cxnSp>
+        <p:sp>
+          <p:nvSpPr>
+            <p:cNvPr id="71" name="TextBox 70"/>
+            <p:cNvSpPr txBox="1"/>
+            <p:nvPr/>
+          </p:nvSpPr>
+          <p:spPr>
+            <a:xfrm>
+              <a:off x="2163156" y="5931891"/>
+              <a:ext cx="327334" cy="369332"/>
+            </a:xfrm>
+            <a:prstGeom prst="rect">
+              <a:avLst/>
+            </a:prstGeom>
+            <a:noFill/>
+          </p:spPr>
+          <p:txBody>
+            <a:bodyPr wrap="none" rtlCol="0">
+              <a:spAutoFit/>
+            </a:bodyPr>
+            <a:lstStyle/>
+            <a:p>
+              <a:r>
+                <a:rPr lang="en-US" dirty="0" smtClean="0"/>
+                <a:t>D</a:t>
+              </a:r>
+              <a:endParaRPr lang="en-US" dirty="0"/>
+            </a:p>
+          </p:txBody>
+        </p:sp>
+      </p:grpSp>
+      <p:grpSp>
+        <p:nvGrpSpPr>
+          <p:cNvPr id="74" name="Group 73"/>
+          <p:cNvGrpSpPr/>
+          <p:nvPr/>
+        </p:nvGrpSpPr>
+        <p:grpSpPr>
+          <a:xfrm>
+            <a:off x="4677251" y="4542032"/>
+            <a:ext cx="3358584" cy="1607106"/>
+            <a:chOff x="4677251" y="4542032"/>
+            <a:chExt cx="3358584" cy="1607106"/>
+          </a:xfrm>
+        </p:grpSpPr>
+        <p:pic>
+          <p:nvPicPr>
+            <p:cNvPr id="1028" name="Picture 4" descr="http://www3.gehealthcare.com/~/media/images/product/product-categories/ultrasound/vivid/vivid-e9/tee-content-images/2-click-crop-tool.jpg"/>
+            <p:cNvPicPr>
+              <a:picLocks noChangeAspect="1" noChangeArrowheads="1"/>
+            </p:cNvPicPr>
+            <p:nvPr/>
+          </p:nvPicPr>
+          <p:blipFill rotWithShape="1">
+            <a:blip r:embed="rId5">
+              <a:extLst>
+                <a:ext uri="{28A0092B-C50C-407E-A947-70E740481C1C}">
+                  <a14:useLocalDpi xmlns:a14="http://schemas.microsoft.com/office/drawing/2010/main" val="0"/>
+                </a:ext>
+              </a:extLst>
+            </a:blip>
+            <a:srcRect t="41903" r="41754" b="8574"/>
+            <a:stretch/>
+          </p:blipFill>
+          <p:spPr bwMode="auto">
+            <a:xfrm>
+              <a:off x="4677251" y="4542032"/>
+              <a:ext cx="3120459" cy="1591897"/>
+            </a:xfrm>
+            <a:prstGeom prst="rect">
+              <a:avLst/>
+            </a:prstGeom>
+            <a:noFill/>
+            <a:extLst>
+              <a:ext uri="{909E8E84-426E-40DD-AFC4-6F175D3DCCD1}">
+                <a14:hiddenFill xmlns:a14="http://schemas.microsoft.com/office/drawing/2010/main">
+                  <a:solidFill>
+                    <a:srgbClr val="FFFFFF"/>
+                  </a:solidFill>
+                </a14:hiddenFill>
+              </a:ext>
+            </a:extLst>
+          </p:spPr>
+        </p:pic>
+        <p:cxnSp>
+          <p:nvCxnSpPr>
+            <p:cNvPr id="33" name="Straight Arrow Connector 32"/>
+            <p:cNvCxnSpPr/>
+            <p:nvPr/>
+          </p:nvCxnSpPr>
+          <p:spPr>
+            <a:xfrm>
+              <a:off x="7223804" y="5595993"/>
+              <a:ext cx="516719" cy="213737"/>
+            </a:xfrm>
+            <a:prstGeom prst="straightConnector1">
+              <a:avLst/>
+            </a:prstGeom>
+            <a:ln>
+              <a:solidFill>
+                <a:schemeClr val="accent6">
+                  <a:lumMod val="75000"/>
+                </a:schemeClr>
+              </a:solidFill>
+              <a:tailEnd type="arrow"/>
+            </a:ln>
+          </p:spPr>
+          <p:style>
+            <a:lnRef idx="2">
+              <a:schemeClr val="accent2"/>
+            </a:lnRef>
+            <a:fillRef idx="0">
+              <a:schemeClr val="accent2"/>
+            </a:fillRef>
+            <a:effectRef idx="1">
+              <a:schemeClr val="accent2"/>
+            </a:effectRef>
+            <a:fontRef idx="minor">
+              <a:schemeClr val="tx1"/>
+            </a:fontRef>
+          </p:style>
+        </p:cxnSp>
+        <p:cxnSp>
+          <p:nvCxnSpPr>
+            <p:cNvPr id="34" name="Straight Arrow Connector 33"/>
+            <p:cNvCxnSpPr/>
+            <p:nvPr/>
+          </p:nvCxnSpPr>
+          <p:spPr>
+            <a:xfrm flipH="1">
+              <a:off x="6950541" y="5595993"/>
+              <a:ext cx="273264" cy="323472"/>
+            </a:xfrm>
+            <a:prstGeom prst="straightConnector1">
+              <a:avLst/>
+            </a:prstGeom>
+            <a:ln>
+              <a:solidFill>
+                <a:schemeClr val="accent6">
+                  <a:lumMod val="75000"/>
+                </a:schemeClr>
+              </a:solidFill>
+              <a:tailEnd type="arrow"/>
+            </a:ln>
+          </p:spPr>
+          <p:style>
+            <a:lnRef idx="2">
+              <a:schemeClr val="accent2"/>
+            </a:lnRef>
+            <a:fillRef idx="0">
+              <a:schemeClr val="accent2"/>
+            </a:fillRef>
+            <a:effectRef idx="1">
+              <a:schemeClr val="accent2"/>
+            </a:effectRef>
+            <a:fontRef idx="minor">
+              <a:schemeClr val="tx1"/>
+            </a:fontRef>
+          </p:style>
+        </p:cxnSp>
+        <p:sp>
+          <p:nvSpPr>
+            <p:cNvPr id="39" name="TextBox 38"/>
+            <p:cNvSpPr txBox="1"/>
+            <p:nvPr/>
+          </p:nvSpPr>
+          <p:spPr>
+            <a:xfrm>
+              <a:off x="6984694" y="5779806"/>
+              <a:ext cx="317716" cy="369332"/>
+            </a:xfrm>
+            <a:prstGeom prst="rect">
+              <a:avLst/>
+            </a:prstGeom>
+            <a:noFill/>
+          </p:spPr>
+          <p:txBody>
+            <a:bodyPr wrap="none" rtlCol="0">
+              <a:spAutoFit/>
+            </a:bodyPr>
+            <a:lstStyle/>
+            <a:p>
+              <a:r>
+                <a:rPr lang="en-US" dirty="0" smtClean="0"/>
+                <a:t>A</a:t>
+              </a:r>
+              <a:endParaRPr lang="en-US" dirty="0"/>
+            </a:p>
+          </p:txBody>
+        </p:sp>
+        <p:sp>
+          <p:nvSpPr>
+            <p:cNvPr id="40" name="TextBox 39"/>
+            <p:cNvSpPr txBox="1"/>
+            <p:nvPr/>
+          </p:nvSpPr>
+          <p:spPr>
+            <a:xfrm>
+              <a:off x="7653999" y="5659152"/>
+              <a:ext cx="381836" cy="369332"/>
+            </a:xfrm>
+            <a:prstGeom prst="rect">
+              <a:avLst/>
+            </a:prstGeom>
+            <a:noFill/>
+          </p:spPr>
+          <p:txBody>
+            <a:bodyPr wrap="none" rtlCol="0">
+              <a:spAutoFit/>
+            </a:bodyPr>
+            <a:lstStyle/>
+            <a:p>
+              <a:r>
+                <a:rPr lang="en-US" dirty="0" smtClean="0"/>
+                <a:t>M</a:t>
+              </a:r>
+              <a:endParaRPr lang="en-US" dirty="0"/>
+            </a:p>
+          </p:txBody>
+        </p:sp>
+        <p:cxnSp>
+          <p:nvCxnSpPr>
+            <p:cNvPr id="41" name="Straight Arrow Connector 40"/>
+            <p:cNvCxnSpPr/>
+            <p:nvPr/>
+          </p:nvCxnSpPr>
+          <p:spPr>
+            <a:xfrm flipV="1">
+              <a:off x="7223806" y="5126442"/>
+              <a:ext cx="11023" cy="469553"/>
+            </a:xfrm>
+            <a:prstGeom prst="straightConnector1">
+              <a:avLst/>
+            </a:prstGeom>
+            <a:ln>
+              <a:solidFill>
+                <a:schemeClr val="accent6">
+                  <a:lumMod val="75000"/>
+                </a:schemeClr>
+              </a:solidFill>
+              <a:tailEnd type="arrow"/>
+            </a:ln>
+          </p:spPr>
+          <p:style>
+            <a:lnRef idx="2">
+              <a:schemeClr val="accent2"/>
+            </a:lnRef>
+            <a:fillRef idx="0">
+              <a:schemeClr val="accent2"/>
+            </a:fillRef>
+            <a:effectRef idx="1">
+              <a:schemeClr val="accent2"/>
+            </a:effectRef>
+            <a:fontRef idx="minor">
+              <a:schemeClr val="tx1"/>
+            </a:fontRef>
+          </p:style>
+        </p:cxnSp>
+        <p:sp>
+          <p:nvSpPr>
+            <p:cNvPr id="44" name="TextBox 43"/>
+            <p:cNvSpPr txBox="1"/>
+            <p:nvPr/>
+          </p:nvSpPr>
+          <p:spPr>
+            <a:xfrm>
+              <a:off x="6983371" y="4949648"/>
+              <a:ext cx="290464" cy="369332"/>
+            </a:xfrm>
+            <a:prstGeom prst="rect">
+              <a:avLst/>
+            </a:prstGeom>
+            <a:noFill/>
+          </p:spPr>
+          <p:txBody>
+            <a:bodyPr wrap="none" rtlCol="0">
+              <a:spAutoFit/>
+            </a:bodyPr>
+            <a:lstStyle/>
+            <a:p>
+              <a:r>
+                <a:rPr lang="en-US" dirty="0" smtClean="0"/>
+                <a:t>F</a:t>
+              </a:r>
+              <a:endParaRPr lang="en-US" dirty="0"/>
+            </a:p>
+          </p:txBody>
+        </p:sp>
+        <p:cxnSp>
+          <p:nvCxnSpPr>
+            <p:cNvPr id="73" name="Straight Arrow Connector 72"/>
+            <p:cNvCxnSpPr/>
+            <p:nvPr/>
+          </p:nvCxnSpPr>
+          <p:spPr>
+            <a:xfrm flipV="1">
+              <a:off x="7223804" y="5206877"/>
+              <a:ext cx="351588" cy="394055"/>
+            </a:xfrm>
+            <a:prstGeom prst="straightConnector1">
+              <a:avLst/>
+            </a:prstGeom>
+            <a:ln>
+              <a:solidFill>
+                <a:schemeClr val="accent6">
+                  <a:lumMod val="75000"/>
+                </a:schemeClr>
+              </a:solidFill>
+              <a:prstDash val="sysDot"/>
+              <a:tailEnd type="arrow"/>
+            </a:ln>
+          </p:spPr>
+          <p:style>
+            <a:lnRef idx="2">
+              <a:schemeClr val="accent2"/>
+            </a:lnRef>
+            <a:fillRef idx="0">
+              <a:schemeClr val="accent2"/>
+            </a:fillRef>
+            <a:effectRef idx="1">
+              <a:schemeClr val="accent2"/>
+            </a:effectRef>
+            <a:fontRef idx="minor">
+              <a:schemeClr val="tx1"/>
+            </a:fontRef>
+          </p:style>
+        </p:cxnSp>
+        <p:sp>
+          <p:nvSpPr>
+            <p:cNvPr id="76" name="TextBox 75"/>
+            <p:cNvSpPr txBox="1"/>
+            <p:nvPr/>
+          </p:nvSpPr>
+          <p:spPr>
+            <a:xfrm>
+              <a:off x="7525848" y="5101432"/>
+              <a:ext cx="327334" cy="369332"/>
+            </a:xfrm>
+            <a:prstGeom prst="rect">
+              <a:avLst/>
+            </a:prstGeom>
+            <a:noFill/>
+          </p:spPr>
+          <p:txBody>
+            <a:bodyPr wrap="none" rtlCol="0">
+              <a:spAutoFit/>
+            </a:bodyPr>
+            <a:lstStyle/>
+            <a:p>
+              <a:r>
+                <a:rPr lang="en-US" dirty="0" smtClean="0"/>
+                <a:t>D</a:t>
+              </a:r>
+              <a:endParaRPr lang="en-US" dirty="0"/>
+            </a:p>
+          </p:txBody>
+        </p:sp>
+      </p:grpSp>
+      <p:sp>
+        <p:nvSpPr>
+          <p:cNvPr id="54" name="Right Brace 53"/>
+          <p:cNvSpPr/>
+          <p:nvPr/>
+        </p:nvSpPr>
+        <p:spPr>
+          <a:xfrm>
+            <a:off x="5410200" y="1580566"/>
+            <a:ext cx="71390" cy="571531"/>
+          </a:xfrm>
+          <a:prstGeom prst="rightBrace">
+            <a:avLst/>
+          </a:prstGeom>
+          <a:ln>
+            <a:solidFill>
+              <a:schemeClr val="tx1"/>
+            </a:solidFill>
+          </a:ln>
+        </p:spPr>
+        <p:style>
+          <a:lnRef idx="1">
+            <a:schemeClr val="accent1"/>
+          </a:lnRef>
+          <a:fillRef idx="0">
+            <a:schemeClr val="accent1"/>
+          </a:fillRef>
+          <a:effectRef idx="0">
+            <a:schemeClr val="accent1"/>
+          </a:effectRef>
+          <a:fontRef idx="minor">
+            <a:schemeClr val="tx1"/>
+          </a:fontRef>
+        </p:style>
+        <p:txBody>
+          <a:bodyPr rtlCol="0" anchor="ctr"/>
+          <a:lstStyle/>
+          <a:p>
+            <a:pPr algn="ctr"/>
+            <a:endParaRPr lang="en-US"/>
+          </a:p>
+        </p:txBody>
+      </p:sp>
+      <p:sp>
+        <p:nvSpPr>
+          <p:cNvPr id="79" name="TextBox 78"/>
+          <p:cNvSpPr txBox="1"/>
+          <p:nvPr/>
+        </p:nvSpPr>
+        <p:spPr>
+          <a:xfrm>
+            <a:off x="5486400" y="1548825"/>
+            <a:ext cx="1312441" cy="584775"/>
+          </a:xfrm>
+          <a:prstGeom prst="rect">
+            <a:avLst/>
+          </a:prstGeom>
+          <a:noFill/>
+        </p:spPr>
+        <p:txBody>
+          <a:bodyPr wrap="square" rtlCol="0">
+            <a:spAutoFit/>
+          </a:bodyPr>
+          <a:lstStyle/>
+          <a:p>
+            <a:r>
+              <a:rPr lang="en-US" sz="1600" dirty="0" smtClean="0"/>
+              <a:t>For 3D probes only</a:t>
+            </a:r>
+            <a:endParaRPr lang="en-US" sz="1600" dirty="0"/>
+          </a:p>
+        </p:txBody>
+      </p:sp>
+      <p:grpSp>
+        <p:nvGrpSpPr>
+          <p:cNvPr id="80" name="Group 79"/>
+          <p:cNvGrpSpPr/>
+          <p:nvPr/>
+        </p:nvGrpSpPr>
+        <p:grpSpPr>
+          <a:xfrm>
+            <a:off x="2689928" y="2647061"/>
+            <a:ext cx="4212897" cy="1542866"/>
+            <a:chOff x="2689928" y="2647061"/>
+            <a:chExt cx="4212897" cy="1542866"/>
+          </a:xfrm>
+        </p:grpSpPr>
+        <p:pic>
+          <p:nvPicPr>
+            <p:cNvPr id="1032" name="Picture 8"/>
+            <p:cNvPicPr>
+              <a:picLocks noChangeAspect="1" noChangeArrowheads="1"/>
+            </p:cNvPicPr>
+            <p:nvPr/>
+          </p:nvPicPr>
+          <p:blipFill>
+            <a:blip r:embed="rId6" cstate="print"/>
+            <a:srcRect/>
+            <a:stretch>
+              <a:fillRect/>
+            </a:stretch>
+          </p:blipFill>
+          <p:spPr bwMode="auto">
+            <a:xfrm>
+              <a:off x="2689928" y="2723261"/>
+              <a:ext cx="3833813" cy="841921"/>
+            </a:xfrm>
+            <a:prstGeom prst="rect">
+              <a:avLst/>
+            </a:prstGeom>
+            <a:noFill/>
+            <a:ln w="9525">
+              <a:noFill/>
+              <a:miter lim="800000"/>
+              <a:headEnd/>
+              <a:tailEnd/>
+            </a:ln>
+          </p:spPr>
+        </p:pic>
+        <p:cxnSp>
+          <p:nvCxnSpPr>
+            <p:cNvPr id="43" name="Straight Arrow Connector 42"/>
+            <p:cNvCxnSpPr/>
+            <p:nvPr/>
+          </p:nvCxnSpPr>
+          <p:spPr>
+            <a:xfrm rot="5400000">
+              <a:off x="5887762" y="3652134"/>
+              <a:ext cx="685800" cy="47254"/>
+            </a:xfrm>
+            <a:prstGeom prst="straightConnector1">
+              <a:avLst/>
+            </a:prstGeom>
+            <a:ln>
+              <a:solidFill>
+                <a:schemeClr val="accent6">
+                  <a:lumMod val="75000"/>
+                </a:schemeClr>
+              </a:solidFill>
+              <a:tailEnd type="arrow"/>
+            </a:ln>
+          </p:spPr>
+          <p:style>
+            <a:lnRef idx="2">
+              <a:schemeClr val="accent2"/>
+            </a:lnRef>
+            <a:fillRef idx="0">
+              <a:schemeClr val="accent2"/>
+            </a:fillRef>
+            <a:effectRef idx="1">
+              <a:schemeClr val="accent2"/>
+            </a:effectRef>
+            <a:fontRef idx="minor">
+              <a:schemeClr val="tx1"/>
+            </a:fontRef>
+          </p:style>
+        </p:cxnSp>
+        <p:cxnSp>
+          <p:nvCxnSpPr>
+            <p:cNvPr id="45" name="Straight Arrow Connector 44"/>
+            <p:cNvCxnSpPr/>
+            <p:nvPr/>
+          </p:nvCxnSpPr>
+          <p:spPr>
+            <a:xfrm rot="10800000">
+              <a:off x="5749835" y="2951861"/>
+              <a:ext cx="504454" cy="381000"/>
+            </a:xfrm>
+            <a:prstGeom prst="straightConnector1">
+              <a:avLst/>
+            </a:prstGeom>
+            <a:ln>
+              <a:solidFill>
+                <a:schemeClr val="accent6">
+                  <a:lumMod val="75000"/>
+                </a:schemeClr>
+              </a:solidFill>
+              <a:tailEnd type="arrow"/>
+            </a:ln>
+          </p:spPr>
+          <p:style>
+            <a:lnRef idx="2">
+              <a:schemeClr val="accent2"/>
+            </a:lnRef>
+            <a:fillRef idx="0">
+              <a:schemeClr val="accent2"/>
+            </a:fillRef>
+            <a:effectRef idx="1">
+              <a:schemeClr val="accent2"/>
+            </a:effectRef>
+            <a:fontRef idx="minor">
+              <a:schemeClr val="tx1"/>
+            </a:fontRef>
+          </p:style>
+        </p:cxnSp>
+        <p:sp>
+          <p:nvSpPr>
+            <p:cNvPr id="47" name="TextBox 46"/>
+            <p:cNvSpPr txBox="1"/>
+            <p:nvPr/>
+          </p:nvSpPr>
+          <p:spPr>
+            <a:xfrm>
+              <a:off x="6194245" y="3820595"/>
+              <a:ext cx="381836" cy="369332"/>
+            </a:xfrm>
+            <a:prstGeom prst="rect">
+              <a:avLst/>
+            </a:prstGeom>
+            <a:noFill/>
+          </p:spPr>
+          <p:txBody>
+            <a:bodyPr wrap="none" rtlCol="0">
+              <a:spAutoFit/>
+            </a:bodyPr>
+            <a:lstStyle/>
+            <a:p>
+              <a:r>
+                <a:rPr lang="en-US" dirty="0" smtClean="0"/>
+                <a:t>M</a:t>
+              </a:r>
+              <a:endParaRPr lang="en-US" dirty="0"/>
+            </a:p>
+          </p:txBody>
+        </p:sp>
+        <p:sp>
+          <p:nvSpPr>
+            <p:cNvPr id="48" name="TextBox 47"/>
+            <p:cNvSpPr txBox="1"/>
+            <p:nvPr/>
+          </p:nvSpPr>
+          <p:spPr>
+            <a:xfrm>
+              <a:off x="5597435" y="2647061"/>
+              <a:ext cx="290464" cy="369332"/>
+            </a:xfrm>
+            <a:prstGeom prst="rect">
+              <a:avLst/>
+            </a:prstGeom>
+            <a:noFill/>
+          </p:spPr>
+          <p:txBody>
+            <a:bodyPr wrap="none" rtlCol="0">
+              <a:spAutoFit/>
+            </a:bodyPr>
+            <a:lstStyle/>
+            <a:p>
+              <a:r>
+                <a:rPr lang="en-US" dirty="0" smtClean="0"/>
+                <a:t>F</a:t>
+              </a:r>
+              <a:endParaRPr lang="en-US" dirty="0"/>
+            </a:p>
+          </p:txBody>
+        </p:sp>
+        <p:cxnSp>
+          <p:nvCxnSpPr>
+            <p:cNvPr id="49" name="Straight Arrow Connector 48"/>
+            <p:cNvCxnSpPr/>
+            <p:nvPr/>
+          </p:nvCxnSpPr>
+          <p:spPr>
+            <a:xfrm rot="10800000">
+              <a:off x="5435509" y="2928046"/>
+              <a:ext cx="504454" cy="381000"/>
+            </a:xfrm>
+            <a:prstGeom prst="straightConnector1">
+              <a:avLst/>
+            </a:prstGeom>
+            <a:ln>
+              <a:tailEnd type="arrow"/>
+            </a:ln>
+          </p:spPr>
+          <p:style>
+            <a:lnRef idx="2">
+              <a:schemeClr val="accent5"/>
+            </a:lnRef>
+            <a:fillRef idx="0">
+              <a:schemeClr val="accent5"/>
+            </a:fillRef>
+            <a:effectRef idx="1">
+              <a:schemeClr val="accent5"/>
+            </a:effectRef>
+            <a:fontRef idx="minor">
+              <a:schemeClr val="tx1"/>
+            </a:fontRef>
+          </p:style>
+        </p:cxnSp>
+        <p:cxnSp>
+          <p:nvCxnSpPr>
+            <p:cNvPr id="50" name="Straight Arrow Connector 49"/>
+            <p:cNvCxnSpPr/>
+            <p:nvPr/>
+          </p:nvCxnSpPr>
+          <p:spPr>
+            <a:xfrm>
+              <a:off x="5940335" y="3302381"/>
+              <a:ext cx="807720" cy="60960"/>
+            </a:xfrm>
+            <a:prstGeom prst="straightConnector1">
+              <a:avLst/>
+            </a:prstGeom>
+            <a:ln>
+              <a:tailEnd type="arrow"/>
+            </a:ln>
+          </p:spPr>
+          <p:style>
+            <a:lnRef idx="2">
+              <a:schemeClr val="accent5"/>
+            </a:lnRef>
+            <a:fillRef idx="0">
+              <a:schemeClr val="accent5"/>
+            </a:fillRef>
+            <a:effectRef idx="1">
+              <a:schemeClr val="accent5"/>
+            </a:effectRef>
+            <a:fontRef idx="minor">
+              <a:schemeClr val="tx1"/>
+            </a:fontRef>
+          </p:style>
+        </p:cxnSp>
+        <p:sp>
+          <p:nvSpPr>
+            <p:cNvPr id="56" name="TextBox 55"/>
+            <p:cNvSpPr txBox="1"/>
+            <p:nvPr/>
+          </p:nvSpPr>
+          <p:spPr>
+            <a:xfrm>
+              <a:off x="5216435" y="2647061"/>
+              <a:ext cx="290464" cy="369332"/>
+            </a:xfrm>
+            <a:prstGeom prst="rect">
+              <a:avLst/>
+            </a:prstGeom>
+            <a:noFill/>
+          </p:spPr>
+          <p:txBody>
+            <a:bodyPr wrap="none" rtlCol="0">
+              <a:spAutoFit/>
+            </a:bodyPr>
+            <a:lstStyle/>
+            <a:p>
+              <a:r>
+                <a:rPr lang="en-US" dirty="0" smtClean="0"/>
+                <a:t>F</a:t>
+              </a:r>
+              <a:endParaRPr lang="en-US" dirty="0"/>
+            </a:p>
+          </p:txBody>
+        </p:sp>
+        <p:sp>
+          <p:nvSpPr>
+            <p:cNvPr id="85" name="TextBox 84"/>
+            <p:cNvSpPr txBox="1"/>
+            <p:nvPr/>
+          </p:nvSpPr>
+          <p:spPr>
+            <a:xfrm>
+              <a:off x="6520989" y="3383448"/>
+              <a:ext cx="381836" cy="369332"/>
+            </a:xfrm>
+            <a:prstGeom prst="rect">
+              <a:avLst/>
+            </a:prstGeom>
+            <a:noFill/>
+          </p:spPr>
+          <p:txBody>
+            <a:bodyPr wrap="none" rtlCol="0">
+              <a:spAutoFit/>
+            </a:bodyPr>
+            <a:lstStyle/>
+            <a:p>
+              <a:r>
+                <a:rPr lang="en-US" dirty="0" smtClean="0"/>
+                <a:t>M</a:t>
+              </a:r>
+              <a:endParaRPr lang="en-US" dirty="0"/>
+            </a:p>
+          </p:txBody>
+        </p:sp>
+      </p:grpSp>
     </p:spTree>
   </p:cSld>
   <p:clrMapOvr>

</xml_diff>